<commit_message>
Improve spatial calibration figure and concept map
</commit_message>
<xml_diff>
--- a/figures/resources/spatial_calibration.pptx
+++ b/figures/resources/spatial_calibration.pptx
@@ -5,11 +5,12 @@
     <p:sldMasterId id="2147483660" r:id="rId1"/>
   </p:sldMasterIdLst>
   <p:notesMasterIdLst>
-    <p:notesMasterId r:id="rId4"/>
+    <p:notesMasterId r:id="rId5"/>
   </p:notesMasterIdLst>
   <p:sldIdLst>
     <p:sldId id="256" r:id="rId2"/>
-    <p:sldId id="257" r:id="rId3"/>
+    <p:sldId id="258" r:id="rId3"/>
+    <p:sldId id="257" r:id="rId4"/>
   </p:sldIdLst>
   <p:sldSz cx="9144000" cy="6858000" type="screen4x3"/>
   <p:notesSz cx="6858000" cy="9144000"/>
@@ -198,7 +199,7 @@
           <a:p>
             <a:fld id="{0DE32CF7-9C27-294A-90C4-3E35094C4601}" type="datetimeFigureOut">
               <a:rPr lang="de-DE" smtClean="0"/>
-              <a:t>18.01.22</a:t>
+              <a:t>24.09.23</a:t>
             </a:fld>
             <a:endParaRPr lang="de-DE"/>
           </a:p>
@@ -660,6 +661,108 @@
     </p:spTree>
     <p:extLst>
       <p:ext uri="{BB962C8B-B14F-4D97-AF65-F5344CB8AC3E}">
+        <p14:creationId xmlns:p14="http://schemas.microsoft.com/office/powerpoint/2010/main" val="4218326562"/>
+      </p:ext>
+    </p:extLst>
+  </p:cSld>
+  <p:clrMapOvr>
+    <a:masterClrMapping/>
+  </p:clrMapOvr>
+</p:notes>
+</file>
+
+<file path=ppt/notesSlides/notesSlide3.xml><?xml version="1.0" encoding="utf-8"?>
+<p:notes xmlns:a="http://schemas.openxmlformats.org/drawingml/2006/main" xmlns:r="http://schemas.openxmlformats.org/officeDocument/2006/relationships" xmlns:p="http://schemas.openxmlformats.org/presentationml/2006/main">
+  <p:cSld>
+    <p:spTree>
+      <p:nvGrpSpPr>
+        <p:cNvPr id="1" name=""/>
+        <p:cNvGrpSpPr/>
+        <p:nvPr/>
+      </p:nvGrpSpPr>
+      <p:grpSpPr>
+        <a:xfrm>
+          <a:off x="0" y="0"/>
+          <a:ext cx="0" cy="0"/>
+          <a:chOff x="0" y="0"/>
+          <a:chExt cx="0" cy="0"/>
+        </a:xfrm>
+      </p:grpSpPr>
+      <p:sp>
+        <p:nvSpPr>
+          <p:cNvPr id="2" name="Slide Image Placeholder 1"/>
+          <p:cNvSpPr>
+            <a:spLocks noGrp="1" noRot="1" noChangeAspect="1"/>
+          </p:cNvSpPr>
+          <p:nvPr>
+            <p:ph type="sldImg"/>
+          </p:nvPr>
+        </p:nvSpPr>
+        <p:spPr/>
+      </p:sp>
+      <p:sp>
+        <p:nvSpPr>
+          <p:cNvPr id="3" name="Notes Placeholder 2"/>
+          <p:cNvSpPr>
+            <a:spLocks noGrp="1"/>
+          </p:cNvSpPr>
+          <p:nvPr>
+            <p:ph type="body" idx="1"/>
+          </p:nvPr>
+        </p:nvSpPr>
+        <p:spPr/>
+        <p:txBody>
+          <a:bodyPr/>
+          <a:lstStyle/>
+          <a:p>
+            <a:r>
+              <a:rPr lang="de-DE" dirty="0" err="1"/>
+              <a:t>Example</a:t>
+            </a:r>
+            <a:r>
+              <a:rPr lang="de-DE" dirty="0"/>
+              <a:t> </a:t>
+            </a:r>
+            <a:r>
+              <a:rPr lang="de-DE" dirty="0" err="1"/>
+              <a:t>image</a:t>
+            </a:r>
+            <a:r>
+              <a:rPr lang="de-DE" dirty="0"/>
+              <a:t>: xy_8bit__nucleus_calibrated.tif</a:t>
+            </a:r>
+          </a:p>
+          <a:p>
+            <a:endParaRPr lang="de-DE" dirty="0"/>
+          </a:p>
+        </p:txBody>
+      </p:sp>
+      <p:sp>
+        <p:nvSpPr>
+          <p:cNvPr id="4" name="Slide Number Placeholder 3"/>
+          <p:cNvSpPr>
+            <a:spLocks noGrp="1"/>
+          </p:cNvSpPr>
+          <p:nvPr>
+            <p:ph type="sldNum" sz="quarter" idx="5"/>
+          </p:nvPr>
+        </p:nvSpPr>
+        <p:spPr/>
+        <p:txBody>
+          <a:bodyPr/>
+          <a:lstStyle/>
+          <a:p>
+            <a:fld id="{926C4596-9333-5B48-AF09-D4A72557A3A4}" type="slidenum">
+              <a:rPr lang="de-DE" smtClean="0"/>
+              <a:t>3</a:t>
+            </a:fld>
+            <a:endParaRPr lang="de-DE"/>
+          </a:p>
+        </p:txBody>
+      </p:sp>
+    </p:spTree>
+    <p:extLst>
+      <p:ext uri="{BB962C8B-B14F-4D97-AF65-F5344CB8AC3E}">
         <p14:creationId xmlns:p14="http://schemas.microsoft.com/office/powerpoint/2010/main" val="186740975"/>
       </p:ext>
     </p:extLst>
@@ -801,7 +904,7 @@
           <a:p>
             <a:fld id="{F21C5B54-884B-447C-A969-012169FE4C38}" type="datetimeFigureOut">
               <a:rPr lang="en-US" smtClean="0"/>
-              <a:t>1/18/22</a:t>
+              <a:t>9/24/23</a:t>
             </a:fld>
             <a:endParaRPr lang="en-US"/>
           </a:p>
@@ -971,7 +1074,7 @@
           <a:p>
             <a:fld id="{F21C5B54-884B-447C-A969-012169FE4C38}" type="datetimeFigureOut">
               <a:rPr lang="en-US" smtClean="0"/>
-              <a:t>1/18/22</a:t>
+              <a:t>9/24/23</a:t>
             </a:fld>
             <a:endParaRPr lang="en-US"/>
           </a:p>
@@ -1151,7 +1254,7 @@
           <a:p>
             <a:fld id="{F21C5B54-884B-447C-A969-012169FE4C38}" type="datetimeFigureOut">
               <a:rPr lang="en-US" smtClean="0"/>
-              <a:t>1/18/22</a:t>
+              <a:t>9/24/23</a:t>
             </a:fld>
             <a:endParaRPr lang="en-US"/>
           </a:p>
@@ -1321,7 +1424,7 @@
           <a:p>
             <a:fld id="{F21C5B54-884B-447C-A969-012169FE4C38}" type="datetimeFigureOut">
               <a:rPr lang="en-US" smtClean="0"/>
-              <a:t>1/18/22</a:t>
+              <a:t>9/24/23</a:t>
             </a:fld>
             <a:endParaRPr lang="en-US"/>
           </a:p>
@@ -1565,7 +1668,7 @@
           <a:p>
             <a:fld id="{F21C5B54-884B-447C-A969-012169FE4C38}" type="datetimeFigureOut">
               <a:rPr lang="en-US" smtClean="0"/>
-              <a:t>1/18/22</a:t>
+              <a:t>9/24/23</a:t>
             </a:fld>
             <a:endParaRPr lang="en-US"/>
           </a:p>
@@ -1797,7 +1900,7 @@
           <a:p>
             <a:fld id="{F21C5B54-884B-447C-A969-012169FE4C38}" type="datetimeFigureOut">
               <a:rPr lang="en-US" smtClean="0"/>
-              <a:t>1/18/22</a:t>
+              <a:t>9/24/23</a:t>
             </a:fld>
             <a:endParaRPr lang="en-US"/>
           </a:p>
@@ -2164,7 +2267,7 @@
           <a:p>
             <a:fld id="{F21C5B54-884B-447C-A969-012169FE4C38}" type="datetimeFigureOut">
               <a:rPr lang="en-US" smtClean="0"/>
-              <a:t>1/18/22</a:t>
+              <a:t>9/24/23</a:t>
             </a:fld>
             <a:endParaRPr lang="en-US"/>
           </a:p>
@@ -2282,7 +2385,7 @@
           <a:p>
             <a:fld id="{F21C5B54-884B-447C-A969-012169FE4C38}" type="datetimeFigureOut">
               <a:rPr lang="en-US" smtClean="0"/>
-              <a:t>1/18/22</a:t>
+              <a:t>9/24/23</a:t>
             </a:fld>
             <a:endParaRPr lang="en-US"/>
           </a:p>
@@ -2377,7 +2480,7 @@
           <a:p>
             <a:fld id="{F21C5B54-884B-447C-A969-012169FE4C38}" type="datetimeFigureOut">
               <a:rPr lang="en-US" smtClean="0"/>
-              <a:t>1/18/22</a:t>
+              <a:t>9/24/23</a:t>
             </a:fld>
             <a:endParaRPr lang="en-US"/>
           </a:p>
@@ -2654,7 +2757,7 @@
           <a:p>
             <a:fld id="{F21C5B54-884B-447C-A969-012169FE4C38}" type="datetimeFigureOut">
               <a:rPr lang="en-US" smtClean="0"/>
-              <a:t>1/18/22</a:t>
+              <a:t>9/24/23</a:t>
             </a:fld>
             <a:endParaRPr lang="en-US"/>
           </a:p>
@@ -2911,7 +3014,7 @@
           <a:p>
             <a:fld id="{F21C5B54-884B-447C-A969-012169FE4C38}" type="datetimeFigureOut">
               <a:rPr lang="en-US" smtClean="0"/>
-              <a:t>1/18/22</a:t>
+              <a:t>9/24/23</a:t>
             </a:fld>
             <a:endParaRPr lang="en-US"/>
           </a:p>
@@ -3124,7 +3227,7 @@
           <a:p>
             <a:fld id="{F21C5B54-884B-447C-A969-012169FE4C38}" type="datetimeFigureOut">
               <a:rPr lang="en-US" smtClean="0"/>
-              <a:t>1/18/22</a:t>
+              <a:t>9/24/23</a:t>
             </a:fld>
             <a:endParaRPr lang="en-US"/>
           </a:p>
@@ -3769,8 +3872,8 @@
           </a:fontRef>
         </p:style>
       </p:cxnSp>
-      <mc:AlternateContent xmlns:mc="http://schemas.openxmlformats.org/markup-compatibility/2006">
-        <mc:Choice xmlns:a14="http://schemas.microsoft.com/office/drawing/2010/main" Requires="a14">
+      <mc:AlternateContent xmlns:mc="http://schemas.openxmlformats.org/markup-compatibility/2006" xmlns:a14="http://schemas.microsoft.com/office/drawing/2010/main">
+        <mc:Choice Requires="a14">
           <p:sp>
             <p:nvSpPr>
               <p:cNvPr id="32" name="TextBox 31"/>
@@ -3850,7 +3953,7 @@
             </p:txBody>
           </p:sp>
         </mc:Choice>
-        <mc:Fallback>
+        <mc:Fallback xmlns="">
           <p:sp>
             <p:nvSpPr>
               <p:cNvPr id="32" name="TextBox 31"/>
@@ -4112,12 +4215,33 @@
                       </m:r>
                       <m:r>
                         <a:rPr lang="en-US" b="0" i="1" smtClean="0">
+                          <a:solidFill>
+                            <a:schemeClr val="accent1"/>
+                          </a:solidFill>
                           <a:latin typeface="Cambria Math" panose="02040503050406030204" pitchFamily="18" charset="0"/>
                         </a:rPr>
-                        <m:t>139 ∗ 0.13 µ</m:t>
+                        <m:t>139</m:t>
                       </m:r>
                       <m:r>
                         <a:rPr lang="en-US" b="0" i="1" smtClean="0">
+                          <a:latin typeface="Cambria Math" panose="02040503050406030204" pitchFamily="18" charset="0"/>
+                        </a:rPr>
+                        <m:t> ∗ </m:t>
+                      </m:r>
+                      <m:r>
+                        <a:rPr lang="en-US" b="0" i="1" smtClean="0">
+                          <a:solidFill>
+                            <a:schemeClr val="accent6"/>
+                          </a:solidFill>
+                          <a:latin typeface="Cambria Math" panose="02040503050406030204" pitchFamily="18" charset="0"/>
+                        </a:rPr>
+                        <m:t>0.13 µ</m:t>
+                      </m:r>
+                      <m:r>
+                        <a:rPr lang="en-US" b="0" i="1" smtClean="0">
+                          <a:solidFill>
+                            <a:schemeClr val="accent6"/>
+                          </a:solidFill>
                           <a:latin typeface="Cambria Math" panose="02040503050406030204" pitchFamily="18" charset="0"/>
                         </a:rPr>
                         <m:t>𝑚</m:t>
@@ -4167,6 +4291,9 @@
                       </m:r>
                       <m:r>
                         <a:rPr lang="en-US" b="0" i="1" smtClean="0">
+                          <a:solidFill>
+                            <a:schemeClr val="accent1"/>
+                          </a:solidFill>
                           <a:latin typeface="Cambria Math" panose="02040503050406030204" pitchFamily="18" charset="0"/>
                         </a:rPr>
                         <m:t>50</m:t>
@@ -4175,10 +4302,22 @@
                         <a:rPr lang="en-US" i="1">
                           <a:latin typeface="Cambria Math" panose="02040503050406030204" pitchFamily="18" charset="0"/>
                         </a:rPr>
-                        <m:t> ∗ 0.13 µ</m:t>
+                        <m:t> ∗ </m:t>
                       </m:r>
                       <m:r>
-                        <a:rPr lang="en-US" i="1">
+                        <a:rPr lang="en-US" i="1" smtClean="0">
+                          <a:solidFill>
+                            <a:schemeClr val="accent6"/>
+                          </a:solidFill>
+                          <a:latin typeface="Cambria Math" panose="02040503050406030204" pitchFamily="18" charset="0"/>
+                        </a:rPr>
+                        <m:t>0.13 µ</m:t>
+                      </m:r>
+                      <m:r>
+                        <a:rPr lang="en-US" i="1" smtClean="0">
+                          <a:solidFill>
+                            <a:schemeClr val="accent6"/>
+                          </a:solidFill>
                           <a:latin typeface="Cambria Math" panose="02040503050406030204" pitchFamily="18" charset="0"/>
                         </a:rPr>
                         <m:t>𝑚</m:t>
@@ -4235,7 +4374,1696 @@
               <a:blipFill>
                 <a:blip r:embed="rId6"/>
                 <a:stretch>
-                  <a:fillRect b="-7692"/>
+                  <a:fillRect b="-9615"/>
+                </a:stretch>
+              </a:blipFill>
+            </p:spPr>
+            <p:txBody>
+              <a:bodyPr/>
+              <a:lstStyle/>
+              <a:p>
+                <a:r>
+                  <a:rPr lang="en-DE">
+                    <a:noFill/>
+                  </a:rPr>
+                  <a:t> </a:t>
+                </a:r>
+              </a:p>
+            </p:txBody>
+          </p:sp>
+        </mc:Fallback>
+      </mc:AlternateContent>
+      <p:sp>
+        <p:nvSpPr>
+          <p:cNvPr id="21" name="Rectangle 20">
+            <a:extLst>
+              <a:ext uri="{FF2B5EF4-FFF2-40B4-BE49-F238E27FC236}">
+                <a16:creationId xmlns:a16="http://schemas.microsoft.com/office/drawing/2014/main" id="{AFDC82EB-CA73-C543-82FD-EED622F9E2F9}"/>
+              </a:ext>
+            </a:extLst>
+          </p:cNvPr>
+          <p:cNvSpPr/>
+          <p:nvPr/>
+        </p:nvSpPr>
+        <p:spPr>
+          <a:xfrm>
+            <a:off x="2663923" y="3364375"/>
+            <a:ext cx="290955" cy="290330"/>
+          </a:xfrm>
+          <a:prstGeom prst="rect">
+            <a:avLst/>
+          </a:prstGeom>
+          <a:noFill/>
+          <a:ln w="25400">
+            <a:solidFill>
+              <a:schemeClr val="accent1"/>
+            </a:solidFill>
+            <a:prstDash val="sysDash"/>
+          </a:ln>
+        </p:spPr>
+        <p:style>
+          <a:lnRef idx="2">
+            <a:schemeClr val="accent1">
+              <a:shade val="50000"/>
+            </a:schemeClr>
+          </a:lnRef>
+          <a:fillRef idx="1">
+            <a:schemeClr val="accent1"/>
+          </a:fillRef>
+          <a:effectRef idx="0">
+            <a:schemeClr val="accent1"/>
+          </a:effectRef>
+          <a:fontRef idx="minor">
+            <a:schemeClr val="lt1"/>
+          </a:fontRef>
+        </p:style>
+        <p:txBody>
+          <a:bodyPr rtlCol="0" anchor="ctr"/>
+          <a:lstStyle/>
+          <a:p>
+            <a:pPr algn="ctr"/>
+            <a:endParaRPr lang="de-DE" dirty="0"/>
+          </a:p>
+        </p:txBody>
+      </p:sp>
+      <p:sp>
+        <p:nvSpPr>
+          <p:cNvPr id="37" name="TextBox 36">
+            <a:extLst>
+              <a:ext uri="{FF2B5EF4-FFF2-40B4-BE49-F238E27FC236}">
+                <a16:creationId xmlns:a16="http://schemas.microsoft.com/office/drawing/2014/main" id="{57BC08D2-26A8-3E40-BB59-5C2B6734CB97}"/>
+              </a:ext>
+            </a:extLst>
+          </p:cNvPr>
+          <p:cNvSpPr txBox="1"/>
+          <p:nvPr/>
+        </p:nvSpPr>
+        <p:spPr>
+          <a:xfrm>
+            <a:off x="858339" y="1404350"/>
+            <a:ext cx="3881127" cy="369332"/>
+          </a:xfrm>
+          <a:prstGeom prst="rect">
+            <a:avLst/>
+          </a:prstGeom>
+          <a:noFill/>
+        </p:spPr>
+        <p:txBody>
+          <a:bodyPr wrap="none" rtlCol="0">
+            <a:spAutoFit/>
+          </a:bodyPr>
+          <a:lstStyle/>
+          <a:p>
+            <a:r>
+              <a:rPr lang="en-US" dirty="0">
+                <a:solidFill>
+                  <a:schemeClr val="accent1"/>
+                </a:solidFill>
+              </a:rPr>
+              <a:t>Index</a:t>
+            </a:r>
+            <a:r>
+              <a:rPr lang="en-US" dirty="0"/>
+              <a:t> * </a:t>
+            </a:r>
+            <a:r>
+              <a:rPr lang="en-US" dirty="0">
+                <a:solidFill>
+                  <a:schemeClr val="accent6"/>
+                </a:solidFill>
+              </a:rPr>
+              <a:t>Spacing</a:t>
+            </a:r>
+            <a:r>
+              <a:rPr lang="en-US" dirty="0"/>
+              <a:t> = Calibrated coordinate</a:t>
+            </a:r>
+          </a:p>
+        </p:txBody>
+      </p:sp>
+      <p:sp>
+        <p:nvSpPr>
+          <p:cNvPr id="31" name="Oval 30">
+            <a:extLst>
+              <a:ext uri="{FF2B5EF4-FFF2-40B4-BE49-F238E27FC236}">
+                <a16:creationId xmlns:a16="http://schemas.microsoft.com/office/drawing/2014/main" id="{E3A2E411-C08A-4640-A448-A379E17AFA64}"/>
+              </a:ext>
+            </a:extLst>
+          </p:cNvPr>
+          <p:cNvSpPr/>
+          <p:nvPr/>
+        </p:nvSpPr>
+        <p:spPr>
+          <a:xfrm>
+            <a:off x="-2517887" y="2638463"/>
+            <a:ext cx="111873" cy="101703"/>
+          </a:xfrm>
+          <a:prstGeom prst="ellipse">
+            <a:avLst/>
+          </a:prstGeom>
+        </p:spPr>
+        <p:style>
+          <a:lnRef idx="2">
+            <a:schemeClr val="accent1">
+              <a:shade val="50000"/>
+            </a:schemeClr>
+          </a:lnRef>
+          <a:fillRef idx="1">
+            <a:schemeClr val="accent1"/>
+          </a:fillRef>
+          <a:effectRef idx="0">
+            <a:schemeClr val="accent1"/>
+          </a:effectRef>
+          <a:fontRef idx="minor">
+            <a:schemeClr val="lt1"/>
+          </a:fontRef>
+        </p:style>
+        <p:txBody>
+          <a:bodyPr rtlCol="0" anchor="ctr"/>
+          <a:lstStyle/>
+          <a:p>
+            <a:pPr algn="ctr"/>
+            <a:endParaRPr lang="de-DE"/>
+          </a:p>
+        </p:txBody>
+      </p:sp>
+      <p:sp>
+        <p:nvSpPr>
+          <p:cNvPr id="39" name="TextBox 38">
+            <a:extLst>
+              <a:ext uri="{FF2B5EF4-FFF2-40B4-BE49-F238E27FC236}">
+                <a16:creationId xmlns:a16="http://schemas.microsoft.com/office/drawing/2014/main" id="{D9D7C7E3-9AFF-044D-943D-8BBF70434797}"/>
+              </a:ext>
+            </a:extLst>
+          </p:cNvPr>
+          <p:cNvSpPr txBox="1"/>
+          <p:nvPr/>
+        </p:nvSpPr>
+        <p:spPr>
+          <a:xfrm>
+            <a:off x="-2949467" y="2280114"/>
+            <a:ext cx="1239442" cy="369332"/>
+          </a:xfrm>
+          <a:prstGeom prst="rect">
+            <a:avLst/>
+          </a:prstGeom>
+          <a:noFill/>
+        </p:spPr>
+        <p:txBody>
+          <a:bodyPr wrap="none" rtlCol="0">
+            <a:spAutoFit/>
+          </a:bodyPr>
+          <a:lstStyle/>
+          <a:p>
+            <a:r>
+              <a:rPr lang="en-US" dirty="0"/>
+              <a:t>Origin (0,0)</a:t>
+            </a:r>
+          </a:p>
+        </p:txBody>
+      </p:sp>
+      <p:sp>
+        <p:nvSpPr>
+          <p:cNvPr id="42" name="Rectangle 41">
+            <a:extLst>
+              <a:ext uri="{FF2B5EF4-FFF2-40B4-BE49-F238E27FC236}">
+                <a16:creationId xmlns:a16="http://schemas.microsoft.com/office/drawing/2014/main" id="{48CAE13C-FD22-8641-BB7E-A6BF7D608096}"/>
+              </a:ext>
+            </a:extLst>
+          </p:cNvPr>
+          <p:cNvSpPr/>
+          <p:nvPr/>
+        </p:nvSpPr>
+        <p:spPr>
+          <a:xfrm>
+            <a:off x="6826589" y="1960909"/>
+            <a:ext cx="620889" cy="622866"/>
+          </a:xfrm>
+          <a:prstGeom prst="rect">
+            <a:avLst/>
+          </a:prstGeom>
+          <a:noFill/>
+          <a:ln w="3175">
+            <a:solidFill>
+              <a:schemeClr val="accent1"/>
+            </a:solidFill>
+          </a:ln>
+        </p:spPr>
+        <p:style>
+          <a:lnRef idx="2">
+            <a:schemeClr val="accent1">
+              <a:shade val="50000"/>
+            </a:schemeClr>
+          </a:lnRef>
+          <a:fillRef idx="1">
+            <a:schemeClr val="accent1"/>
+          </a:fillRef>
+          <a:effectRef idx="0">
+            <a:schemeClr val="accent1"/>
+          </a:effectRef>
+          <a:fontRef idx="minor">
+            <a:schemeClr val="lt1"/>
+          </a:fontRef>
+        </p:style>
+        <p:txBody>
+          <a:bodyPr rtlCol="0" anchor="ctr"/>
+          <a:lstStyle/>
+          <a:p>
+            <a:pPr algn="ctr"/>
+            <a:endParaRPr lang="en-US"/>
+          </a:p>
+        </p:txBody>
+      </p:sp>
+      <p:sp>
+        <p:nvSpPr>
+          <p:cNvPr id="43" name="Oval 42">
+            <a:extLst>
+              <a:ext uri="{FF2B5EF4-FFF2-40B4-BE49-F238E27FC236}">
+                <a16:creationId xmlns:a16="http://schemas.microsoft.com/office/drawing/2014/main" id="{763DAF5C-7ECF-B34A-97E7-9E836119DF9B}"/>
+              </a:ext>
+            </a:extLst>
+          </p:cNvPr>
+          <p:cNvSpPr/>
+          <p:nvPr/>
+        </p:nvSpPr>
+        <p:spPr>
+          <a:xfrm>
+            <a:off x="7101933" y="2234770"/>
+            <a:ext cx="111873" cy="101703"/>
+          </a:xfrm>
+          <a:prstGeom prst="ellipse">
+            <a:avLst/>
+          </a:prstGeom>
+          <a:ln w="3175">
+            <a:solidFill>
+              <a:schemeClr val="accent1"/>
+            </a:solidFill>
+          </a:ln>
+        </p:spPr>
+        <p:style>
+          <a:lnRef idx="2">
+            <a:schemeClr val="accent1">
+              <a:shade val="50000"/>
+            </a:schemeClr>
+          </a:lnRef>
+          <a:fillRef idx="1">
+            <a:schemeClr val="accent1"/>
+          </a:fillRef>
+          <a:effectRef idx="0">
+            <a:schemeClr val="accent1"/>
+          </a:effectRef>
+          <a:fontRef idx="minor">
+            <a:schemeClr val="lt1"/>
+          </a:fontRef>
+        </p:style>
+        <p:txBody>
+          <a:bodyPr rtlCol="0" anchor="ctr"/>
+          <a:lstStyle/>
+          <a:p>
+            <a:pPr algn="ctr"/>
+            <a:endParaRPr lang="de-DE"/>
+          </a:p>
+        </p:txBody>
+      </p:sp>
+      <p:sp>
+        <p:nvSpPr>
+          <p:cNvPr id="45" name="Oval 44">
+            <a:extLst>
+              <a:ext uri="{FF2B5EF4-FFF2-40B4-BE49-F238E27FC236}">
+                <a16:creationId xmlns:a16="http://schemas.microsoft.com/office/drawing/2014/main" id="{DB55D443-BA25-3B41-8ECF-9D3D2191A651}"/>
+              </a:ext>
+            </a:extLst>
+          </p:cNvPr>
+          <p:cNvSpPr/>
+          <p:nvPr/>
+        </p:nvSpPr>
+        <p:spPr>
+          <a:xfrm>
+            <a:off x="6482976" y="2234759"/>
+            <a:ext cx="111873" cy="101703"/>
+          </a:xfrm>
+          <a:prstGeom prst="ellipse">
+            <a:avLst/>
+          </a:prstGeom>
+          <a:ln w="3175">
+            <a:solidFill>
+              <a:schemeClr val="accent1"/>
+            </a:solidFill>
+          </a:ln>
+        </p:spPr>
+        <p:style>
+          <a:lnRef idx="2">
+            <a:schemeClr val="accent1">
+              <a:shade val="50000"/>
+            </a:schemeClr>
+          </a:lnRef>
+          <a:fillRef idx="1">
+            <a:schemeClr val="accent1"/>
+          </a:fillRef>
+          <a:effectRef idx="0">
+            <a:schemeClr val="accent1"/>
+          </a:effectRef>
+          <a:fontRef idx="minor">
+            <a:schemeClr val="lt1"/>
+          </a:fontRef>
+        </p:style>
+        <p:txBody>
+          <a:bodyPr rtlCol="0" anchor="ctr"/>
+          <a:lstStyle/>
+          <a:p>
+            <a:pPr algn="ctr"/>
+            <a:endParaRPr lang="de-DE"/>
+          </a:p>
+        </p:txBody>
+      </p:sp>
+      <p:sp>
+        <p:nvSpPr>
+          <p:cNvPr id="46" name="Rectangle 45">
+            <a:extLst>
+              <a:ext uri="{FF2B5EF4-FFF2-40B4-BE49-F238E27FC236}">
+                <a16:creationId xmlns:a16="http://schemas.microsoft.com/office/drawing/2014/main" id="{09A6809A-D551-5345-9BBC-119DE5EAD72E}"/>
+              </a:ext>
+            </a:extLst>
+          </p:cNvPr>
+          <p:cNvSpPr/>
+          <p:nvPr/>
+        </p:nvSpPr>
+        <p:spPr>
+          <a:xfrm>
+            <a:off x="6208378" y="2588470"/>
+            <a:ext cx="620889" cy="620889"/>
+          </a:xfrm>
+          <a:prstGeom prst="rect">
+            <a:avLst/>
+          </a:prstGeom>
+          <a:noFill/>
+          <a:ln w="3175">
+            <a:solidFill>
+              <a:schemeClr val="accent1"/>
+            </a:solidFill>
+          </a:ln>
+        </p:spPr>
+        <p:style>
+          <a:lnRef idx="2">
+            <a:schemeClr val="accent1">
+              <a:shade val="50000"/>
+            </a:schemeClr>
+          </a:lnRef>
+          <a:fillRef idx="1">
+            <a:schemeClr val="accent1"/>
+          </a:fillRef>
+          <a:effectRef idx="0">
+            <a:schemeClr val="accent1"/>
+          </a:effectRef>
+          <a:fontRef idx="minor">
+            <a:schemeClr val="lt1"/>
+          </a:fontRef>
+        </p:style>
+        <p:txBody>
+          <a:bodyPr rtlCol="0" anchor="ctr"/>
+          <a:lstStyle/>
+          <a:p>
+            <a:pPr algn="ctr"/>
+            <a:endParaRPr lang="en-US"/>
+          </a:p>
+        </p:txBody>
+      </p:sp>
+      <p:sp>
+        <p:nvSpPr>
+          <p:cNvPr id="47" name="Rectangle 46">
+            <a:extLst>
+              <a:ext uri="{FF2B5EF4-FFF2-40B4-BE49-F238E27FC236}">
+                <a16:creationId xmlns:a16="http://schemas.microsoft.com/office/drawing/2014/main" id="{8251601A-B4CA-6042-9B18-2DFAF6CAC19C}"/>
+              </a:ext>
+            </a:extLst>
+          </p:cNvPr>
+          <p:cNvSpPr/>
+          <p:nvPr/>
+        </p:nvSpPr>
+        <p:spPr>
+          <a:xfrm>
+            <a:off x="6823181" y="2585752"/>
+            <a:ext cx="620889" cy="620889"/>
+          </a:xfrm>
+          <a:prstGeom prst="rect">
+            <a:avLst/>
+          </a:prstGeom>
+          <a:noFill/>
+          <a:ln w="3175">
+            <a:solidFill>
+              <a:schemeClr val="accent1"/>
+            </a:solidFill>
+          </a:ln>
+        </p:spPr>
+        <p:style>
+          <a:lnRef idx="2">
+            <a:schemeClr val="accent1">
+              <a:shade val="50000"/>
+            </a:schemeClr>
+          </a:lnRef>
+          <a:fillRef idx="1">
+            <a:schemeClr val="accent1"/>
+          </a:fillRef>
+          <a:effectRef idx="0">
+            <a:schemeClr val="accent1"/>
+          </a:effectRef>
+          <a:fontRef idx="minor">
+            <a:schemeClr val="lt1"/>
+          </a:fontRef>
+        </p:style>
+        <p:txBody>
+          <a:bodyPr rtlCol="0" anchor="ctr"/>
+          <a:lstStyle/>
+          <a:p>
+            <a:pPr algn="ctr"/>
+            <a:endParaRPr lang="en-US"/>
+          </a:p>
+        </p:txBody>
+      </p:sp>
+      <p:sp>
+        <p:nvSpPr>
+          <p:cNvPr id="50" name="Oval 49">
+            <a:extLst>
+              <a:ext uri="{FF2B5EF4-FFF2-40B4-BE49-F238E27FC236}">
+                <a16:creationId xmlns:a16="http://schemas.microsoft.com/office/drawing/2014/main" id="{9D45AA71-7147-1B43-B41A-C848DA37A75F}"/>
+              </a:ext>
+            </a:extLst>
+          </p:cNvPr>
+          <p:cNvSpPr/>
+          <p:nvPr/>
+        </p:nvSpPr>
+        <p:spPr>
+          <a:xfrm>
+            <a:off x="7100849" y="2839199"/>
+            <a:ext cx="111873" cy="101703"/>
+          </a:xfrm>
+          <a:prstGeom prst="ellipse">
+            <a:avLst/>
+          </a:prstGeom>
+          <a:ln w="3175">
+            <a:solidFill>
+              <a:schemeClr val="accent1"/>
+            </a:solidFill>
+          </a:ln>
+        </p:spPr>
+        <p:style>
+          <a:lnRef idx="2">
+            <a:schemeClr val="accent1">
+              <a:shade val="50000"/>
+            </a:schemeClr>
+          </a:lnRef>
+          <a:fillRef idx="1">
+            <a:schemeClr val="accent1"/>
+          </a:fillRef>
+          <a:effectRef idx="0">
+            <a:schemeClr val="accent1"/>
+          </a:effectRef>
+          <a:fontRef idx="minor">
+            <a:schemeClr val="lt1"/>
+          </a:fontRef>
+        </p:style>
+        <p:txBody>
+          <a:bodyPr rtlCol="0" anchor="ctr"/>
+          <a:lstStyle/>
+          <a:p>
+            <a:pPr algn="ctr"/>
+            <a:endParaRPr lang="de-DE"/>
+          </a:p>
+        </p:txBody>
+      </p:sp>
+      <p:sp>
+        <p:nvSpPr>
+          <p:cNvPr id="51" name="Oval 50">
+            <a:extLst>
+              <a:ext uri="{FF2B5EF4-FFF2-40B4-BE49-F238E27FC236}">
+                <a16:creationId xmlns:a16="http://schemas.microsoft.com/office/drawing/2014/main" id="{4A519C81-4020-E544-9591-F0E7C7387DE0}"/>
+              </a:ext>
+            </a:extLst>
+          </p:cNvPr>
+          <p:cNvSpPr/>
+          <p:nvPr/>
+        </p:nvSpPr>
+        <p:spPr>
+          <a:xfrm>
+            <a:off x="6482975" y="2851729"/>
+            <a:ext cx="111873" cy="101703"/>
+          </a:xfrm>
+          <a:prstGeom prst="ellipse">
+            <a:avLst/>
+          </a:prstGeom>
+          <a:ln w="3175">
+            <a:solidFill>
+              <a:schemeClr val="accent1"/>
+            </a:solidFill>
+          </a:ln>
+        </p:spPr>
+        <p:style>
+          <a:lnRef idx="2">
+            <a:schemeClr val="accent1">
+              <a:shade val="50000"/>
+            </a:schemeClr>
+          </a:lnRef>
+          <a:fillRef idx="1">
+            <a:schemeClr val="accent1"/>
+          </a:fillRef>
+          <a:effectRef idx="0">
+            <a:schemeClr val="accent1"/>
+          </a:effectRef>
+          <a:fontRef idx="minor">
+            <a:schemeClr val="lt1"/>
+          </a:fontRef>
+        </p:style>
+        <p:txBody>
+          <a:bodyPr rtlCol="0" anchor="ctr"/>
+          <a:lstStyle/>
+          <a:p>
+            <a:pPr algn="ctr"/>
+            <a:endParaRPr lang="de-DE"/>
+          </a:p>
+        </p:txBody>
+      </p:sp>
+      <p:sp>
+        <p:nvSpPr>
+          <p:cNvPr id="53" name="Oval 52">
+            <a:extLst>
+              <a:ext uri="{FF2B5EF4-FFF2-40B4-BE49-F238E27FC236}">
+                <a16:creationId xmlns:a16="http://schemas.microsoft.com/office/drawing/2014/main" id="{5751660E-140E-0145-851A-CAF8945C4609}"/>
+              </a:ext>
+            </a:extLst>
+          </p:cNvPr>
+          <p:cNvSpPr/>
+          <p:nvPr/>
+        </p:nvSpPr>
+        <p:spPr>
+          <a:xfrm>
+            <a:off x="1206053" y="2886469"/>
+            <a:ext cx="111873" cy="101703"/>
+          </a:xfrm>
+          <a:prstGeom prst="ellipse">
+            <a:avLst/>
+          </a:prstGeom>
+        </p:spPr>
+        <p:style>
+          <a:lnRef idx="2">
+            <a:schemeClr val="accent1">
+              <a:shade val="50000"/>
+            </a:schemeClr>
+          </a:lnRef>
+          <a:fillRef idx="1">
+            <a:schemeClr val="accent1"/>
+          </a:fillRef>
+          <a:effectRef idx="0">
+            <a:schemeClr val="accent1"/>
+          </a:effectRef>
+          <a:fontRef idx="minor">
+            <a:schemeClr val="lt1"/>
+          </a:fontRef>
+        </p:style>
+        <p:txBody>
+          <a:bodyPr rtlCol="0" anchor="ctr"/>
+          <a:lstStyle/>
+          <a:p>
+            <a:pPr algn="ctr"/>
+            <a:endParaRPr lang="de-DE"/>
+          </a:p>
+        </p:txBody>
+      </p:sp>
+      <p:sp>
+        <p:nvSpPr>
+          <p:cNvPr id="54" name="TextBox 53">
+            <a:extLst>
+              <a:ext uri="{FF2B5EF4-FFF2-40B4-BE49-F238E27FC236}">
+                <a16:creationId xmlns:a16="http://schemas.microsoft.com/office/drawing/2014/main" id="{FD20AB59-7596-1E4D-84E1-770249E3B1CE}"/>
+              </a:ext>
+            </a:extLst>
+          </p:cNvPr>
+          <p:cNvSpPr txBox="1"/>
+          <p:nvPr/>
+        </p:nvSpPr>
+        <p:spPr>
+          <a:xfrm>
+            <a:off x="830232" y="2550825"/>
+            <a:ext cx="617477" cy="369332"/>
+          </a:xfrm>
+          <a:prstGeom prst="rect">
+            <a:avLst/>
+          </a:prstGeom>
+          <a:noFill/>
+        </p:spPr>
+        <p:txBody>
+          <a:bodyPr wrap="none" rtlCol="0">
+            <a:spAutoFit/>
+          </a:bodyPr>
+          <a:lstStyle/>
+          <a:p>
+            <a:r>
+              <a:rPr lang="en-US" dirty="0"/>
+              <a:t>(0,0)</a:t>
+            </a:r>
+          </a:p>
+        </p:txBody>
+      </p:sp>
+      <p:sp>
+        <p:nvSpPr>
+          <p:cNvPr id="55" name="Rectangle 54">
+            <a:extLst>
+              <a:ext uri="{FF2B5EF4-FFF2-40B4-BE49-F238E27FC236}">
+                <a16:creationId xmlns:a16="http://schemas.microsoft.com/office/drawing/2014/main" id="{3ECDB614-08E4-B84B-B059-A3A25D9BABF9}"/>
+              </a:ext>
+            </a:extLst>
+          </p:cNvPr>
+          <p:cNvSpPr/>
+          <p:nvPr/>
+        </p:nvSpPr>
+        <p:spPr>
+          <a:xfrm>
+            <a:off x="5867441" y="3925438"/>
+            <a:ext cx="620889" cy="620889"/>
+          </a:xfrm>
+          <a:prstGeom prst="rect">
+            <a:avLst/>
+          </a:prstGeom>
+          <a:noFill/>
+          <a:ln w="3175">
+            <a:solidFill>
+              <a:schemeClr val="accent1"/>
+            </a:solidFill>
+          </a:ln>
+        </p:spPr>
+        <p:style>
+          <a:lnRef idx="2">
+            <a:schemeClr val="accent1">
+              <a:shade val="50000"/>
+            </a:schemeClr>
+          </a:lnRef>
+          <a:fillRef idx="1">
+            <a:schemeClr val="accent1"/>
+          </a:fillRef>
+          <a:effectRef idx="0">
+            <a:schemeClr val="accent1"/>
+          </a:effectRef>
+          <a:fontRef idx="minor">
+            <a:schemeClr val="lt1"/>
+          </a:fontRef>
+        </p:style>
+        <p:txBody>
+          <a:bodyPr rtlCol="0" anchor="ctr"/>
+          <a:lstStyle/>
+          <a:p>
+            <a:pPr algn="ctr"/>
+            <a:endParaRPr lang="en-US"/>
+          </a:p>
+        </p:txBody>
+      </p:sp>
+      <p:sp>
+        <p:nvSpPr>
+          <p:cNvPr id="56" name="Rectangle 55">
+            <a:extLst>
+              <a:ext uri="{FF2B5EF4-FFF2-40B4-BE49-F238E27FC236}">
+                <a16:creationId xmlns:a16="http://schemas.microsoft.com/office/drawing/2014/main" id="{4D25AA18-E956-3249-A1EB-255C7A94047E}"/>
+              </a:ext>
+            </a:extLst>
+          </p:cNvPr>
+          <p:cNvSpPr/>
+          <p:nvPr/>
+        </p:nvSpPr>
+        <p:spPr>
+          <a:xfrm>
+            <a:off x="6488916" y="3925438"/>
+            <a:ext cx="620889" cy="622866"/>
+          </a:xfrm>
+          <a:prstGeom prst="rect">
+            <a:avLst/>
+          </a:prstGeom>
+          <a:noFill/>
+          <a:ln w="3175">
+            <a:solidFill>
+              <a:schemeClr val="accent1"/>
+            </a:solidFill>
+          </a:ln>
+        </p:spPr>
+        <p:style>
+          <a:lnRef idx="2">
+            <a:schemeClr val="accent1">
+              <a:shade val="50000"/>
+            </a:schemeClr>
+          </a:lnRef>
+          <a:fillRef idx="1">
+            <a:schemeClr val="accent1"/>
+          </a:fillRef>
+          <a:effectRef idx="0">
+            <a:schemeClr val="accent1"/>
+          </a:effectRef>
+          <a:fontRef idx="minor">
+            <a:schemeClr val="lt1"/>
+          </a:fontRef>
+        </p:style>
+        <p:txBody>
+          <a:bodyPr rtlCol="0" anchor="ctr"/>
+          <a:lstStyle/>
+          <a:p>
+            <a:pPr algn="ctr"/>
+            <a:endParaRPr lang="en-US"/>
+          </a:p>
+        </p:txBody>
+      </p:sp>
+      <p:sp>
+        <p:nvSpPr>
+          <p:cNvPr id="57" name="Oval 56">
+            <a:extLst>
+              <a:ext uri="{FF2B5EF4-FFF2-40B4-BE49-F238E27FC236}">
+                <a16:creationId xmlns:a16="http://schemas.microsoft.com/office/drawing/2014/main" id="{344849D5-8831-8A42-B522-DBC05A1B7719}"/>
+              </a:ext>
+            </a:extLst>
+          </p:cNvPr>
+          <p:cNvSpPr/>
+          <p:nvPr/>
+        </p:nvSpPr>
+        <p:spPr>
+          <a:xfrm>
+            <a:off x="6758319" y="4209197"/>
+            <a:ext cx="111873" cy="101703"/>
+          </a:xfrm>
+          <a:prstGeom prst="ellipse">
+            <a:avLst/>
+          </a:prstGeom>
+          <a:ln w="3175">
+            <a:solidFill>
+              <a:schemeClr val="accent1"/>
+            </a:solidFill>
+          </a:ln>
+        </p:spPr>
+        <p:style>
+          <a:lnRef idx="2">
+            <a:schemeClr val="accent1">
+              <a:shade val="50000"/>
+            </a:schemeClr>
+          </a:lnRef>
+          <a:fillRef idx="1">
+            <a:schemeClr val="accent1"/>
+          </a:fillRef>
+          <a:effectRef idx="0">
+            <a:schemeClr val="accent1"/>
+          </a:effectRef>
+          <a:fontRef idx="minor">
+            <a:schemeClr val="lt1"/>
+          </a:fontRef>
+        </p:style>
+        <p:txBody>
+          <a:bodyPr rtlCol="0" anchor="ctr"/>
+          <a:lstStyle/>
+          <a:p>
+            <a:pPr algn="ctr"/>
+            <a:endParaRPr lang="de-DE"/>
+          </a:p>
+        </p:txBody>
+      </p:sp>
+      <p:sp>
+        <p:nvSpPr>
+          <p:cNvPr id="58" name="Oval 57">
+            <a:extLst>
+              <a:ext uri="{FF2B5EF4-FFF2-40B4-BE49-F238E27FC236}">
+                <a16:creationId xmlns:a16="http://schemas.microsoft.com/office/drawing/2014/main" id="{129ADD01-0F5D-BC47-80E5-90FC9622DCE1}"/>
+              </a:ext>
+            </a:extLst>
+          </p:cNvPr>
+          <p:cNvSpPr/>
+          <p:nvPr/>
+        </p:nvSpPr>
+        <p:spPr>
+          <a:xfrm>
+            <a:off x="6139362" y="4197311"/>
+            <a:ext cx="111873" cy="101703"/>
+          </a:xfrm>
+          <a:prstGeom prst="ellipse">
+            <a:avLst/>
+          </a:prstGeom>
+          <a:ln w="3175">
+            <a:solidFill>
+              <a:schemeClr val="accent1"/>
+            </a:solidFill>
+          </a:ln>
+        </p:spPr>
+        <p:style>
+          <a:lnRef idx="2">
+            <a:schemeClr val="accent1">
+              <a:shade val="50000"/>
+            </a:schemeClr>
+          </a:lnRef>
+          <a:fillRef idx="1">
+            <a:schemeClr val="accent1"/>
+          </a:fillRef>
+          <a:effectRef idx="0">
+            <a:schemeClr val="accent1"/>
+          </a:effectRef>
+          <a:fontRef idx="minor">
+            <a:schemeClr val="lt1"/>
+          </a:fontRef>
+        </p:style>
+        <p:txBody>
+          <a:bodyPr rtlCol="0" anchor="ctr"/>
+          <a:lstStyle/>
+          <a:p>
+            <a:pPr algn="ctr"/>
+            <a:endParaRPr lang="de-DE"/>
+          </a:p>
+        </p:txBody>
+      </p:sp>
+      <p:sp>
+        <p:nvSpPr>
+          <p:cNvPr id="63" name="Rectangle 62">
+            <a:extLst>
+              <a:ext uri="{FF2B5EF4-FFF2-40B4-BE49-F238E27FC236}">
+                <a16:creationId xmlns:a16="http://schemas.microsoft.com/office/drawing/2014/main" id="{0606488C-8987-DA49-8D5F-008726E7F71D}"/>
+              </a:ext>
+            </a:extLst>
+          </p:cNvPr>
+          <p:cNvSpPr/>
+          <p:nvPr/>
+        </p:nvSpPr>
+        <p:spPr>
+          <a:xfrm>
+            <a:off x="7110390" y="3925438"/>
+            <a:ext cx="620889" cy="622866"/>
+          </a:xfrm>
+          <a:prstGeom prst="rect">
+            <a:avLst/>
+          </a:prstGeom>
+          <a:noFill/>
+          <a:ln w="3175">
+            <a:solidFill>
+              <a:schemeClr val="accent1"/>
+            </a:solidFill>
+          </a:ln>
+        </p:spPr>
+        <p:style>
+          <a:lnRef idx="2">
+            <a:schemeClr val="accent1">
+              <a:shade val="50000"/>
+            </a:schemeClr>
+          </a:lnRef>
+          <a:fillRef idx="1">
+            <a:schemeClr val="accent1"/>
+          </a:fillRef>
+          <a:effectRef idx="0">
+            <a:schemeClr val="accent1"/>
+          </a:effectRef>
+          <a:fontRef idx="minor">
+            <a:schemeClr val="lt1"/>
+          </a:fontRef>
+        </p:style>
+        <p:txBody>
+          <a:bodyPr rtlCol="0" anchor="ctr"/>
+          <a:lstStyle/>
+          <a:p>
+            <a:pPr algn="ctr"/>
+            <a:endParaRPr lang="en-US"/>
+          </a:p>
+        </p:txBody>
+      </p:sp>
+      <p:sp>
+        <p:nvSpPr>
+          <p:cNvPr id="64" name="Oval 63">
+            <a:extLst>
+              <a:ext uri="{FF2B5EF4-FFF2-40B4-BE49-F238E27FC236}">
+                <a16:creationId xmlns:a16="http://schemas.microsoft.com/office/drawing/2014/main" id="{8E0C95EB-3D0A-C44A-A7B3-FC2063229746}"/>
+              </a:ext>
+            </a:extLst>
+          </p:cNvPr>
+          <p:cNvSpPr/>
+          <p:nvPr/>
+        </p:nvSpPr>
+        <p:spPr>
+          <a:xfrm>
+            <a:off x="7397609" y="4207220"/>
+            <a:ext cx="111873" cy="101703"/>
+          </a:xfrm>
+          <a:prstGeom prst="ellipse">
+            <a:avLst/>
+          </a:prstGeom>
+          <a:ln w="3175">
+            <a:solidFill>
+              <a:schemeClr val="accent1"/>
+            </a:solidFill>
+          </a:ln>
+        </p:spPr>
+        <p:style>
+          <a:lnRef idx="2">
+            <a:schemeClr val="accent1">
+              <a:shade val="50000"/>
+            </a:schemeClr>
+          </a:lnRef>
+          <a:fillRef idx="1">
+            <a:schemeClr val="accent1"/>
+          </a:fillRef>
+          <a:effectRef idx="0">
+            <a:schemeClr val="accent1"/>
+          </a:effectRef>
+          <a:fontRef idx="minor">
+            <a:schemeClr val="lt1"/>
+          </a:fontRef>
+        </p:style>
+        <p:txBody>
+          <a:bodyPr rtlCol="0" anchor="ctr"/>
+          <a:lstStyle/>
+          <a:p>
+            <a:pPr algn="ctr"/>
+            <a:endParaRPr lang="de-DE"/>
+          </a:p>
+        </p:txBody>
+      </p:sp>
+      <p:sp>
+        <p:nvSpPr>
+          <p:cNvPr id="67" name="Rectangle 66">
+            <a:extLst>
+              <a:ext uri="{FF2B5EF4-FFF2-40B4-BE49-F238E27FC236}">
+                <a16:creationId xmlns:a16="http://schemas.microsoft.com/office/drawing/2014/main" id="{EA38448F-0BB0-2B44-81BF-205887D988D5}"/>
+              </a:ext>
+            </a:extLst>
+          </p:cNvPr>
+          <p:cNvSpPr/>
+          <p:nvPr/>
+        </p:nvSpPr>
+        <p:spPr>
+          <a:xfrm>
+            <a:off x="5865466" y="4564728"/>
+            <a:ext cx="620889" cy="620889"/>
+          </a:xfrm>
+          <a:prstGeom prst="rect">
+            <a:avLst/>
+          </a:prstGeom>
+          <a:noFill/>
+          <a:ln w="3175">
+            <a:solidFill>
+              <a:schemeClr val="accent1"/>
+            </a:solidFill>
+          </a:ln>
+        </p:spPr>
+        <p:style>
+          <a:lnRef idx="2">
+            <a:schemeClr val="accent1">
+              <a:shade val="50000"/>
+            </a:schemeClr>
+          </a:lnRef>
+          <a:fillRef idx="1">
+            <a:schemeClr val="accent1"/>
+          </a:fillRef>
+          <a:effectRef idx="0">
+            <a:schemeClr val="accent1"/>
+          </a:effectRef>
+          <a:fontRef idx="minor">
+            <a:schemeClr val="lt1"/>
+          </a:fontRef>
+        </p:style>
+        <p:txBody>
+          <a:bodyPr rtlCol="0" anchor="ctr"/>
+          <a:lstStyle/>
+          <a:p>
+            <a:pPr algn="ctr"/>
+            <a:endParaRPr lang="en-US"/>
+          </a:p>
+        </p:txBody>
+      </p:sp>
+      <p:sp>
+        <p:nvSpPr>
+          <p:cNvPr id="68" name="Rectangle 67">
+            <a:extLst>
+              <a:ext uri="{FF2B5EF4-FFF2-40B4-BE49-F238E27FC236}">
+                <a16:creationId xmlns:a16="http://schemas.microsoft.com/office/drawing/2014/main" id="{1954E40F-5F0E-A641-A378-925AAB1C9E51}"/>
+              </a:ext>
+            </a:extLst>
+          </p:cNvPr>
+          <p:cNvSpPr/>
+          <p:nvPr/>
+        </p:nvSpPr>
+        <p:spPr>
+          <a:xfrm>
+            <a:off x="6486941" y="4564728"/>
+            <a:ext cx="620889" cy="622866"/>
+          </a:xfrm>
+          <a:prstGeom prst="rect">
+            <a:avLst/>
+          </a:prstGeom>
+          <a:noFill/>
+          <a:ln w="3175">
+            <a:solidFill>
+              <a:schemeClr val="accent1"/>
+            </a:solidFill>
+          </a:ln>
+        </p:spPr>
+        <p:style>
+          <a:lnRef idx="2">
+            <a:schemeClr val="accent1">
+              <a:shade val="50000"/>
+            </a:schemeClr>
+          </a:lnRef>
+          <a:fillRef idx="1">
+            <a:schemeClr val="accent1"/>
+          </a:fillRef>
+          <a:effectRef idx="0">
+            <a:schemeClr val="accent1"/>
+          </a:effectRef>
+          <a:fontRef idx="minor">
+            <a:schemeClr val="lt1"/>
+          </a:fontRef>
+        </p:style>
+        <p:txBody>
+          <a:bodyPr rtlCol="0" anchor="ctr"/>
+          <a:lstStyle/>
+          <a:p>
+            <a:pPr algn="ctr"/>
+            <a:endParaRPr lang="en-US"/>
+          </a:p>
+        </p:txBody>
+      </p:sp>
+      <p:sp>
+        <p:nvSpPr>
+          <p:cNvPr id="69" name="Oval 68">
+            <a:extLst>
+              <a:ext uri="{FF2B5EF4-FFF2-40B4-BE49-F238E27FC236}">
+                <a16:creationId xmlns:a16="http://schemas.microsoft.com/office/drawing/2014/main" id="{244255EB-2C4B-1542-B222-2DFF04D842CE}"/>
+              </a:ext>
+            </a:extLst>
+          </p:cNvPr>
+          <p:cNvSpPr/>
+          <p:nvPr/>
+        </p:nvSpPr>
+        <p:spPr>
+          <a:xfrm>
+            <a:off x="6756344" y="4848487"/>
+            <a:ext cx="111873" cy="101703"/>
+          </a:xfrm>
+          <a:prstGeom prst="ellipse">
+            <a:avLst/>
+          </a:prstGeom>
+          <a:ln w="3175">
+            <a:solidFill>
+              <a:schemeClr val="accent1"/>
+            </a:solidFill>
+          </a:ln>
+        </p:spPr>
+        <p:style>
+          <a:lnRef idx="2">
+            <a:schemeClr val="accent1">
+              <a:shade val="50000"/>
+            </a:schemeClr>
+          </a:lnRef>
+          <a:fillRef idx="1">
+            <a:schemeClr val="accent1"/>
+          </a:fillRef>
+          <a:effectRef idx="0">
+            <a:schemeClr val="accent1"/>
+          </a:effectRef>
+          <a:fontRef idx="minor">
+            <a:schemeClr val="lt1"/>
+          </a:fontRef>
+        </p:style>
+        <p:txBody>
+          <a:bodyPr rtlCol="0" anchor="ctr"/>
+          <a:lstStyle/>
+          <a:p>
+            <a:pPr algn="ctr"/>
+            <a:endParaRPr lang="de-DE"/>
+          </a:p>
+        </p:txBody>
+      </p:sp>
+      <p:sp>
+        <p:nvSpPr>
+          <p:cNvPr id="70" name="Oval 69">
+            <a:extLst>
+              <a:ext uri="{FF2B5EF4-FFF2-40B4-BE49-F238E27FC236}">
+                <a16:creationId xmlns:a16="http://schemas.microsoft.com/office/drawing/2014/main" id="{AB561325-B46C-8E47-A8C9-668BFE6A6976}"/>
+              </a:ext>
+            </a:extLst>
+          </p:cNvPr>
+          <p:cNvSpPr/>
+          <p:nvPr/>
+        </p:nvSpPr>
+        <p:spPr>
+          <a:xfrm>
+            <a:off x="6137387" y="4836601"/>
+            <a:ext cx="111873" cy="101703"/>
+          </a:xfrm>
+          <a:prstGeom prst="ellipse">
+            <a:avLst/>
+          </a:prstGeom>
+          <a:ln w="3175">
+            <a:solidFill>
+              <a:schemeClr val="accent1"/>
+            </a:solidFill>
+          </a:ln>
+        </p:spPr>
+        <p:style>
+          <a:lnRef idx="2">
+            <a:schemeClr val="accent1">
+              <a:shade val="50000"/>
+            </a:schemeClr>
+          </a:lnRef>
+          <a:fillRef idx="1">
+            <a:schemeClr val="accent1"/>
+          </a:fillRef>
+          <a:effectRef idx="0">
+            <a:schemeClr val="accent1"/>
+          </a:effectRef>
+          <a:fontRef idx="minor">
+            <a:schemeClr val="lt1"/>
+          </a:fontRef>
+        </p:style>
+        <p:txBody>
+          <a:bodyPr rtlCol="0" anchor="ctr"/>
+          <a:lstStyle/>
+          <a:p>
+            <a:pPr algn="ctr"/>
+            <a:endParaRPr lang="de-DE"/>
+          </a:p>
+        </p:txBody>
+      </p:sp>
+      <p:sp>
+        <p:nvSpPr>
+          <p:cNvPr id="71" name="Rectangle 70">
+            <a:extLst>
+              <a:ext uri="{FF2B5EF4-FFF2-40B4-BE49-F238E27FC236}">
+                <a16:creationId xmlns:a16="http://schemas.microsoft.com/office/drawing/2014/main" id="{29A5EAAB-8EE9-AE4B-AADF-6E3893BDBD00}"/>
+              </a:ext>
+            </a:extLst>
+          </p:cNvPr>
+          <p:cNvSpPr/>
+          <p:nvPr/>
+        </p:nvSpPr>
+        <p:spPr>
+          <a:xfrm>
+            <a:off x="7108415" y="4564728"/>
+            <a:ext cx="620889" cy="622866"/>
+          </a:xfrm>
+          <a:prstGeom prst="rect">
+            <a:avLst/>
+          </a:prstGeom>
+          <a:noFill/>
+          <a:ln w="3175">
+            <a:solidFill>
+              <a:schemeClr val="accent1"/>
+            </a:solidFill>
+          </a:ln>
+        </p:spPr>
+        <p:style>
+          <a:lnRef idx="2">
+            <a:schemeClr val="accent1">
+              <a:shade val="50000"/>
+            </a:schemeClr>
+          </a:lnRef>
+          <a:fillRef idx="1">
+            <a:schemeClr val="accent1"/>
+          </a:fillRef>
+          <a:effectRef idx="0">
+            <a:schemeClr val="accent1"/>
+          </a:effectRef>
+          <a:fontRef idx="minor">
+            <a:schemeClr val="lt1"/>
+          </a:fontRef>
+        </p:style>
+        <p:txBody>
+          <a:bodyPr rtlCol="0" anchor="ctr"/>
+          <a:lstStyle/>
+          <a:p>
+            <a:pPr algn="ctr"/>
+            <a:endParaRPr lang="en-US"/>
+          </a:p>
+        </p:txBody>
+      </p:sp>
+      <p:sp>
+        <p:nvSpPr>
+          <p:cNvPr id="72" name="Oval 71">
+            <a:extLst>
+              <a:ext uri="{FF2B5EF4-FFF2-40B4-BE49-F238E27FC236}">
+                <a16:creationId xmlns:a16="http://schemas.microsoft.com/office/drawing/2014/main" id="{E30368C8-6B5A-6C49-99E4-80CA4C716B2D}"/>
+              </a:ext>
+            </a:extLst>
+          </p:cNvPr>
+          <p:cNvSpPr/>
+          <p:nvPr/>
+        </p:nvSpPr>
+        <p:spPr>
+          <a:xfrm>
+            <a:off x="7395634" y="4846510"/>
+            <a:ext cx="111873" cy="101703"/>
+          </a:xfrm>
+          <a:prstGeom prst="ellipse">
+            <a:avLst/>
+          </a:prstGeom>
+          <a:ln w="3175">
+            <a:solidFill>
+              <a:schemeClr val="accent1"/>
+            </a:solidFill>
+          </a:ln>
+        </p:spPr>
+        <p:style>
+          <a:lnRef idx="2">
+            <a:schemeClr val="accent1">
+              <a:shade val="50000"/>
+            </a:schemeClr>
+          </a:lnRef>
+          <a:fillRef idx="1">
+            <a:schemeClr val="accent1"/>
+          </a:fillRef>
+          <a:effectRef idx="0">
+            <a:schemeClr val="accent1"/>
+          </a:effectRef>
+          <a:fontRef idx="minor">
+            <a:schemeClr val="lt1"/>
+          </a:fontRef>
+        </p:style>
+        <p:txBody>
+          <a:bodyPr rtlCol="0" anchor="ctr"/>
+          <a:lstStyle/>
+          <a:p>
+            <a:pPr algn="ctr"/>
+            <a:endParaRPr lang="de-DE"/>
+          </a:p>
+        </p:txBody>
+      </p:sp>
+      <p:sp>
+        <p:nvSpPr>
+          <p:cNvPr id="4" name="Rectangle 3">
+            <a:extLst>
+              <a:ext uri="{FF2B5EF4-FFF2-40B4-BE49-F238E27FC236}">
+                <a16:creationId xmlns:a16="http://schemas.microsoft.com/office/drawing/2014/main" id="{BC891B27-A604-284A-B6C8-ABBE46C05EA8}"/>
+              </a:ext>
+            </a:extLst>
+          </p:cNvPr>
+          <p:cNvSpPr/>
+          <p:nvPr/>
+        </p:nvSpPr>
+        <p:spPr>
+          <a:xfrm>
+            <a:off x="5865465" y="3935565"/>
+            <a:ext cx="1871519" cy="1250269"/>
+          </a:xfrm>
+          <a:prstGeom prst="rect">
+            <a:avLst/>
+          </a:prstGeom>
+          <a:solidFill>
+            <a:schemeClr val="accent1">
+              <a:alpha val="46000"/>
+            </a:schemeClr>
+          </a:solidFill>
+        </p:spPr>
+        <p:style>
+          <a:lnRef idx="2">
+            <a:schemeClr val="accent1">
+              <a:shade val="50000"/>
+            </a:schemeClr>
+          </a:lnRef>
+          <a:fillRef idx="1">
+            <a:schemeClr val="accent1"/>
+          </a:fillRef>
+          <a:effectRef idx="0">
+            <a:schemeClr val="accent1"/>
+          </a:effectRef>
+          <a:fontRef idx="minor">
+            <a:schemeClr val="lt1"/>
+          </a:fontRef>
+        </p:style>
+        <p:txBody>
+          <a:bodyPr rtlCol="0" anchor="ctr"/>
+          <a:lstStyle/>
+          <a:p>
+            <a:pPr algn="ctr"/>
+            <a:endParaRPr lang="de-DE" dirty="0"/>
+          </a:p>
+        </p:txBody>
+      </p:sp>
+    </p:spTree>
+    <p:extLst>
+      <p:ext uri="{BB962C8B-B14F-4D97-AF65-F5344CB8AC3E}">
+        <p14:creationId xmlns:p14="http://schemas.microsoft.com/office/powerpoint/2010/main" val="3647780881"/>
+      </p:ext>
+    </p:extLst>
+  </p:cSld>
+  <p:clrMapOvr>
+    <a:masterClrMapping/>
+  </p:clrMapOvr>
+</p:sld>
+</file>
+
+<file path=ppt/slides/slide2.xml><?xml version="1.0" encoding="utf-8"?>
+<p:sld xmlns:a="http://schemas.openxmlformats.org/drawingml/2006/main" xmlns:r="http://schemas.openxmlformats.org/officeDocument/2006/relationships" xmlns:p="http://schemas.openxmlformats.org/presentationml/2006/main">
+  <p:cSld>
+    <p:spTree>
+      <p:nvGrpSpPr>
+        <p:cNvPr id="1" name=""/>
+        <p:cNvGrpSpPr/>
+        <p:nvPr/>
+      </p:nvGrpSpPr>
+      <p:grpSpPr>
+        <a:xfrm>
+          <a:off x="0" y="0"/>
+          <a:ext cx="0" cy="0"/>
+          <a:chOff x="0" y="0"/>
+          <a:chExt cx="0" cy="0"/>
+        </a:xfrm>
+      </p:grpSpPr>
+      <p:sp>
+        <p:nvSpPr>
+          <p:cNvPr id="8" name="Rectangle 7"/>
+          <p:cNvSpPr/>
+          <p:nvPr/>
+        </p:nvSpPr>
+        <p:spPr>
+          <a:xfrm>
+            <a:off x="6211055" y="1962886"/>
+            <a:ext cx="620889" cy="620889"/>
+          </a:xfrm>
+          <a:prstGeom prst="rect">
+            <a:avLst/>
+          </a:prstGeom>
+          <a:noFill/>
+          <a:ln w="3175">
+            <a:solidFill>
+              <a:schemeClr val="accent1"/>
+            </a:solidFill>
+          </a:ln>
+        </p:spPr>
+        <p:style>
+          <a:lnRef idx="2">
+            <a:schemeClr val="accent1">
+              <a:shade val="50000"/>
+            </a:schemeClr>
+          </a:lnRef>
+          <a:fillRef idx="1">
+            <a:schemeClr val="accent1"/>
+          </a:fillRef>
+          <a:effectRef idx="0">
+            <a:schemeClr val="accent1"/>
+          </a:effectRef>
+          <a:fontRef idx="minor">
+            <a:schemeClr val="lt1"/>
+          </a:fontRef>
+        </p:style>
+        <p:txBody>
+          <a:bodyPr rtlCol="0" anchor="ctr"/>
+          <a:lstStyle/>
+          <a:p>
+            <a:pPr algn="ctr"/>
+            <a:endParaRPr lang="en-US"/>
+          </a:p>
+        </p:txBody>
+      </p:sp>
+      <p:cxnSp>
+        <p:nvCxnSpPr>
+          <p:cNvPr id="10" name="Straight Connector 9"/>
+          <p:cNvCxnSpPr/>
+          <p:nvPr/>
+        </p:nvCxnSpPr>
+        <p:spPr>
+          <a:xfrm flipH="1" flipV="1">
+            <a:off x="6070907" y="2243054"/>
+            <a:ext cx="11289" cy="694267"/>
+          </a:xfrm>
+          <a:prstGeom prst="line">
+            <a:avLst/>
+          </a:prstGeom>
+          <a:ln w="28575">
+            <a:headEnd type="arrow" w="med" len="med"/>
+            <a:tailEnd type="arrow" w="med" len="med"/>
+          </a:ln>
+        </p:spPr>
+        <p:style>
+          <a:lnRef idx="1">
+            <a:schemeClr val="accent1"/>
+          </a:lnRef>
+          <a:fillRef idx="0">
+            <a:schemeClr val="accent1"/>
+          </a:fillRef>
+          <a:effectRef idx="0">
+            <a:schemeClr val="accent1"/>
+          </a:effectRef>
+          <a:fontRef idx="minor">
+            <a:schemeClr val="tx1"/>
+          </a:fontRef>
+        </p:style>
+      </p:cxnSp>
+      <p:sp>
+        <p:nvSpPr>
+          <p:cNvPr id="12" name="TextBox 11"/>
+          <p:cNvSpPr txBox="1"/>
+          <p:nvPr/>
+        </p:nvSpPr>
+        <p:spPr>
+          <a:xfrm rot="16200000">
+            <a:off x="5158612" y="2384378"/>
+            <a:ext cx="1183337" cy="369332"/>
+          </a:xfrm>
+          <a:prstGeom prst="rect">
+            <a:avLst/>
+          </a:prstGeom>
+          <a:noFill/>
+        </p:spPr>
+        <p:txBody>
+          <a:bodyPr wrap="none" rtlCol="0">
+            <a:spAutoFit/>
+          </a:bodyPr>
+          <a:lstStyle/>
+          <a:p>
+            <a:r>
+              <a:rPr lang="en-US" dirty="0"/>
+              <a:t>Spacing </a:t>
+            </a:r>
+            <a:r>
+              <a:rPr lang="en-US" dirty="0" err="1"/>
+              <a:t>dy</a:t>
+            </a:r>
+            <a:endParaRPr lang="en-US" dirty="0"/>
+          </a:p>
+        </p:txBody>
+      </p:sp>
+      <p:sp>
+        <p:nvSpPr>
+          <p:cNvPr id="13" name="TextBox 12"/>
+          <p:cNvSpPr txBox="1"/>
+          <p:nvPr/>
+        </p:nvSpPr>
+        <p:spPr>
+          <a:xfrm>
+            <a:off x="6290693" y="1317648"/>
+            <a:ext cx="1178528" cy="369332"/>
+          </a:xfrm>
+          <a:prstGeom prst="rect">
+            <a:avLst/>
+          </a:prstGeom>
+          <a:noFill/>
+        </p:spPr>
+        <p:txBody>
+          <a:bodyPr wrap="none" rtlCol="0">
+            <a:spAutoFit/>
+          </a:bodyPr>
+          <a:lstStyle/>
+          <a:p>
+            <a:r>
+              <a:rPr lang="en-US" dirty="0"/>
+              <a:t>Spacing dx</a:t>
+            </a:r>
+          </a:p>
+        </p:txBody>
+      </p:sp>
+      <p:cxnSp>
+        <p:nvCxnSpPr>
+          <p:cNvPr id="18" name="Straight Connector 17"/>
+          <p:cNvCxnSpPr/>
+          <p:nvPr/>
+        </p:nvCxnSpPr>
+        <p:spPr>
+          <a:xfrm>
+            <a:off x="5851794" y="3757435"/>
+            <a:ext cx="1885191" cy="0"/>
+          </a:xfrm>
+          <a:prstGeom prst="line">
+            <a:avLst/>
+          </a:prstGeom>
+          <a:ln w="28575">
+            <a:headEnd type="arrow" w="med" len="med"/>
+            <a:tailEnd type="arrow" w="med" len="med"/>
+          </a:ln>
+        </p:spPr>
+        <p:style>
+          <a:lnRef idx="1">
+            <a:schemeClr val="accent1"/>
+          </a:lnRef>
+          <a:fillRef idx="0">
+            <a:schemeClr val="accent1"/>
+          </a:fillRef>
+          <a:effectRef idx="0">
+            <a:schemeClr val="accent1"/>
+          </a:effectRef>
+          <a:fontRef idx="minor">
+            <a:schemeClr val="tx1"/>
+          </a:fontRef>
+        </p:style>
+      </p:cxnSp>
+      <p:sp>
+        <p:nvSpPr>
+          <p:cNvPr id="19" name="TextBox 18"/>
+          <p:cNvSpPr txBox="1"/>
+          <p:nvPr/>
+        </p:nvSpPr>
+        <p:spPr>
+          <a:xfrm>
+            <a:off x="6446463" y="3412258"/>
+            <a:ext cx="575799" cy="369332"/>
+          </a:xfrm>
+          <a:prstGeom prst="rect">
+            <a:avLst/>
+          </a:prstGeom>
+          <a:noFill/>
+        </p:spPr>
+        <p:txBody>
+          <a:bodyPr wrap="none" rtlCol="0">
+            <a:spAutoFit/>
+          </a:bodyPr>
+          <a:lstStyle/>
+          <a:p>
+            <a:r>
+              <a:rPr lang="en-US" dirty="0"/>
+              <a:t>3 dx</a:t>
+            </a:r>
+          </a:p>
+        </p:txBody>
+      </p:sp>
+      <p:cxnSp>
+        <p:nvCxnSpPr>
+          <p:cNvPr id="15" name="Straight Connector 14"/>
+          <p:cNvCxnSpPr/>
+          <p:nvPr/>
+        </p:nvCxnSpPr>
+        <p:spPr>
+          <a:xfrm flipV="1">
+            <a:off x="6521499" y="1776435"/>
+            <a:ext cx="632177" cy="7924"/>
+          </a:xfrm>
+          <a:prstGeom prst="line">
+            <a:avLst/>
+          </a:prstGeom>
+          <a:ln w="28575">
+            <a:headEnd type="arrow" w="med" len="med"/>
+            <a:tailEnd type="arrow" w="med" len="med"/>
+          </a:ln>
+        </p:spPr>
+        <p:style>
+          <a:lnRef idx="1">
+            <a:schemeClr val="accent1"/>
+          </a:lnRef>
+          <a:fillRef idx="0">
+            <a:schemeClr val="accent1"/>
+          </a:fillRef>
+          <a:effectRef idx="0">
+            <a:schemeClr val="accent1"/>
+          </a:effectRef>
+          <a:fontRef idx="minor">
+            <a:schemeClr val="tx1"/>
+          </a:fontRef>
+        </p:style>
+      </p:cxnSp>
+      <mc:AlternateContent xmlns:mc="http://schemas.openxmlformats.org/markup-compatibility/2006" xmlns:a14="http://schemas.microsoft.com/office/drawing/2010/main">
+        <mc:Choice Requires="a14">
+          <p:sp>
+            <p:nvSpPr>
+              <p:cNvPr id="32" name="TextBox 31"/>
+              <p:cNvSpPr txBox="1"/>
+              <p:nvPr/>
+            </p:nvSpPr>
+            <p:spPr>
+              <a:xfrm>
+                <a:off x="5647731" y="5397351"/>
+                <a:ext cx="2350900" cy="369332"/>
+              </a:xfrm>
+              <a:prstGeom prst="rect">
+                <a:avLst/>
+              </a:prstGeom>
+              <a:noFill/>
+            </p:spPr>
+            <p:txBody>
+              <a:bodyPr wrap="none" rtlCol="0">
+                <a:spAutoFit/>
+              </a:bodyPr>
+              <a:lstStyle/>
+              <a:p>
+                <a:pPr/>
+                <a14:m>
+                  <m:oMathPara xmlns:m="http://schemas.openxmlformats.org/officeDocument/2006/math">
+                    <m:oMathParaPr>
+                      <m:jc m:val="centerGroup"/>
+                    </m:oMathParaPr>
+                    <m:oMath xmlns:m="http://schemas.openxmlformats.org/officeDocument/2006/math">
+                      <m:r>
+                        <a:rPr lang="en-US" i="1" dirty="0" smtClean="0">
+                          <a:latin typeface="Cambria Math" panose="02040503050406030204" pitchFamily="18" charset="0"/>
+                        </a:rPr>
+                        <m:t>𝐴</m:t>
+                      </m:r>
+                      <m:r>
+                        <a:rPr lang="en-US" b="0" i="1" dirty="0" smtClean="0">
+                          <a:latin typeface="Cambria Math" panose="02040503050406030204" pitchFamily="18" charset="0"/>
+                        </a:rPr>
+                        <m:t>𝑟𝑒𝑎</m:t>
+                      </m:r>
+                      <m:r>
+                        <a:rPr lang="en-US" i="1" dirty="0" smtClean="0">
+                          <a:latin typeface="Cambria Math" panose="02040503050406030204" pitchFamily="18" charset="0"/>
+                        </a:rPr>
+                        <m:t> = 3 </m:t>
+                      </m:r>
+                      <m:r>
+                        <a:rPr lang="en-US" i="1" dirty="0" smtClean="0">
+                          <a:latin typeface="Cambria Math" panose="02040503050406030204" pitchFamily="18" charset="0"/>
+                        </a:rPr>
+                        <m:t>𝑑𝑥</m:t>
+                      </m:r>
+                      <m:r>
+                        <a:rPr lang="en-US" i="1" dirty="0">
+                          <a:latin typeface="Cambria Math" panose="02040503050406030204" pitchFamily="18" charset="0"/>
+                        </a:rPr>
+                        <m:t> </m:t>
+                      </m:r>
+                      <m:r>
+                        <a:rPr lang="en-US" i="1" dirty="0" smtClean="0">
+                          <a:latin typeface="Cambria Math" panose="02040503050406030204" pitchFamily="18" charset="0"/>
+                        </a:rPr>
+                        <m:t>∗ 2 </m:t>
+                      </m:r>
+                      <m:r>
+                        <a:rPr lang="en-US" i="1" dirty="0" err="1" smtClean="0">
+                          <a:latin typeface="Cambria Math" panose="02040503050406030204" pitchFamily="18" charset="0"/>
+                        </a:rPr>
+                        <m:t>𝑑𝑦</m:t>
+                      </m:r>
+                    </m:oMath>
+                  </m:oMathPara>
+                </a14:m>
+                <a:endParaRPr lang="en-US" dirty="0"/>
+              </a:p>
+            </p:txBody>
+          </p:sp>
+        </mc:Choice>
+        <mc:Fallback xmlns="">
+          <p:sp>
+            <p:nvSpPr>
+              <p:cNvPr id="32" name="TextBox 31"/>
+              <p:cNvSpPr txBox="1">
+                <a:spLocks noRot="1" noChangeAspect="1" noMove="1" noResize="1" noEditPoints="1" noAdjustHandles="1" noChangeArrowheads="1" noChangeShapeType="1" noTextEdit="1"/>
+              </p:cNvSpPr>
+              <p:nvPr/>
+            </p:nvSpPr>
+            <p:spPr>
+              <a:xfrm>
+                <a:off x="5647731" y="5397351"/>
+                <a:ext cx="2350900" cy="369332"/>
+              </a:xfrm>
+              <a:prstGeom prst="rect">
+                <a:avLst/>
+              </a:prstGeom>
+              <a:blipFill>
+                <a:blip r:embed="rId3"/>
+                <a:stretch>
+                  <a:fillRect b="-13333"/>
                 </a:stretch>
               </a:blipFill>
             </p:spPr>
@@ -4254,94 +6082,420 @@
           </p:sp>
         </mc:Fallback>
       </mc:AlternateContent>
-      <p:sp>
-        <p:nvSpPr>
-          <p:cNvPr id="21" name="Rectangle 20">
+      <p:cxnSp>
+        <p:nvCxnSpPr>
+          <p:cNvPr id="33" name="Straight Connector 32"/>
+          <p:cNvCxnSpPr/>
+          <p:nvPr/>
+        </p:nvCxnSpPr>
+        <p:spPr>
+          <a:xfrm flipH="1">
+            <a:off x="5685051" y="3909835"/>
+            <a:ext cx="3532" cy="1319514"/>
+          </a:xfrm>
+          <a:prstGeom prst="line">
+            <a:avLst/>
+          </a:prstGeom>
+          <a:ln w="28575">
+            <a:headEnd type="arrow" w="med" len="med"/>
+            <a:tailEnd type="arrow" w="med" len="med"/>
+          </a:ln>
+        </p:spPr>
+        <p:style>
+          <a:lnRef idx="1">
+            <a:schemeClr val="accent1"/>
+          </a:lnRef>
+          <a:fillRef idx="0">
+            <a:schemeClr val="accent1"/>
+          </a:fillRef>
+          <a:effectRef idx="0">
+            <a:schemeClr val="accent1"/>
+          </a:effectRef>
+          <a:fontRef idx="minor">
+            <a:schemeClr val="tx1"/>
+          </a:fontRef>
+        </p:style>
+      </p:cxnSp>
+      <p:sp>
+        <p:nvSpPr>
+          <p:cNvPr id="35" name="TextBox 34"/>
+          <p:cNvSpPr txBox="1"/>
+          <p:nvPr/>
+        </p:nvSpPr>
+        <p:spPr>
+          <a:xfrm>
+            <a:off x="4988364" y="4288454"/>
+            <a:ext cx="580608" cy="369332"/>
+          </a:xfrm>
+          <a:prstGeom prst="rect">
+            <a:avLst/>
+          </a:prstGeom>
+          <a:noFill/>
+        </p:spPr>
+        <p:txBody>
+          <a:bodyPr wrap="none" rtlCol="0">
+            <a:spAutoFit/>
+          </a:bodyPr>
+          <a:lstStyle/>
+          <a:p>
+            <a:r>
+              <a:rPr lang="en-US" dirty="0"/>
+              <a:t>2 </a:t>
+            </a:r>
+            <a:r>
+              <a:rPr lang="en-US" dirty="0" err="1"/>
+              <a:t>dy</a:t>
+            </a:r>
+            <a:endParaRPr lang="en-US" dirty="0"/>
+          </a:p>
+        </p:txBody>
+      </p:sp>
+      <p:pic>
+        <p:nvPicPr>
+          <p:cNvPr id="2" name="Picture 1">
             <a:extLst>
               <a:ext uri="{FF2B5EF4-FFF2-40B4-BE49-F238E27FC236}">
-                <a16:creationId xmlns:a16="http://schemas.microsoft.com/office/drawing/2014/main" id="{AFDC82EB-CA73-C543-82FD-EED622F9E2F9}"/>
+                <a16:creationId xmlns:a16="http://schemas.microsoft.com/office/drawing/2014/main" id="{735AA54B-4CF3-3245-83F5-0A757CB942B4}"/>
               </a:ext>
             </a:extLst>
           </p:cNvPr>
-          <p:cNvSpPr/>
-          <p:nvPr/>
-        </p:nvSpPr>
-        <p:spPr>
-          <a:xfrm>
-            <a:off x="2663923" y="3364375"/>
-            <a:ext cx="290955" cy="290330"/>
+          <p:cNvPicPr>
+            <a:picLocks noChangeAspect="1"/>
+          </p:cNvPicPr>
+          <p:nvPr/>
+        </p:nvPicPr>
+        <p:blipFill>
+          <a:blip r:embed="rId4"/>
+          <a:stretch>
+            <a:fillRect/>
+          </a:stretch>
+        </p:blipFill>
+        <p:spPr>
+          <a:xfrm>
+            <a:off x="1271769" y="2941748"/>
+            <a:ext cx="2466807" cy="2466807"/>
           </a:xfrm>
           <a:prstGeom prst="rect">
             <a:avLst/>
           </a:prstGeom>
-          <a:noFill/>
-          <a:ln w="25400">
-            <a:solidFill>
-              <a:schemeClr val="accent1"/>
-            </a:solidFill>
-            <a:prstDash val="sysDash"/>
-          </a:ln>
-        </p:spPr>
-        <p:style>
-          <a:lnRef idx="2">
-            <a:schemeClr val="accent1">
-              <a:shade val="50000"/>
-            </a:schemeClr>
-          </a:lnRef>
-          <a:fillRef idx="1">
-            <a:schemeClr val="accent1"/>
-          </a:fillRef>
-          <a:effectRef idx="0">
-            <a:schemeClr val="accent1"/>
-          </a:effectRef>
-          <a:fontRef idx="minor">
-            <a:schemeClr val="lt1"/>
-          </a:fontRef>
-        </p:style>
-        <p:txBody>
-          <a:bodyPr rtlCol="0" anchor="ctr"/>
-          <a:lstStyle/>
-          <a:p>
-            <a:pPr algn="ctr"/>
-            <a:endParaRPr lang="de-DE" dirty="0"/>
-          </a:p>
-        </p:txBody>
-      </p:sp>
-      <p:sp>
-        <p:nvSpPr>
-          <p:cNvPr id="37" name="TextBox 36">
+        </p:spPr>
+      </p:pic>
+      <p:pic>
+        <p:nvPicPr>
+          <p:cNvPr id="9" name="Picture 8">
             <a:extLst>
               <a:ext uri="{FF2B5EF4-FFF2-40B4-BE49-F238E27FC236}">
-                <a16:creationId xmlns:a16="http://schemas.microsoft.com/office/drawing/2014/main" id="{57BC08D2-26A8-3E40-BB59-5C2B6734CB97}"/>
+                <a16:creationId xmlns:a16="http://schemas.microsoft.com/office/drawing/2014/main" id="{0FA03725-3C6B-E547-96B5-219B4EF4940E}"/>
               </a:ext>
             </a:extLst>
           </p:cNvPr>
-          <p:cNvSpPr txBox="1"/>
-          <p:nvPr/>
-        </p:nvSpPr>
-        <p:spPr>
-          <a:xfrm>
-            <a:off x="1335418" y="1444106"/>
-            <a:ext cx="2657009" cy="369332"/>
+          <p:cNvPicPr>
+            <a:picLocks noChangeAspect="1"/>
+          </p:cNvPicPr>
+          <p:nvPr/>
+        </p:nvPicPr>
+        <p:blipFill rotWithShape="1">
+          <a:blip r:embed="rId5"/>
+          <a:srcRect l="8811" t="11586" r="11204" b="12787"/>
+          <a:stretch/>
+        </p:blipFill>
+        <p:spPr>
+          <a:xfrm>
+            <a:off x="-1655082" y="4363453"/>
+            <a:ext cx="1505044" cy="1403230"/>
           </a:xfrm>
           <a:prstGeom prst="rect">
             <a:avLst/>
           </a:prstGeom>
-          <a:noFill/>
-        </p:spPr>
-        <p:txBody>
-          <a:bodyPr wrap="none" rtlCol="0">
-            <a:spAutoFit/>
-          </a:bodyPr>
-          <a:lstStyle/>
-          <a:p>
-            <a:r>
-              <a:rPr lang="en-US" dirty="0"/>
-              <a:t>Location = Index * Spacing</a:t>
-            </a:r>
-          </a:p>
-        </p:txBody>
-      </p:sp>
+        </p:spPr>
+      </p:pic>
+      <p:cxnSp>
+        <p:nvCxnSpPr>
+          <p:cNvPr id="17" name="Straight Arrow Connector 16">
+            <a:extLst>
+              <a:ext uri="{FF2B5EF4-FFF2-40B4-BE49-F238E27FC236}">
+                <a16:creationId xmlns:a16="http://schemas.microsoft.com/office/drawing/2014/main" id="{41669CEC-161B-CC4F-BF1C-7A07D489D1E7}"/>
+              </a:ext>
+            </a:extLst>
+          </p:cNvPr>
+          <p:cNvCxnSpPr>
+            <a:cxnSpLocks/>
+          </p:cNvCxnSpPr>
+          <p:nvPr/>
+        </p:nvCxnSpPr>
+        <p:spPr>
+          <a:xfrm flipH="1">
+            <a:off x="2798902" y="2435600"/>
+            <a:ext cx="501585" cy="1062974"/>
+          </a:xfrm>
+          <a:prstGeom prst="straightConnector1">
+            <a:avLst/>
+          </a:prstGeom>
+          <a:ln w="25400">
+            <a:solidFill>
+              <a:schemeClr val="accent2"/>
+            </a:solidFill>
+            <a:tailEnd type="triangle"/>
+          </a:ln>
+        </p:spPr>
+        <p:style>
+          <a:lnRef idx="1">
+            <a:schemeClr val="accent1"/>
+          </a:lnRef>
+          <a:fillRef idx="0">
+            <a:schemeClr val="accent1"/>
+          </a:fillRef>
+          <a:effectRef idx="0">
+            <a:schemeClr val="accent1"/>
+          </a:effectRef>
+          <a:fontRef idx="minor">
+            <a:schemeClr val="tx1"/>
+          </a:fontRef>
+        </p:style>
+      </p:cxnSp>
+      <mc:AlternateContent xmlns:mc="http://schemas.openxmlformats.org/markup-compatibility/2006">
+        <mc:Choice xmlns:a14="http://schemas.microsoft.com/office/drawing/2010/main" Requires="a14">
+          <p:sp>
+            <p:nvSpPr>
+              <p:cNvPr id="34" name="TextBox 33">
+                <a:extLst>
+                  <a:ext uri="{FF2B5EF4-FFF2-40B4-BE49-F238E27FC236}">
+                    <a16:creationId xmlns:a16="http://schemas.microsoft.com/office/drawing/2014/main" id="{88460B12-1FCE-8843-9F16-F58CFB2F4128}"/>
+                  </a:ext>
+                </a:extLst>
+              </p:cNvPr>
+              <p:cNvSpPr txBox="1"/>
+              <p:nvPr/>
+            </p:nvSpPr>
+            <p:spPr>
+              <a:xfrm>
+                <a:off x="992382" y="1490679"/>
+                <a:ext cx="3881127" cy="923330"/>
+              </a:xfrm>
+              <a:prstGeom prst="rect">
+                <a:avLst/>
+              </a:prstGeom>
+              <a:noFill/>
+            </p:spPr>
+            <p:txBody>
+              <a:bodyPr wrap="none" rtlCol="0">
+                <a:spAutoFit/>
+              </a:bodyPr>
+              <a:lstStyle/>
+              <a:p>
+                <a:pPr/>
+                <a:r>
+                  <a:rPr lang="en-US" dirty="0">
+                    <a:solidFill>
+                      <a:schemeClr val="accent1"/>
+                    </a:solidFill>
+                  </a:rPr>
+                  <a:t>Index</a:t>
+                </a:r>
+                <a:r>
+                  <a:rPr lang="en-US" dirty="0"/>
+                  <a:t> * </a:t>
+                </a:r>
+                <a:r>
+                  <a:rPr lang="en-US" dirty="0">
+                    <a:solidFill>
+                      <a:schemeClr val="accent6"/>
+                    </a:solidFill>
+                  </a:rPr>
+                  <a:t>Spacing</a:t>
+                </a:r>
+                <a:r>
+                  <a:rPr lang="en-US" dirty="0"/>
+                  <a:t> = Calibrated coordinate</a:t>
+                </a:r>
+                <a:endParaRPr lang="en-US" b="0" i="1" dirty="0">
+                  <a:latin typeface="Cambria Math" panose="02040503050406030204" pitchFamily="18" charset="0"/>
+                </a:endParaRPr>
+              </a:p>
+              <a:p>
+                <a:pPr/>
+                <a14:m>
+                  <m:oMathPara xmlns:m="http://schemas.openxmlformats.org/officeDocument/2006/math">
+                    <m:oMathParaPr>
+                      <m:jc m:val="left"/>
+                    </m:oMathParaPr>
+                    <m:oMath xmlns:m="http://schemas.openxmlformats.org/officeDocument/2006/math">
+                      <m:r>
+                        <a:rPr lang="en-US" b="0" i="1" smtClean="0">
+                          <a:latin typeface="Cambria Math" panose="02040503050406030204" pitchFamily="18" charset="0"/>
+                        </a:rPr>
+                        <m:t>𝑥</m:t>
+                      </m:r>
+                      <m:r>
+                        <a:rPr lang="en-US" b="0" i="1" smtClean="0">
+                          <a:latin typeface="Cambria Math" panose="02040503050406030204" pitchFamily="18" charset="0"/>
+                        </a:rPr>
+                        <m:t>: 139 </m:t>
+                      </m:r>
+                      <m:r>
+                        <a:rPr lang="en-US" b="0" i="1" smtClean="0">
+                          <a:latin typeface="Cambria Math" panose="02040503050406030204" pitchFamily="18" charset="0"/>
+                        </a:rPr>
+                        <m:t>∗ 0.</m:t>
+                      </m:r>
+                      <m:r>
+                        <a:rPr lang="en-US" b="0" i="1" smtClean="0">
+                          <a:solidFill>
+                            <a:schemeClr val="accent6"/>
+                          </a:solidFill>
+                          <a:latin typeface="Cambria Math" panose="02040503050406030204" pitchFamily="18" charset="0"/>
+                        </a:rPr>
+                        <m:t>13 µ</m:t>
+                      </m:r>
+                      <m:r>
+                        <a:rPr lang="en-US" b="0" i="1" smtClean="0">
+                          <a:solidFill>
+                            <a:schemeClr val="accent6"/>
+                          </a:solidFill>
+                          <a:latin typeface="Cambria Math" panose="02040503050406030204" pitchFamily="18" charset="0"/>
+                        </a:rPr>
+                        <m:t>𝑚</m:t>
+                      </m:r>
+                      <m:r>
+                        <a:rPr lang="en-US" b="0" i="1" smtClean="0">
+                          <a:latin typeface="Cambria Math" panose="02040503050406030204" pitchFamily="18" charset="0"/>
+                        </a:rPr>
+                        <m:t>=18.07 µ</m:t>
+                      </m:r>
+                      <m:r>
+                        <a:rPr lang="en-US" b="0" i="1" smtClean="0">
+                          <a:latin typeface="Cambria Math" panose="02040503050406030204" pitchFamily="18" charset="0"/>
+                        </a:rPr>
+                        <m:t>𝑚</m:t>
+                      </m:r>
+                      <m:r>
+                        <a:rPr lang="en-US" b="0" i="1" smtClean="0">
+                          <a:latin typeface="Cambria Math" panose="02040503050406030204" pitchFamily="18" charset="0"/>
+                        </a:rPr>
+                        <m:t> </m:t>
+                      </m:r>
+                    </m:oMath>
+                  </m:oMathPara>
+                </a14:m>
+                <a:endParaRPr lang="en-US" b="0" i="1" dirty="0">
+                  <a:latin typeface="Cambria Math" panose="02040503050406030204" pitchFamily="18" charset="0"/>
+                </a:endParaRPr>
+              </a:p>
+              <a:p>
+                <a:pPr/>
+                <a14:m>
+                  <m:oMathPara xmlns:m="http://schemas.openxmlformats.org/officeDocument/2006/math">
+                    <m:oMathParaPr>
+                      <m:jc m:val="left"/>
+                    </m:oMathParaPr>
+                    <m:oMath xmlns:m="http://schemas.openxmlformats.org/officeDocument/2006/math">
+                      <m:r>
+                        <a:rPr lang="en-US" b="0" i="1" smtClean="0">
+                          <a:latin typeface="Cambria Math" panose="02040503050406030204" pitchFamily="18" charset="0"/>
+                        </a:rPr>
+                        <m:t>𝑦</m:t>
+                      </m:r>
+                      <m:r>
+                        <a:rPr lang="en-US" b="0" i="1" smtClean="0">
+                          <a:latin typeface="Cambria Math" panose="02040503050406030204" pitchFamily="18" charset="0"/>
+                        </a:rPr>
+                        <m:t>: 50 ∗</m:t>
+                      </m:r>
+                      <m:r>
+                        <a:rPr lang="en-US" i="1">
+                          <a:latin typeface="Cambria Math" panose="02040503050406030204" pitchFamily="18" charset="0"/>
+                        </a:rPr>
+                        <m:t> 0.13</m:t>
+                      </m:r>
+                      <m:r>
+                        <a:rPr lang="en-US" i="1" smtClean="0">
+                          <a:solidFill>
+                            <a:schemeClr val="accent6"/>
+                          </a:solidFill>
+                          <a:latin typeface="Cambria Math" panose="02040503050406030204" pitchFamily="18" charset="0"/>
+                        </a:rPr>
+                        <m:t> µ</m:t>
+                      </m:r>
+                      <m:r>
+                        <a:rPr lang="en-US" i="1" smtClean="0">
+                          <a:solidFill>
+                            <a:schemeClr val="accent6"/>
+                          </a:solidFill>
+                          <a:latin typeface="Cambria Math" panose="02040503050406030204" pitchFamily="18" charset="0"/>
+                        </a:rPr>
+                        <m:t>𝑚</m:t>
+                      </m:r>
+                      <m:r>
+                        <a:rPr lang="en-US" i="1">
+                          <a:latin typeface="Cambria Math" panose="02040503050406030204" pitchFamily="18" charset="0"/>
+                        </a:rPr>
+                        <m:t>=6.5 µ</m:t>
+                      </m:r>
+                      <m:r>
+                        <a:rPr lang="en-US" i="1">
+                          <a:latin typeface="Cambria Math" panose="02040503050406030204" pitchFamily="18" charset="0"/>
+                        </a:rPr>
+                        <m:t>𝑚</m:t>
+                      </m:r>
+                      <m:r>
+                        <a:rPr lang="en-US" i="1">
+                          <a:latin typeface="Cambria Math" panose="02040503050406030204" pitchFamily="18" charset="0"/>
+                        </a:rPr>
+                        <m:t> </m:t>
+                      </m:r>
+                    </m:oMath>
+                  </m:oMathPara>
+                </a14:m>
+                <a:endParaRPr lang="en-US" dirty="0"/>
+              </a:p>
+            </p:txBody>
+          </p:sp>
+        </mc:Choice>
+        <mc:Fallback>
+          <p:sp>
+            <p:nvSpPr>
+              <p:cNvPr id="34" name="TextBox 33">
+                <a:extLst>
+                  <a:ext uri="{FF2B5EF4-FFF2-40B4-BE49-F238E27FC236}">
+                    <a16:creationId xmlns:a16="http://schemas.microsoft.com/office/drawing/2014/main" id="{88460B12-1FCE-8843-9F16-F58CFB2F4128}"/>
+                  </a:ext>
+                </a:extLst>
+              </p:cNvPr>
+              <p:cNvSpPr txBox="1">
+                <a:spLocks noRot="1" noChangeAspect="1" noMove="1" noResize="1" noEditPoints="1" noAdjustHandles="1" noChangeArrowheads="1" noChangeShapeType="1" noTextEdit="1"/>
+              </p:cNvSpPr>
+              <p:nvPr/>
+            </p:nvSpPr>
+            <p:spPr>
+              <a:xfrm>
+                <a:off x="992382" y="1490679"/>
+                <a:ext cx="3881127" cy="923330"/>
+              </a:xfrm>
+              <a:prstGeom prst="rect">
+                <a:avLst/>
+              </a:prstGeom>
+              <a:blipFill>
+                <a:blip r:embed="rId6"/>
+                <a:stretch>
+                  <a:fillRect l="-1634" t="-2703" r="-327" b="-5405"/>
+                </a:stretch>
+              </a:blipFill>
+            </p:spPr>
+            <p:txBody>
+              <a:bodyPr/>
+              <a:lstStyle/>
+              <a:p>
+                <a:r>
+                  <a:rPr lang="en-DE">
+                    <a:noFill/>
+                  </a:rPr>
+                  <a:t> </a:t>
+                </a:r>
+              </a:p>
+            </p:txBody>
+          </p:sp>
+        </mc:Fallback>
+      </mc:AlternateContent>
       <p:sp>
         <p:nvSpPr>
           <p:cNvPr id="31" name="Oval 30">
@@ -4858,7 +7012,11 @@
           <a:lstStyle/>
           <a:p>
             <a:r>
-              <a:rPr lang="en-US" dirty="0"/>
+              <a:rPr lang="en-US" dirty="0">
+                <a:solidFill>
+                  <a:schemeClr val="accent1"/>
+                </a:solidFill>
+              </a:rPr>
               <a:t>(0,0)</a:t>
             </a:r>
           </a:p>
@@ -5536,7 +7694,7 @@
     </p:spTree>
     <p:extLst>
       <p:ext uri="{BB962C8B-B14F-4D97-AF65-F5344CB8AC3E}">
-        <p14:creationId xmlns:p14="http://schemas.microsoft.com/office/powerpoint/2010/main" val="3647780881"/>
+        <p14:creationId xmlns:p14="http://schemas.microsoft.com/office/powerpoint/2010/main" val="1785627200"/>
       </p:ext>
     </p:extLst>
   </p:cSld>
@@ -5546,7 +7704,7 @@
 </p:sld>
 </file>
 
-<file path=ppt/slides/slide2.xml><?xml version="1.0" encoding="utf-8"?>
+<file path=ppt/slides/slide3.xml><?xml version="1.0" encoding="utf-8"?>
 <p:sld xmlns:a="http://schemas.openxmlformats.org/drawingml/2006/main" xmlns:r="http://schemas.openxmlformats.org/officeDocument/2006/relationships" xmlns:p="http://schemas.openxmlformats.org/presentationml/2006/main">
   <p:cSld>
     <p:spTree>

</xml_diff>

<commit_message>
Improve figure according to suggestions by manerotoni
</commit_message>
<xml_diff>
--- a/figures/resources/spatial_calibration.pptx
+++ b/figures/resources/spatial_calibration.pptx
@@ -199,7 +199,7 @@
           <a:p>
             <a:fld id="{0DE32CF7-9C27-294A-90C4-3E35094C4601}" type="datetimeFigureOut">
               <a:rPr lang="de-DE" smtClean="0"/>
-              <a:t>24.09.23</a:t>
+              <a:t>25.09.23</a:t>
             </a:fld>
             <a:endParaRPr lang="de-DE"/>
           </a:p>
@@ -904,7 +904,7 @@
           <a:p>
             <a:fld id="{F21C5B54-884B-447C-A969-012169FE4C38}" type="datetimeFigureOut">
               <a:rPr lang="en-US" smtClean="0"/>
-              <a:t>9/24/23</a:t>
+              <a:t>9/25/23</a:t>
             </a:fld>
             <a:endParaRPr lang="en-US"/>
           </a:p>
@@ -1074,7 +1074,7 @@
           <a:p>
             <a:fld id="{F21C5B54-884B-447C-A969-012169FE4C38}" type="datetimeFigureOut">
               <a:rPr lang="en-US" smtClean="0"/>
-              <a:t>9/24/23</a:t>
+              <a:t>9/25/23</a:t>
             </a:fld>
             <a:endParaRPr lang="en-US"/>
           </a:p>
@@ -1254,7 +1254,7 @@
           <a:p>
             <a:fld id="{F21C5B54-884B-447C-A969-012169FE4C38}" type="datetimeFigureOut">
               <a:rPr lang="en-US" smtClean="0"/>
-              <a:t>9/24/23</a:t>
+              <a:t>9/25/23</a:t>
             </a:fld>
             <a:endParaRPr lang="en-US"/>
           </a:p>
@@ -1424,7 +1424,7 @@
           <a:p>
             <a:fld id="{F21C5B54-884B-447C-A969-012169FE4C38}" type="datetimeFigureOut">
               <a:rPr lang="en-US" smtClean="0"/>
-              <a:t>9/24/23</a:t>
+              <a:t>9/25/23</a:t>
             </a:fld>
             <a:endParaRPr lang="en-US"/>
           </a:p>
@@ -1668,7 +1668,7 @@
           <a:p>
             <a:fld id="{F21C5B54-884B-447C-A969-012169FE4C38}" type="datetimeFigureOut">
               <a:rPr lang="en-US" smtClean="0"/>
-              <a:t>9/24/23</a:t>
+              <a:t>9/25/23</a:t>
             </a:fld>
             <a:endParaRPr lang="en-US"/>
           </a:p>
@@ -1900,7 +1900,7 @@
           <a:p>
             <a:fld id="{F21C5B54-884B-447C-A969-012169FE4C38}" type="datetimeFigureOut">
               <a:rPr lang="en-US" smtClean="0"/>
-              <a:t>9/24/23</a:t>
+              <a:t>9/25/23</a:t>
             </a:fld>
             <a:endParaRPr lang="en-US"/>
           </a:p>
@@ -2267,7 +2267,7 @@
           <a:p>
             <a:fld id="{F21C5B54-884B-447C-A969-012169FE4C38}" type="datetimeFigureOut">
               <a:rPr lang="en-US" smtClean="0"/>
-              <a:t>9/24/23</a:t>
+              <a:t>9/25/23</a:t>
             </a:fld>
             <a:endParaRPr lang="en-US"/>
           </a:p>
@@ -2385,7 +2385,7 @@
           <a:p>
             <a:fld id="{F21C5B54-884B-447C-A969-012169FE4C38}" type="datetimeFigureOut">
               <a:rPr lang="en-US" smtClean="0"/>
-              <a:t>9/24/23</a:t>
+              <a:t>9/25/23</a:t>
             </a:fld>
             <a:endParaRPr lang="en-US"/>
           </a:p>
@@ -2480,7 +2480,7 @@
           <a:p>
             <a:fld id="{F21C5B54-884B-447C-A969-012169FE4C38}" type="datetimeFigureOut">
               <a:rPr lang="en-US" smtClean="0"/>
-              <a:t>9/24/23</a:t>
+              <a:t>9/25/23</a:t>
             </a:fld>
             <a:endParaRPr lang="en-US"/>
           </a:p>
@@ -2757,7 +2757,7 @@
           <a:p>
             <a:fld id="{F21C5B54-884B-447C-A969-012169FE4C38}" type="datetimeFigureOut">
               <a:rPr lang="en-US" smtClean="0"/>
-              <a:t>9/24/23</a:t>
+              <a:t>9/25/23</a:t>
             </a:fld>
             <a:endParaRPr lang="en-US"/>
           </a:p>
@@ -3014,7 +3014,7 @@
           <a:p>
             <a:fld id="{F21C5B54-884B-447C-A969-012169FE4C38}" type="datetimeFigureOut">
               <a:rPr lang="en-US" smtClean="0"/>
-              <a:t>9/24/23</a:t>
+              <a:t>9/25/23</a:t>
             </a:fld>
             <a:endParaRPr lang="en-US"/>
           </a:p>
@@ -3227,7 +3227,7 @@
           <a:p>
             <a:fld id="{F21C5B54-884B-447C-A969-012169FE4C38}" type="datetimeFigureOut">
               <a:rPr lang="en-US" smtClean="0"/>
-              <a:t>9/24/23</a:t>
+              <a:t>9/25/23</a:t>
             </a:fld>
             <a:endParaRPr lang="en-US"/>
           </a:p>
@@ -3632,6 +3632,2076 @@
           <a:chExt cx="0" cy="0"/>
         </a:xfrm>
       </p:grpSpPr>
+      <p:pic>
+        <p:nvPicPr>
+          <p:cNvPr id="5" name="Picture 4">
+            <a:extLst>
+              <a:ext uri="{FF2B5EF4-FFF2-40B4-BE49-F238E27FC236}">
+                <a16:creationId xmlns:a16="http://schemas.microsoft.com/office/drawing/2014/main" id="{17A8D9A3-49AF-88AD-CA09-6FE5DCA0D380}"/>
+              </a:ext>
+            </a:extLst>
+          </p:cNvPr>
+          <p:cNvPicPr>
+            <a:picLocks noChangeAspect="1"/>
+          </p:cNvPicPr>
+          <p:nvPr/>
+        </p:nvPicPr>
+        <p:blipFill>
+          <a:blip r:embed="rId3"/>
+          <a:stretch>
+            <a:fillRect/>
+          </a:stretch>
+        </p:blipFill>
+        <p:spPr>
+          <a:xfrm>
+            <a:off x="1373819" y="2770747"/>
+            <a:ext cx="3052243" cy="3052243"/>
+          </a:xfrm>
+          <a:prstGeom prst="rect">
+            <a:avLst/>
+          </a:prstGeom>
+        </p:spPr>
+      </p:pic>
+      <p:sp>
+        <p:nvSpPr>
+          <p:cNvPr id="8" name="Rectangle 7"/>
+          <p:cNvSpPr/>
+          <p:nvPr/>
+        </p:nvSpPr>
+        <p:spPr>
+          <a:xfrm>
+            <a:off x="6211055" y="1962886"/>
+            <a:ext cx="620889" cy="620889"/>
+          </a:xfrm>
+          <a:prstGeom prst="rect">
+            <a:avLst/>
+          </a:prstGeom>
+          <a:noFill/>
+          <a:ln w="3175">
+            <a:solidFill>
+              <a:schemeClr val="accent1"/>
+            </a:solidFill>
+          </a:ln>
+        </p:spPr>
+        <p:style>
+          <a:lnRef idx="2">
+            <a:schemeClr val="accent1">
+              <a:shade val="50000"/>
+            </a:schemeClr>
+          </a:lnRef>
+          <a:fillRef idx="1">
+            <a:schemeClr val="accent1"/>
+          </a:fillRef>
+          <a:effectRef idx="0">
+            <a:schemeClr val="accent1"/>
+          </a:effectRef>
+          <a:fontRef idx="minor">
+            <a:schemeClr val="lt1"/>
+          </a:fontRef>
+        </p:style>
+        <p:txBody>
+          <a:bodyPr rtlCol="0" anchor="ctr"/>
+          <a:lstStyle/>
+          <a:p>
+            <a:pPr algn="ctr"/>
+            <a:endParaRPr lang="en-US"/>
+          </a:p>
+        </p:txBody>
+      </p:sp>
+      <p:cxnSp>
+        <p:nvCxnSpPr>
+          <p:cNvPr id="10" name="Straight Connector 9"/>
+          <p:cNvCxnSpPr/>
+          <p:nvPr/>
+        </p:nvCxnSpPr>
+        <p:spPr>
+          <a:xfrm flipH="1" flipV="1">
+            <a:off x="6070907" y="2243054"/>
+            <a:ext cx="11289" cy="694267"/>
+          </a:xfrm>
+          <a:prstGeom prst="line">
+            <a:avLst/>
+          </a:prstGeom>
+          <a:ln w="28575">
+            <a:headEnd type="arrow" w="med" len="med"/>
+            <a:tailEnd type="arrow" w="med" len="med"/>
+          </a:ln>
+        </p:spPr>
+        <p:style>
+          <a:lnRef idx="1">
+            <a:schemeClr val="accent1"/>
+          </a:lnRef>
+          <a:fillRef idx="0">
+            <a:schemeClr val="accent1"/>
+          </a:fillRef>
+          <a:effectRef idx="0">
+            <a:schemeClr val="accent1"/>
+          </a:effectRef>
+          <a:fontRef idx="minor">
+            <a:schemeClr val="tx1"/>
+          </a:fontRef>
+        </p:style>
+      </p:cxnSp>
+      <p:sp>
+        <p:nvSpPr>
+          <p:cNvPr id="12" name="TextBox 11"/>
+          <p:cNvSpPr txBox="1"/>
+          <p:nvPr/>
+        </p:nvSpPr>
+        <p:spPr>
+          <a:xfrm rot="16200000">
+            <a:off x="5664203" y="2384378"/>
+            <a:ext cx="410690" cy="369332"/>
+          </a:xfrm>
+          <a:prstGeom prst="rect">
+            <a:avLst/>
+          </a:prstGeom>
+          <a:noFill/>
+        </p:spPr>
+        <p:txBody>
+          <a:bodyPr wrap="none" rtlCol="0">
+            <a:spAutoFit/>
+          </a:bodyPr>
+          <a:lstStyle/>
+          <a:p>
+            <a:r>
+              <a:rPr lang="en-US" dirty="0" err="1"/>
+              <a:t>dy</a:t>
+            </a:r>
+            <a:endParaRPr lang="en-US" dirty="0"/>
+          </a:p>
+        </p:txBody>
+      </p:sp>
+      <p:sp>
+        <p:nvSpPr>
+          <p:cNvPr id="13" name="TextBox 12"/>
+          <p:cNvSpPr txBox="1"/>
+          <p:nvPr/>
+        </p:nvSpPr>
+        <p:spPr>
+          <a:xfrm>
+            <a:off x="6650478" y="1498887"/>
+            <a:ext cx="405880" cy="369332"/>
+          </a:xfrm>
+          <a:prstGeom prst="rect">
+            <a:avLst/>
+          </a:prstGeom>
+          <a:noFill/>
+        </p:spPr>
+        <p:txBody>
+          <a:bodyPr wrap="none" rtlCol="0">
+            <a:spAutoFit/>
+          </a:bodyPr>
+          <a:lstStyle/>
+          <a:p>
+            <a:r>
+              <a:rPr lang="en-US" dirty="0"/>
+              <a:t>dx</a:t>
+            </a:r>
+          </a:p>
+        </p:txBody>
+      </p:sp>
+      <p:cxnSp>
+        <p:nvCxnSpPr>
+          <p:cNvPr id="18" name="Straight Connector 17"/>
+          <p:cNvCxnSpPr/>
+          <p:nvPr/>
+        </p:nvCxnSpPr>
+        <p:spPr>
+          <a:xfrm>
+            <a:off x="5851794" y="3757435"/>
+            <a:ext cx="1885191" cy="0"/>
+          </a:xfrm>
+          <a:prstGeom prst="line">
+            <a:avLst/>
+          </a:prstGeom>
+          <a:ln w="28575">
+            <a:headEnd type="arrow" w="med" len="med"/>
+            <a:tailEnd type="arrow" w="med" len="med"/>
+          </a:ln>
+        </p:spPr>
+        <p:style>
+          <a:lnRef idx="1">
+            <a:schemeClr val="accent1"/>
+          </a:lnRef>
+          <a:fillRef idx="0">
+            <a:schemeClr val="accent1"/>
+          </a:fillRef>
+          <a:effectRef idx="0">
+            <a:schemeClr val="accent1"/>
+          </a:effectRef>
+          <a:fontRef idx="minor">
+            <a:schemeClr val="tx1"/>
+          </a:fontRef>
+        </p:style>
+      </p:cxnSp>
+      <p:sp>
+        <p:nvSpPr>
+          <p:cNvPr id="19" name="TextBox 18"/>
+          <p:cNvSpPr txBox="1"/>
+          <p:nvPr/>
+        </p:nvSpPr>
+        <p:spPr>
+          <a:xfrm>
+            <a:off x="6446463" y="3412258"/>
+            <a:ext cx="575799" cy="369332"/>
+          </a:xfrm>
+          <a:prstGeom prst="rect">
+            <a:avLst/>
+          </a:prstGeom>
+          <a:noFill/>
+        </p:spPr>
+        <p:txBody>
+          <a:bodyPr wrap="none" rtlCol="0">
+            <a:spAutoFit/>
+          </a:bodyPr>
+          <a:lstStyle/>
+          <a:p>
+            <a:r>
+              <a:rPr lang="en-US" dirty="0"/>
+              <a:t>3 dx</a:t>
+            </a:r>
+          </a:p>
+        </p:txBody>
+      </p:sp>
+      <p:cxnSp>
+        <p:nvCxnSpPr>
+          <p:cNvPr id="15" name="Straight Connector 14"/>
+          <p:cNvCxnSpPr/>
+          <p:nvPr/>
+        </p:nvCxnSpPr>
+        <p:spPr>
+          <a:xfrm flipV="1">
+            <a:off x="6531438" y="1855947"/>
+            <a:ext cx="632177" cy="7924"/>
+          </a:xfrm>
+          <a:prstGeom prst="line">
+            <a:avLst/>
+          </a:prstGeom>
+          <a:ln w="28575">
+            <a:headEnd type="arrow" w="med" len="med"/>
+            <a:tailEnd type="arrow" w="med" len="med"/>
+          </a:ln>
+        </p:spPr>
+        <p:style>
+          <a:lnRef idx="1">
+            <a:schemeClr val="accent1"/>
+          </a:lnRef>
+          <a:fillRef idx="0">
+            <a:schemeClr val="accent1"/>
+          </a:fillRef>
+          <a:effectRef idx="0">
+            <a:schemeClr val="accent1"/>
+          </a:effectRef>
+          <a:fontRef idx="minor">
+            <a:schemeClr val="tx1"/>
+          </a:fontRef>
+        </p:style>
+      </p:cxnSp>
+      <mc:AlternateContent xmlns:mc="http://schemas.openxmlformats.org/markup-compatibility/2006" xmlns:a14="http://schemas.microsoft.com/office/drawing/2010/main">
+        <mc:Choice Requires="a14">
+          <p:sp>
+            <p:nvSpPr>
+              <p:cNvPr id="32" name="TextBox 31"/>
+              <p:cNvSpPr txBox="1"/>
+              <p:nvPr/>
+            </p:nvSpPr>
+            <p:spPr>
+              <a:xfrm>
+                <a:off x="5647731" y="5397351"/>
+                <a:ext cx="2350900" cy="369332"/>
+              </a:xfrm>
+              <a:prstGeom prst="rect">
+                <a:avLst/>
+              </a:prstGeom>
+              <a:noFill/>
+            </p:spPr>
+            <p:txBody>
+              <a:bodyPr wrap="none" rtlCol="0">
+                <a:spAutoFit/>
+              </a:bodyPr>
+              <a:lstStyle/>
+              <a:p>
+                <a:pPr/>
+                <a14:m>
+                  <m:oMathPara xmlns:m="http://schemas.openxmlformats.org/officeDocument/2006/math">
+                    <m:oMathParaPr>
+                      <m:jc m:val="centerGroup"/>
+                    </m:oMathParaPr>
+                    <m:oMath xmlns:m="http://schemas.openxmlformats.org/officeDocument/2006/math">
+                      <m:r>
+                        <a:rPr lang="en-US" i="1" dirty="0" smtClean="0">
+                          <a:latin typeface="Cambria Math" panose="02040503050406030204" pitchFamily="18" charset="0"/>
+                        </a:rPr>
+                        <m:t>𝐴</m:t>
+                      </m:r>
+                      <m:r>
+                        <a:rPr lang="en-US" b="0" i="1" dirty="0" smtClean="0">
+                          <a:latin typeface="Cambria Math" panose="02040503050406030204" pitchFamily="18" charset="0"/>
+                        </a:rPr>
+                        <m:t>𝑟𝑒𝑎</m:t>
+                      </m:r>
+                      <m:r>
+                        <a:rPr lang="en-US" i="1" dirty="0" smtClean="0">
+                          <a:latin typeface="Cambria Math" panose="02040503050406030204" pitchFamily="18" charset="0"/>
+                        </a:rPr>
+                        <m:t> = 3 </m:t>
+                      </m:r>
+                      <m:r>
+                        <a:rPr lang="en-US" i="1" dirty="0" smtClean="0">
+                          <a:latin typeface="Cambria Math" panose="02040503050406030204" pitchFamily="18" charset="0"/>
+                        </a:rPr>
+                        <m:t>𝑑𝑥</m:t>
+                      </m:r>
+                      <m:r>
+                        <a:rPr lang="en-US" i="1" dirty="0">
+                          <a:latin typeface="Cambria Math" panose="02040503050406030204" pitchFamily="18" charset="0"/>
+                        </a:rPr>
+                        <m:t> </m:t>
+                      </m:r>
+                      <m:r>
+                        <a:rPr lang="en-US" i="1" dirty="0" smtClean="0">
+                          <a:latin typeface="Cambria Math" panose="02040503050406030204" pitchFamily="18" charset="0"/>
+                        </a:rPr>
+                        <m:t>∗ 2 </m:t>
+                      </m:r>
+                      <m:r>
+                        <a:rPr lang="en-US" i="1" dirty="0" err="1" smtClean="0">
+                          <a:latin typeface="Cambria Math" panose="02040503050406030204" pitchFamily="18" charset="0"/>
+                        </a:rPr>
+                        <m:t>𝑑𝑦</m:t>
+                      </m:r>
+                    </m:oMath>
+                  </m:oMathPara>
+                </a14:m>
+                <a:endParaRPr lang="en-US" dirty="0"/>
+              </a:p>
+            </p:txBody>
+          </p:sp>
+        </mc:Choice>
+        <mc:Fallback xmlns="">
+          <p:sp>
+            <p:nvSpPr>
+              <p:cNvPr id="32" name="TextBox 31"/>
+              <p:cNvSpPr txBox="1">
+                <a:spLocks noRot="1" noChangeAspect="1" noMove="1" noResize="1" noEditPoints="1" noAdjustHandles="1" noChangeArrowheads="1" noChangeShapeType="1" noTextEdit="1"/>
+              </p:cNvSpPr>
+              <p:nvPr/>
+            </p:nvSpPr>
+            <p:spPr>
+              <a:xfrm>
+                <a:off x="5647731" y="5397351"/>
+                <a:ext cx="2350900" cy="369332"/>
+              </a:xfrm>
+              <a:prstGeom prst="rect">
+                <a:avLst/>
+              </a:prstGeom>
+              <a:blipFill>
+                <a:blip r:embed="rId4"/>
+                <a:stretch>
+                  <a:fillRect b="-13333"/>
+                </a:stretch>
+              </a:blipFill>
+            </p:spPr>
+            <p:txBody>
+              <a:bodyPr/>
+              <a:lstStyle/>
+              <a:p>
+                <a:r>
+                  <a:rPr lang="de-DE">
+                    <a:noFill/>
+                  </a:rPr>
+                  <a:t> </a:t>
+                </a:r>
+              </a:p>
+            </p:txBody>
+          </p:sp>
+        </mc:Fallback>
+      </mc:AlternateContent>
+      <p:cxnSp>
+        <p:nvCxnSpPr>
+          <p:cNvPr id="33" name="Straight Connector 32"/>
+          <p:cNvCxnSpPr/>
+          <p:nvPr/>
+        </p:nvCxnSpPr>
+        <p:spPr>
+          <a:xfrm flipH="1">
+            <a:off x="5685051" y="3909835"/>
+            <a:ext cx="3532" cy="1319514"/>
+          </a:xfrm>
+          <a:prstGeom prst="line">
+            <a:avLst/>
+          </a:prstGeom>
+          <a:ln w="28575">
+            <a:headEnd type="arrow" w="med" len="med"/>
+            <a:tailEnd type="arrow" w="med" len="med"/>
+          </a:ln>
+        </p:spPr>
+        <p:style>
+          <a:lnRef idx="1">
+            <a:schemeClr val="accent1"/>
+          </a:lnRef>
+          <a:fillRef idx="0">
+            <a:schemeClr val="accent1"/>
+          </a:fillRef>
+          <a:effectRef idx="0">
+            <a:schemeClr val="accent1"/>
+          </a:effectRef>
+          <a:fontRef idx="minor">
+            <a:schemeClr val="tx1"/>
+          </a:fontRef>
+        </p:style>
+      </p:cxnSp>
+      <p:sp>
+        <p:nvSpPr>
+          <p:cNvPr id="35" name="TextBox 34"/>
+          <p:cNvSpPr txBox="1"/>
+          <p:nvPr/>
+        </p:nvSpPr>
+        <p:spPr>
+          <a:xfrm>
+            <a:off x="4988364" y="4288454"/>
+            <a:ext cx="580608" cy="369332"/>
+          </a:xfrm>
+          <a:prstGeom prst="rect">
+            <a:avLst/>
+          </a:prstGeom>
+          <a:noFill/>
+        </p:spPr>
+        <p:txBody>
+          <a:bodyPr wrap="none" rtlCol="0">
+            <a:spAutoFit/>
+          </a:bodyPr>
+          <a:lstStyle/>
+          <a:p>
+            <a:r>
+              <a:rPr lang="en-US" dirty="0"/>
+              <a:t>2 </a:t>
+            </a:r>
+            <a:r>
+              <a:rPr lang="en-US" dirty="0" err="1"/>
+              <a:t>dy</a:t>
+            </a:r>
+            <a:endParaRPr lang="en-US" dirty="0"/>
+          </a:p>
+        </p:txBody>
+      </p:sp>
+      <mc:AlternateContent xmlns:mc="http://schemas.openxmlformats.org/markup-compatibility/2006">
+        <mc:Choice xmlns:a14="http://schemas.microsoft.com/office/drawing/2010/main" Requires="a14">
+          <p:sp>
+            <p:nvSpPr>
+              <p:cNvPr id="34" name="TextBox 33">
+                <a:extLst>
+                  <a:ext uri="{FF2B5EF4-FFF2-40B4-BE49-F238E27FC236}">
+                    <a16:creationId xmlns:a16="http://schemas.microsoft.com/office/drawing/2014/main" id="{88460B12-1FCE-8843-9F16-F58CFB2F4128}"/>
+                  </a:ext>
+                </a:extLst>
+              </p:cNvPr>
+              <p:cNvSpPr txBox="1"/>
+              <p:nvPr/>
+            </p:nvSpPr>
+            <p:spPr>
+              <a:xfrm>
+                <a:off x="1860009" y="1956948"/>
+                <a:ext cx="2778838" cy="646331"/>
+              </a:xfrm>
+              <a:prstGeom prst="rect">
+                <a:avLst/>
+              </a:prstGeom>
+              <a:noFill/>
+            </p:spPr>
+            <p:txBody>
+              <a:bodyPr wrap="none" rtlCol="0">
+                <a:spAutoFit/>
+              </a:bodyPr>
+              <a:lstStyle/>
+              <a:p>
+                <a:pPr/>
+                <a14:m>
+                  <m:oMathPara xmlns:m="http://schemas.openxmlformats.org/officeDocument/2006/math">
+                    <m:oMathParaPr>
+                      <m:jc m:val="centerGroup"/>
+                    </m:oMathParaPr>
+                    <m:oMath xmlns:m="http://schemas.openxmlformats.org/officeDocument/2006/math">
+                      <m:r>
+                        <a:rPr lang="en-US" b="0" i="1" smtClean="0">
+                          <a:latin typeface="Cambria Math" panose="02040503050406030204" pitchFamily="18" charset="0"/>
+                        </a:rPr>
+                        <m:t>𝑥</m:t>
+                      </m:r>
+                      <m:r>
+                        <a:rPr lang="en-US" i="1" smtClean="0">
+                          <a:latin typeface="Cambria Math" panose="02040503050406030204" pitchFamily="18" charset="0"/>
+                        </a:rPr>
+                        <m:t>=</m:t>
+                      </m:r>
+                      <m:r>
+                        <a:rPr lang="en-US" b="0" i="1" smtClean="0">
+                          <a:solidFill>
+                            <a:schemeClr val="accent1"/>
+                          </a:solidFill>
+                          <a:latin typeface="Cambria Math" panose="02040503050406030204" pitchFamily="18" charset="0"/>
+                        </a:rPr>
+                        <m:t>12</m:t>
+                      </m:r>
+                      <m:r>
+                        <a:rPr lang="en-US" b="0" i="1" smtClean="0">
+                          <a:latin typeface="Cambria Math" panose="02040503050406030204" pitchFamily="18" charset="0"/>
+                        </a:rPr>
+                        <m:t> ∗ </m:t>
+                      </m:r>
+                      <m:r>
+                        <a:rPr lang="en-US" b="0" i="1" smtClean="0">
+                          <a:solidFill>
+                            <a:schemeClr val="accent6"/>
+                          </a:solidFill>
+                          <a:latin typeface="Cambria Math" panose="02040503050406030204" pitchFamily="18" charset="0"/>
+                        </a:rPr>
+                        <m:t>0.</m:t>
+                      </m:r>
+                      <m:r>
+                        <a:rPr lang="en-US" b="0" i="1" smtClean="0">
+                          <a:solidFill>
+                            <a:schemeClr val="accent6"/>
+                          </a:solidFill>
+                          <a:latin typeface="Cambria Math" panose="02040503050406030204" pitchFamily="18" charset="0"/>
+                        </a:rPr>
+                        <m:t>5</m:t>
+                      </m:r>
+                      <m:r>
+                        <a:rPr lang="en-US" b="0" i="1" smtClean="0">
+                          <a:solidFill>
+                            <a:schemeClr val="accent6"/>
+                          </a:solidFill>
+                          <a:latin typeface="Cambria Math" panose="02040503050406030204" pitchFamily="18" charset="0"/>
+                        </a:rPr>
+                        <m:t> µ</m:t>
+                      </m:r>
+                      <m:r>
+                        <a:rPr lang="en-US" b="0" i="1" smtClean="0">
+                          <a:solidFill>
+                            <a:schemeClr val="accent6"/>
+                          </a:solidFill>
+                          <a:latin typeface="Cambria Math" panose="02040503050406030204" pitchFamily="18" charset="0"/>
+                        </a:rPr>
+                        <m:t>𝑚</m:t>
+                      </m:r>
+                      <m:r>
+                        <a:rPr lang="en-US" b="0" i="1" smtClean="0">
+                          <a:latin typeface="Cambria Math" panose="02040503050406030204" pitchFamily="18" charset="0"/>
+                        </a:rPr>
+                        <m:t>=</m:t>
+                      </m:r>
+                      <m:r>
+                        <a:rPr lang="en-US" b="0" i="1" smtClean="0">
+                          <a:latin typeface="Cambria Math" panose="02040503050406030204" pitchFamily="18" charset="0"/>
+                        </a:rPr>
+                        <m:t>6</m:t>
+                      </m:r>
+                      <m:r>
+                        <a:rPr lang="en-US" b="0" i="1" smtClean="0">
+                          <a:latin typeface="Cambria Math" panose="02040503050406030204" pitchFamily="18" charset="0"/>
+                        </a:rPr>
+                        <m:t> µ</m:t>
+                      </m:r>
+                      <m:r>
+                        <a:rPr lang="en-US" b="0" i="1" smtClean="0">
+                          <a:latin typeface="Cambria Math" panose="02040503050406030204" pitchFamily="18" charset="0"/>
+                        </a:rPr>
+                        <m:t>𝑚</m:t>
+                      </m:r>
+                      <m:r>
+                        <a:rPr lang="en-US" b="0" i="1" smtClean="0">
+                          <a:latin typeface="Cambria Math" panose="02040503050406030204" pitchFamily="18" charset="0"/>
+                        </a:rPr>
+                        <m:t> </m:t>
+                      </m:r>
+                    </m:oMath>
+                  </m:oMathPara>
+                </a14:m>
+                <a:endParaRPr lang="en-US" b="0" i="1" dirty="0">
+                  <a:latin typeface="Cambria Math" panose="02040503050406030204" pitchFamily="18" charset="0"/>
+                </a:endParaRPr>
+              </a:p>
+              <a:p>
+                <a:pPr/>
+                <a14:m>
+                  <m:oMathPara xmlns:m="http://schemas.openxmlformats.org/officeDocument/2006/math">
+                    <m:oMathParaPr>
+                      <m:jc m:val="centerGroup"/>
+                    </m:oMathParaPr>
+                    <m:oMath xmlns:m="http://schemas.openxmlformats.org/officeDocument/2006/math">
+                      <m:r>
+                        <a:rPr lang="en-US" b="0" i="1" smtClean="0">
+                          <a:latin typeface="Cambria Math" panose="02040503050406030204" pitchFamily="18" charset="0"/>
+                        </a:rPr>
+                        <m:t>𝑦</m:t>
+                      </m:r>
+                      <m:r>
+                        <a:rPr lang="en-US" i="1">
+                          <a:latin typeface="Cambria Math" panose="02040503050406030204" pitchFamily="18" charset="0"/>
+                        </a:rPr>
+                        <m:t>=</m:t>
+                      </m:r>
+                      <m:r>
+                        <a:rPr lang="en-US" b="0" i="1" smtClean="0">
+                          <a:solidFill>
+                            <a:schemeClr val="accent1"/>
+                          </a:solidFill>
+                          <a:latin typeface="Cambria Math" panose="02040503050406030204" pitchFamily="18" charset="0"/>
+                        </a:rPr>
+                        <m:t>6</m:t>
+                      </m:r>
+                      <m:r>
+                        <a:rPr lang="en-US" i="1">
+                          <a:latin typeface="Cambria Math" panose="02040503050406030204" pitchFamily="18" charset="0"/>
+                        </a:rPr>
+                        <m:t> ∗ </m:t>
+                      </m:r>
+                      <m:r>
+                        <a:rPr lang="en-US" i="1" smtClean="0">
+                          <a:solidFill>
+                            <a:schemeClr val="accent6"/>
+                          </a:solidFill>
+                          <a:latin typeface="Cambria Math" panose="02040503050406030204" pitchFamily="18" charset="0"/>
+                        </a:rPr>
+                        <m:t>0.</m:t>
+                      </m:r>
+                      <m:r>
+                        <a:rPr lang="en-US" b="0" i="1" smtClean="0">
+                          <a:solidFill>
+                            <a:schemeClr val="accent6"/>
+                          </a:solidFill>
+                          <a:latin typeface="Cambria Math" panose="02040503050406030204" pitchFamily="18" charset="0"/>
+                        </a:rPr>
+                        <m:t>5</m:t>
+                      </m:r>
+                      <m:r>
+                        <a:rPr lang="en-US" i="1" smtClean="0">
+                          <a:solidFill>
+                            <a:schemeClr val="accent6"/>
+                          </a:solidFill>
+                          <a:latin typeface="Cambria Math" panose="02040503050406030204" pitchFamily="18" charset="0"/>
+                        </a:rPr>
+                        <m:t> µ</m:t>
+                      </m:r>
+                      <m:r>
+                        <a:rPr lang="en-US" i="1" smtClean="0">
+                          <a:solidFill>
+                            <a:schemeClr val="accent6"/>
+                          </a:solidFill>
+                          <a:latin typeface="Cambria Math" panose="02040503050406030204" pitchFamily="18" charset="0"/>
+                        </a:rPr>
+                        <m:t>𝑚</m:t>
+                      </m:r>
+                      <m:r>
+                        <a:rPr lang="en-US" i="1">
+                          <a:latin typeface="Cambria Math" panose="02040503050406030204" pitchFamily="18" charset="0"/>
+                        </a:rPr>
+                        <m:t>=</m:t>
+                      </m:r>
+                      <m:r>
+                        <a:rPr lang="en-US" b="0" i="1" smtClean="0">
+                          <a:latin typeface="Cambria Math" panose="02040503050406030204" pitchFamily="18" charset="0"/>
+                        </a:rPr>
+                        <m:t>3</m:t>
+                      </m:r>
+                      <m:r>
+                        <a:rPr lang="en-US" i="1">
+                          <a:latin typeface="Cambria Math" panose="02040503050406030204" pitchFamily="18" charset="0"/>
+                        </a:rPr>
+                        <m:t> µ</m:t>
+                      </m:r>
+                      <m:r>
+                        <a:rPr lang="en-US" i="1">
+                          <a:latin typeface="Cambria Math" panose="02040503050406030204" pitchFamily="18" charset="0"/>
+                        </a:rPr>
+                        <m:t>𝑚</m:t>
+                      </m:r>
+                      <m:r>
+                        <a:rPr lang="en-US" i="1">
+                          <a:latin typeface="Cambria Math" panose="02040503050406030204" pitchFamily="18" charset="0"/>
+                        </a:rPr>
+                        <m:t> </m:t>
+                      </m:r>
+                    </m:oMath>
+                  </m:oMathPara>
+                </a14:m>
+                <a:endParaRPr lang="en-US" dirty="0"/>
+              </a:p>
+            </p:txBody>
+          </p:sp>
+        </mc:Choice>
+        <mc:Fallback>
+          <p:sp>
+            <p:nvSpPr>
+              <p:cNvPr id="34" name="TextBox 33">
+                <a:extLst>
+                  <a:ext uri="{FF2B5EF4-FFF2-40B4-BE49-F238E27FC236}">
+                    <a16:creationId xmlns:a16="http://schemas.microsoft.com/office/drawing/2014/main" id="{88460B12-1FCE-8843-9F16-F58CFB2F4128}"/>
+                  </a:ext>
+                </a:extLst>
+              </p:cNvPr>
+              <p:cNvSpPr txBox="1">
+                <a:spLocks noRot="1" noChangeAspect="1" noMove="1" noResize="1" noEditPoints="1" noAdjustHandles="1" noChangeArrowheads="1" noChangeShapeType="1" noTextEdit="1"/>
+              </p:cNvSpPr>
+              <p:nvPr/>
+            </p:nvSpPr>
+            <p:spPr>
+              <a:xfrm>
+                <a:off x="1860009" y="1956948"/>
+                <a:ext cx="2778838" cy="646331"/>
+              </a:xfrm>
+              <a:prstGeom prst="rect">
+                <a:avLst/>
+              </a:prstGeom>
+              <a:blipFill>
+                <a:blip r:embed="rId5"/>
+                <a:stretch>
+                  <a:fillRect b="-9804"/>
+                </a:stretch>
+              </a:blipFill>
+            </p:spPr>
+            <p:txBody>
+              <a:bodyPr/>
+              <a:lstStyle/>
+              <a:p>
+                <a:r>
+                  <a:rPr lang="en-DE">
+                    <a:noFill/>
+                  </a:rPr>
+                  <a:t> </a:t>
+                </a:r>
+              </a:p>
+            </p:txBody>
+          </p:sp>
+        </mc:Fallback>
+      </mc:AlternateContent>
+      <p:sp>
+        <p:nvSpPr>
+          <p:cNvPr id="37" name="TextBox 36">
+            <a:extLst>
+              <a:ext uri="{FF2B5EF4-FFF2-40B4-BE49-F238E27FC236}">
+                <a16:creationId xmlns:a16="http://schemas.microsoft.com/office/drawing/2014/main" id="{57BC08D2-26A8-3E40-BB59-5C2B6734CB97}"/>
+              </a:ext>
+            </a:extLst>
+          </p:cNvPr>
+          <p:cNvSpPr txBox="1"/>
+          <p:nvPr/>
+        </p:nvSpPr>
+        <p:spPr>
+          <a:xfrm>
+            <a:off x="878372" y="1527934"/>
+            <a:ext cx="4180440" cy="369332"/>
+          </a:xfrm>
+          <a:prstGeom prst="rect">
+            <a:avLst/>
+          </a:prstGeom>
+          <a:noFill/>
+        </p:spPr>
+        <p:txBody>
+          <a:bodyPr wrap="none" rtlCol="0">
+            <a:spAutoFit/>
+          </a:bodyPr>
+          <a:lstStyle/>
+          <a:p>
+            <a:r>
+              <a:rPr lang="en-US" dirty="0">
+                <a:solidFill>
+                  <a:schemeClr val="accent1"/>
+                </a:solidFill>
+              </a:rPr>
+              <a:t>Index</a:t>
+            </a:r>
+            <a:r>
+              <a:rPr lang="en-US" dirty="0"/>
+              <a:t> * </a:t>
+            </a:r>
+            <a:r>
+              <a:rPr lang="en-US" dirty="0">
+                <a:solidFill>
+                  <a:schemeClr val="accent6"/>
+                </a:solidFill>
+              </a:rPr>
+              <a:t>Calibration</a:t>
+            </a:r>
+            <a:r>
+              <a:rPr lang="en-US" dirty="0"/>
+              <a:t> = Calibrated coordinate</a:t>
+            </a:r>
+          </a:p>
+        </p:txBody>
+      </p:sp>
+      <p:sp>
+        <p:nvSpPr>
+          <p:cNvPr id="31" name="Oval 30">
+            <a:extLst>
+              <a:ext uri="{FF2B5EF4-FFF2-40B4-BE49-F238E27FC236}">
+                <a16:creationId xmlns:a16="http://schemas.microsoft.com/office/drawing/2014/main" id="{E3A2E411-C08A-4640-A448-A379E17AFA64}"/>
+              </a:ext>
+            </a:extLst>
+          </p:cNvPr>
+          <p:cNvSpPr/>
+          <p:nvPr/>
+        </p:nvSpPr>
+        <p:spPr>
+          <a:xfrm>
+            <a:off x="-2517887" y="2638463"/>
+            <a:ext cx="111873" cy="101703"/>
+          </a:xfrm>
+          <a:prstGeom prst="ellipse">
+            <a:avLst/>
+          </a:prstGeom>
+        </p:spPr>
+        <p:style>
+          <a:lnRef idx="2">
+            <a:schemeClr val="accent1">
+              <a:shade val="50000"/>
+            </a:schemeClr>
+          </a:lnRef>
+          <a:fillRef idx="1">
+            <a:schemeClr val="accent1"/>
+          </a:fillRef>
+          <a:effectRef idx="0">
+            <a:schemeClr val="accent1"/>
+          </a:effectRef>
+          <a:fontRef idx="minor">
+            <a:schemeClr val="lt1"/>
+          </a:fontRef>
+        </p:style>
+        <p:txBody>
+          <a:bodyPr rtlCol="0" anchor="ctr"/>
+          <a:lstStyle/>
+          <a:p>
+            <a:pPr algn="ctr"/>
+            <a:endParaRPr lang="de-DE"/>
+          </a:p>
+        </p:txBody>
+      </p:sp>
+      <p:sp>
+        <p:nvSpPr>
+          <p:cNvPr id="39" name="TextBox 38">
+            <a:extLst>
+              <a:ext uri="{FF2B5EF4-FFF2-40B4-BE49-F238E27FC236}">
+                <a16:creationId xmlns:a16="http://schemas.microsoft.com/office/drawing/2014/main" id="{D9D7C7E3-9AFF-044D-943D-8BBF70434797}"/>
+              </a:ext>
+            </a:extLst>
+          </p:cNvPr>
+          <p:cNvSpPr txBox="1"/>
+          <p:nvPr/>
+        </p:nvSpPr>
+        <p:spPr>
+          <a:xfrm>
+            <a:off x="-2949467" y="2280114"/>
+            <a:ext cx="1239442" cy="369332"/>
+          </a:xfrm>
+          <a:prstGeom prst="rect">
+            <a:avLst/>
+          </a:prstGeom>
+          <a:noFill/>
+        </p:spPr>
+        <p:txBody>
+          <a:bodyPr wrap="none" rtlCol="0">
+            <a:spAutoFit/>
+          </a:bodyPr>
+          <a:lstStyle/>
+          <a:p>
+            <a:r>
+              <a:rPr lang="en-US" dirty="0"/>
+              <a:t>Origin (0,0)</a:t>
+            </a:r>
+          </a:p>
+        </p:txBody>
+      </p:sp>
+      <p:sp>
+        <p:nvSpPr>
+          <p:cNvPr id="42" name="Rectangle 41">
+            <a:extLst>
+              <a:ext uri="{FF2B5EF4-FFF2-40B4-BE49-F238E27FC236}">
+                <a16:creationId xmlns:a16="http://schemas.microsoft.com/office/drawing/2014/main" id="{48CAE13C-FD22-8641-BB7E-A6BF7D608096}"/>
+              </a:ext>
+            </a:extLst>
+          </p:cNvPr>
+          <p:cNvSpPr/>
+          <p:nvPr/>
+        </p:nvSpPr>
+        <p:spPr>
+          <a:xfrm>
+            <a:off x="6826589" y="1960909"/>
+            <a:ext cx="620889" cy="622866"/>
+          </a:xfrm>
+          <a:prstGeom prst="rect">
+            <a:avLst/>
+          </a:prstGeom>
+          <a:noFill/>
+          <a:ln w="3175">
+            <a:solidFill>
+              <a:schemeClr val="accent1"/>
+            </a:solidFill>
+          </a:ln>
+        </p:spPr>
+        <p:style>
+          <a:lnRef idx="2">
+            <a:schemeClr val="accent1">
+              <a:shade val="50000"/>
+            </a:schemeClr>
+          </a:lnRef>
+          <a:fillRef idx="1">
+            <a:schemeClr val="accent1"/>
+          </a:fillRef>
+          <a:effectRef idx="0">
+            <a:schemeClr val="accent1"/>
+          </a:effectRef>
+          <a:fontRef idx="minor">
+            <a:schemeClr val="lt1"/>
+          </a:fontRef>
+        </p:style>
+        <p:txBody>
+          <a:bodyPr rtlCol="0" anchor="ctr"/>
+          <a:lstStyle/>
+          <a:p>
+            <a:pPr algn="ctr"/>
+            <a:endParaRPr lang="en-US"/>
+          </a:p>
+        </p:txBody>
+      </p:sp>
+      <p:sp>
+        <p:nvSpPr>
+          <p:cNvPr id="43" name="Oval 42">
+            <a:extLst>
+              <a:ext uri="{FF2B5EF4-FFF2-40B4-BE49-F238E27FC236}">
+                <a16:creationId xmlns:a16="http://schemas.microsoft.com/office/drawing/2014/main" id="{763DAF5C-7ECF-B34A-97E7-9E836119DF9B}"/>
+              </a:ext>
+            </a:extLst>
+          </p:cNvPr>
+          <p:cNvSpPr/>
+          <p:nvPr/>
+        </p:nvSpPr>
+        <p:spPr>
+          <a:xfrm>
+            <a:off x="7101933" y="2234770"/>
+            <a:ext cx="111873" cy="101703"/>
+          </a:xfrm>
+          <a:prstGeom prst="ellipse">
+            <a:avLst/>
+          </a:prstGeom>
+          <a:ln w="3175">
+            <a:solidFill>
+              <a:schemeClr val="accent1"/>
+            </a:solidFill>
+          </a:ln>
+        </p:spPr>
+        <p:style>
+          <a:lnRef idx="2">
+            <a:schemeClr val="accent1">
+              <a:shade val="50000"/>
+            </a:schemeClr>
+          </a:lnRef>
+          <a:fillRef idx="1">
+            <a:schemeClr val="accent1"/>
+          </a:fillRef>
+          <a:effectRef idx="0">
+            <a:schemeClr val="accent1"/>
+          </a:effectRef>
+          <a:fontRef idx="minor">
+            <a:schemeClr val="lt1"/>
+          </a:fontRef>
+        </p:style>
+        <p:txBody>
+          <a:bodyPr rtlCol="0" anchor="ctr"/>
+          <a:lstStyle/>
+          <a:p>
+            <a:pPr algn="ctr"/>
+            <a:endParaRPr lang="de-DE"/>
+          </a:p>
+        </p:txBody>
+      </p:sp>
+      <p:sp>
+        <p:nvSpPr>
+          <p:cNvPr id="45" name="Oval 44">
+            <a:extLst>
+              <a:ext uri="{FF2B5EF4-FFF2-40B4-BE49-F238E27FC236}">
+                <a16:creationId xmlns:a16="http://schemas.microsoft.com/office/drawing/2014/main" id="{DB55D443-BA25-3B41-8ECF-9D3D2191A651}"/>
+              </a:ext>
+            </a:extLst>
+          </p:cNvPr>
+          <p:cNvSpPr/>
+          <p:nvPr/>
+        </p:nvSpPr>
+        <p:spPr>
+          <a:xfrm>
+            <a:off x="6482976" y="2234759"/>
+            <a:ext cx="111873" cy="101703"/>
+          </a:xfrm>
+          <a:prstGeom prst="ellipse">
+            <a:avLst/>
+          </a:prstGeom>
+          <a:ln w="3175">
+            <a:solidFill>
+              <a:schemeClr val="accent1"/>
+            </a:solidFill>
+          </a:ln>
+        </p:spPr>
+        <p:style>
+          <a:lnRef idx="2">
+            <a:schemeClr val="accent1">
+              <a:shade val="50000"/>
+            </a:schemeClr>
+          </a:lnRef>
+          <a:fillRef idx="1">
+            <a:schemeClr val="accent1"/>
+          </a:fillRef>
+          <a:effectRef idx="0">
+            <a:schemeClr val="accent1"/>
+          </a:effectRef>
+          <a:fontRef idx="minor">
+            <a:schemeClr val="lt1"/>
+          </a:fontRef>
+        </p:style>
+        <p:txBody>
+          <a:bodyPr rtlCol="0" anchor="ctr"/>
+          <a:lstStyle/>
+          <a:p>
+            <a:pPr algn="ctr"/>
+            <a:endParaRPr lang="de-DE"/>
+          </a:p>
+        </p:txBody>
+      </p:sp>
+      <p:sp>
+        <p:nvSpPr>
+          <p:cNvPr id="46" name="Rectangle 45">
+            <a:extLst>
+              <a:ext uri="{FF2B5EF4-FFF2-40B4-BE49-F238E27FC236}">
+                <a16:creationId xmlns:a16="http://schemas.microsoft.com/office/drawing/2014/main" id="{09A6809A-D551-5345-9BBC-119DE5EAD72E}"/>
+              </a:ext>
+            </a:extLst>
+          </p:cNvPr>
+          <p:cNvSpPr/>
+          <p:nvPr/>
+        </p:nvSpPr>
+        <p:spPr>
+          <a:xfrm>
+            <a:off x="6208378" y="2588470"/>
+            <a:ext cx="620889" cy="620889"/>
+          </a:xfrm>
+          <a:prstGeom prst="rect">
+            <a:avLst/>
+          </a:prstGeom>
+          <a:noFill/>
+          <a:ln w="3175">
+            <a:solidFill>
+              <a:schemeClr val="accent1"/>
+            </a:solidFill>
+          </a:ln>
+        </p:spPr>
+        <p:style>
+          <a:lnRef idx="2">
+            <a:schemeClr val="accent1">
+              <a:shade val="50000"/>
+            </a:schemeClr>
+          </a:lnRef>
+          <a:fillRef idx="1">
+            <a:schemeClr val="accent1"/>
+          </a:fillRef>
+          <a:effectRef idx="0">
+            <a:schemeClr val="accent1"/>
+          </a:effectRef>
+          <a:fontRef idx="minor">
+            <a:schemeClr val="lt1"/>
+          </a:fontRef>
+        </p:style>
+        <p:txBody>
+          <a:bodyPr rtlCol="0" anchor="ctr"/>
+          <a:lstStyle/>
+          <a:p>
+            <a:pPr algn="ctr"/>
+            <a:endParaRPr lang="en-US"/>
+          </a:p>
+        </p:txBody>
+      </p:sp>
+      <p:sp>
+        <p:nvSpPr>
+          <p:cNvPr id="47" name="Rectangle 46">
+            <a:extLst>
+              <a:ext uri="{FF2B5EF4-FFF2-40B4-BE49-F238E27FC236}">
+                <a16:creationId xmlns:a16="http://schemas.microsoft.com/office/drawing/2014/main" id="{8251601A-B4CA-6042-9B18-2DFAF6CAC19C}"/>
+              </a:ext>
+            </a:extLst>
+          </p:cNvPr>
+          <p:cNvSpPr/>
+          <p:nvPr/>
+        </p:nvSpPr>
+        <p:spPr>
+          <a:xfrm>
+            <a:off x="6823181" y="2585752"/>
+            <a:ext cx="620889" cy="620889"/>
+          </a:xfrm>
+          <a:prstGeom prst="rect">
+            <a:avLst/>
+          </a:prstGeom>
+          <a:noFill/>
+          <a:ln w="3175">
+            <a:solidFill>
+              <a:schemeClr val="accent1"/>
+            </a:solidFill>
+          </a:ln>
+        </p:spPr>
+        <p:style>
+          <a:lnRef idx="2">
+            <a:schemeClr val="accent1">
+              <a:shade val="50000"/>
+            </a:schemeClr>
+          </a:lnRef>
+          <a:fillRef idx="1">
+            <a:schemeClr val="accent1"/>
+          </a:fillRef>
+          <a:effectRef idx="0">
+            <a:schemeClr val="accent1"/>
+          </a:effectRef>
+          <a:fontRef idx="minor">
+            <a:schemeClr val="lt1"/>
+          </a:fontRef>
+        </p:style>
+        <p:txBody>
+          <a:bodyPr rtlCol="0" anchor="ctr"/>
+          <a:lstStyle/>
+          <a:p>
+            <a:pPr algn="ctr"/>
+            <a:endParaRPr lang="en-US"/>
+          </a:p>
+        </p:txBody>
+      </p:sp>
+      <p:sp>
+        <p:nvSpPr>
+          <p:cNvPr id="50" name="Oval 49">
+            <a:extLst>
+              <a:ext uri="{FF2B5EF4-FFF2-40B4-BE49-F238E27FC236}">
+                <a16:creationId xmlns:a16="http://schemas.microsoft.com/office/drawing/2014/main" id="{9D45AA71-7147-1B43-B41A-C848DA37A75F}"/>
+              </a:ext>
+            </a:extLst>
+          </p:cNvPr>
+          <p:cNvSpPr/>
+          <p:nvPr/>
+        </p:nvSpPr>
+        <p:spPr>
+          <a:xfrm>
+            <a:off x="7100849" y="2839199"/>
+            <a:ext cx="111873" cy="101703"/>
+          </a:xfrm>
+          <a:prstGeom prst="ellipse">
+            <a:avLst/>
+          </a:prstGeom>
+          <a:ln w="3175">
+            <a:solidFill>
+              <a:schemeClr val="accent1"/>
+            </a:solidFill>
+          </a:ln>
+        </p:spPr>
+        <p:style>
+          <a:lnRef idx="2">
+            <a:schemeClr val="accent1">
+              <a:shade val="50000"/>
+            </a:schemeClr>
+          </a:lnRef>
+          <a:fillRef idx="1">
+            <a:schemeClr val="accent1"/>
+          </a:fillRef>
+          <a:effectRef idx="0">
+            <a:schemeClr val="accent1"/>
+          </a:effectRef>
+          <a:fontRef idx="minor">
+            <a:schemeClr val="lt1"/>
+          </a:fontRef>
+        </p:style>
+        <p:txBody>
+          <a:bodyPr rtlCol="0" anchor="ctr"/>
+          <a:lstStyle/>
+          <a:p>
+            <a:pPr algn="ctr"/>
+            <a:endParaRPr lang="de-DE"/>
+          </a:p>
+        </p:txBody>
+      </p:sp>
+      <p:sp>
+        <p:nvSpPr>
+          <p:cNvPr id="51" name="Oval 50">
+            <a:extLst>
+              <a:ext uri="{FF2B5EF4-FFF2-40B4-BE49-F238E27FC236}">
+                <a16:creationId xmlns:a16="http://schemas.microsoft.com/office/drawing/2014/main" id="{4A519C81-4020-E544-9591-F0E7C7387DE0}"/>
+              </a:ext>
+            </a:extLst>
+          </p:cNvPr>
+          <p:cNvSpPr/>
+          <p:nvPr/>
+        </p:nvSpPr>
+        <p:spPr>
+          <a:xfrm>
+            <a:off x="6482975" y="2851729"/>
+            <a:ext cx="111873" cy="101703"/>
+          </a:xfrm>
+          <a:prstGeom prst="ellipse">
+            <a:avLst/>
+          </a:prstGeom>
+          <a:ln w="3175">
+            <a:solidFill>
+              <a:schemeClr val="accent1"/>
+            </a:solidFill>
+          </a:ln>
+        </p:spPr>
+        <p:style>
+          <a:lnRef idx="2">
+            <a:schemeClr val="accent1">
+              <a:shade val="50000"/>
+            </a:schemeClr>
+          </a:lnRef>
+          <a:fillRef idx="1">
+            <a:schemeClr val="accent1"/>
+          </a:fillRef>
+          <a:effectRef idx="0">
+            <a:schemeClr val="accent1"/>
+          </a:effectRef>
+          <a:fontRef idx="minor">
+            <a:schemeClr val="lt1"/>
+          </a:fontRef>
+        </p:style>
+        <p:txBody>
+          <a:bodyPr rtlCol="0" anchor="ctr"/>
+          <a:lstStyle/>
+          <a:p>
+            <a:pPr algn="ctr"/>
+            <a:endParaRPr lang="de-DE"/>
+          </a:p>
+        </p:txBody>
+      </p:sp>
+      <p:sp>
+        <p:nvSpPr>
+          <p:cNvPr id="53" name="Oval 52">
+            <a:extLst>
+              <a:ext uri="{FF2B5EF4-FFF2-40B4-BE49-F238E27FC236}">
+                <a16:creationId xmlns:a16="http://schemas.microsoft.com/office/drawing/2014/main" id="{5751660E-140E-0145-851A-CAF8945C4609}"/>
+              </a:ext>
+            </a:extLst>
+          </p:cNvPr>
+          <p:cNvSpPr/>
+          <p:nvPr/>
+        </p:nvSpPr>
+        <p:spPr>
+          <a:xfrm>
+            <a:off x="1325321" y="2717506"/>
+            <a:ext cx="111873" cy="101703"/>
+          </a:xfrm>
+          <a:prstGeom prst="ellipse">
+            <a:avLst/>
+          </a:prstGeom>
+        </p:spPr>
+        <p:style>
+          <a:lnRef idx="2">
+            <a:schemeClr val="accent1">
+              <a:shade val="50000"/>
+            </a:schemeClr>
+          </a:lnRef>
+          <a:fillRef idx="1">
+            <a:schemeClr val="accent1"/>
+          </a:fillRef>
+          <a:effectRef idx="0">
+            <a:schemeClr val="accent1"/>
+          </a:effectRef>
+          <a:fontRef idx="minor">
+            <a:schemeClr val="lt1"/>
+          </a:fontRef>
+        </p:style>
+        <p:txBody>
+          <a:bodyPr rtlCol="0" anchor="ctr"/>
+          <a:lstStyle/>
+          <a:p>
+            <a:pPr algn="ctr"/>
+            <a:endParaRPr lang="de-DE"/>
+          </a:p>
+        </p:txBody>
+      </p:sp>
+      <p:sp>
+        <p:nvSpPr>
+          <p:cNvPr id="54" name="TextBox 53">
+            <a:extLst>
+              <a:ext uri="{FF2B5EF4-FFF2-40B4-BE49-F238E27FC236}">
+                <a16:creationId xmlns:a16="http://schemas.microsoft.com/office/drawing/2014/main" id="{FD20AB59-7596-1E4D-84E1-770249E3B1CE}"/>
+              </a:ext>
+            </a:extLst>
+          </p:cNvPr>
+          <p:cNvSpPr txBox="1"/>
+          <p:nvPr/>
+        </p:nvSpPr>
+        <p:spPr>
+          <a:xfrm>
+            <a:off x="939561" y="2361984"/>
+            <a:ext cx="617477" cy="369332"/>
+          </a:xfrm>
+          <a:prstGeom prst="rect">
+            <a:avLst/>
+          </a:prstGeom>
+          <a:noFill/>
+        </p:spPr>
+        <p:txBody>
+          <a:bodyPr wrap="none" rtlCol="0">
+            <a:spAutoFit/>
+          </a:bodyPr>
+          <a:lstStyle/>
+          <a:p>
+            <a:r>
+              <a:rPr lang="en-US" dirty="0"/>
+              <a:t>(0,0)</a:t>
+            </a:r>
+          </a:p>
+        </p:txBody>
+      </p:sp>
+      <p:sp>
+        <p:nvSpPr>
+          <p:cNvPr id="55" name="Rectangle 54">
+            <a:extLst>
+              <a:ext uri="{FF2B5EF4-FFF2-40B4-BE49-F238E27FC236}">
+                <a16:creationId xmlns:a16="http://schemas.microsoft.com/office/drawing/2014/main" id="{3ECDB614-08E4-B84B-B059-A3A25D9BABF9}"/>
+              </a:ext>
+            </a:extLst>
+          </p:cNvPr>
+          <p:cNvSpPr/>
+          <p:nvPr/>
+        </p:nvSpPr>
+        <p:spPr>
+          <a:xfrm>
+            <a:off x="5867441" y="3925438"/>
+            <a:ext cx="620889" cy="620889"/>
+          </a:xfrm>
+          <a:prstGeom prst="rect">
+            <a:avLst/>
+          </a:prstGeom>
+          <a:noFill/>
+          <a:ln w="3175">
+            <a:solidFill>
+              <a:schemeClr val="accent1"/>
+            </a:solidFill>
+          </a:ln>
+        </p:spPr>
+        <p:style>
+          <a:lnRef idx="2">
+            <a:schemeClr val="accent1">
+              <a:shade val="50000"/>
+            </a:schemeClr>
+          </a:lnRef>
+          <a:fillRef idx="1">
+            <a:schemeClr val="accent1"/>
+          </a:fillRef>
+          <a:effectRef idx="0">
+            <a:schemeClr val="accent1"/>
+          </a:effectRef>
+          <a:fontRef idx="minor">
+            <a:schemeClr val="lt1"/>
+          </a:fontRef>
+        </p:style>
+        <p:txBody>
+          <a:bodyPr rtlCol="0" anchor="ctr"/>
+          <a:lstStyle/>
+          <a:p>
+            <a:pPr algn="ctr"/>
+            <a:endParaRPr lang="en-US"/>
+          </a:p>
+        </p:txBody>
+      </p:sp>
+      <p:sp>
+        <p:nvSpPr>
+          <p:cNvPr id="56" name="Rectangle 55">
+            <a:extLst>
+              <a:ext uri="{FF2B5EF4-FFF2-40B4-BE49-F238E27FC236}">
+                <a16:creationId xmlns:a16="http://schemas.microsoft.com/office/drawing/2014/main" id="{4D25AA18-E956-3249-A1EB-255C7A94047E}"/>
+              </a:ext>
+            </a:extLst>
+          </p:cNvPr>
+          <p:cNvSpPr/>
+          <p:nvPr/>
+        </p:nvSpPr>
+        <p:spPr>
+          <a:xfrm>
+            <a:off x="6488916" y="3925438"/>
+            <a:ext cx="620889" cy="622866"/>
+          </a:xfrm>
+          <a:prstGeom prst="rect">
+            <a:avLst/>
+          </a:prstGeom>
+          <a:noFill/>
+          <a:ln w="3175">
+            <a:solidFill>
+              <a:schemeClr val="accent1"/>
+            </a:solidFill>
+          </a:ln>
+        </p:spPr>
+        <p:style>
+          <a:lnRef idx="2">
+            <a:schemeClr val="accent1">
+              <a:shade val="50000"/>
+            </a:schemeClr>
+          </a:lnRef>
+          <a:fillRef idx="1">
+            <a:schemeClr val="accent1"/>
+          </a:fillRef>
+          <a:effectRef idx="0">
+            <a:schemeClr val="accent1"/>
+          </a:effectRef>
+          <a:fontRef idx="minor">
+            <a:schemeClr val="lt1"/>
+          </a:fontRef>
+        </p:style>
+        <p:txBody>
+          <a:bodyPr rtlCol="0" anchor="ctr"/>
+          <a:lstStyle/>
+          <a:p>
+            <a:pPr algn="ctr"/>
+            <a:endParaRPr lang="en-US"/>
+          </a:p>
+        </p:txBody>
+      </p:sp>
+      <p:sp>
+        <p:nvSpPr>
+          <p:cNvPr id="57" name="Oval 56">
+            <a:extLst>
+              <a:ext uri="{FF2B5EF4-FFF2-40B4-BE49-F238E27FC236}">
+                <a16:creationId xmlns:a16="http://schemas.microsoft.com/office/drawing/2014/main" id="{344849D5-8831-8A42-B522-DBC05A1B7719}"/>
+              </a:ext>
+            </a:extLst>
+          </p:cNvPr>
+          <p:cNvSpPr/>
+          <p:nvPr/>
+        </p:nvSpPr>
+        <p:spPr>
+          <a:xfrm>
+            <a:off x="6758319" y="4209197"/>
+            <a:ext cx="111873" cy="101703"/>
+          </a:xfrm>
+          <a:prstGeom prst="ellipse">
+            <a:avLst/>
+          </a:prstGeom>
+          <a:ln w="3175">
+            <a:solidFill>
+              <a:schemeClr val="accent1"/>
+            </a:solidFill>
+          </a:ln>
+        </p:spPr>
+        <p:style>
+          <a:lnRef idx="2">
+            <a:schemeClr val="accent1">
+              <a:shade val="50000"/>
+            </a:schemeClr>
+          </a:lnRef>
+          <a:fillRef idx="1">
+            <a:schemeClr val="accent1"/>
+          </a:fillRef>
+          <a:effectRef idx="0">
+            <a:schemeClr val="accent1"/>
+          </a:effectRef>
+          <a:fontRef idx="minor">
+            <a:schemeClr val="lt1"/>
+          </a:fontRef>
+        </p:style>
+        <p:txBody>
+          <a:bodyPr rtlCol="0" anchor="ctr"/>
+          <a:lstStyle/>
+          <a:p>
+            <a:pPr algn="ctr"/>
+            <a:endParaRPr lang="de-DE"/>
+          </a:p>
+        </p:txBody>
+      </p:sp>
+      <p:sp>
+        <p:nvSpPr>
+          <p:cNvPr id="58" name="Oval 57">
+            <a:extLst>
+              <a:ext uri="{FF2B5EF4-FFF2-40B4-BE49-F238E27FC236}">
+                <a16:creationId xmlns:a16="http://schemas.microsoft.com/office/drawing/2014/main" id="{129ADD01-0F5D-BC47-80E5-90FC9622DCE1}"/>
+              </a:ext>
+            </a:extLst>
+          </p:cNvPr>
+          <p:cNvSpPr/>
+          <p:nvPr/>
+        </p:nvSpPr>
+        <p:spPr>
+          <a:xfrm>
+            <a:off x="6139362" y="4197311"/>
+            <a:ext cx="111873" cy="101703"/>
+          </a:xfrm>
+          <a:prstGeom prst="ellipse">
+            <a:avLst/>
+          </a:prstGeom>
+          <a:ln w="3175">
+            <a:solidFill>
+              <a:schemeClr val="accent1"/>
+            </a:solidFill>
+          </a:ln>
+        </p:spPr>
+        <p:style>
+          <a:lnRef idx="2">
+            <a:schemeClr val="accent1">
+              <a:shade val="50000"/>
+            </a:schemeClr>
+          </a:lnRef>
+          <a:fillRef idx="1">
+            <a:schemeClr val="accent1"/>
+          </a:fillRef>
+          <a:effectRef idx="0">
+            <a:schemeClr val="accent1"/>
+          </a:effectRef>
+          <a:fontRef idx="minor">
+            <a:schemeClr val="lt1"/>
+          </a:fontRef>
+        </p:style>
+        <p:txBody>
+          <a:bodyPr rtlCol="0" anchor="ctr"/>
+          <a:lstStyle/>
+          <a:p>
+            <a:pPr algn="ctr"/>
+            <a:endParaRPr lang="de-DE"/>
+          </a:p>
+        </p:txBody>
+      </p:sp>
+      <p:sp>
+        <p:nvSpPr>
+          <p:cNvPr id="63" name="Rectangle 62">
+            <a:extLst>
+              <a:ext uri="{FF2B5EF4-FFF2-40B4-BE49-F238E27FC236}">
+                <a16:creationId xmlns:a16="http://schemas.microsoft.com/office/drawing/2014/main" id="{0606488C-8987-DA49-8D5F-008726E7F71D}"/>
+              </a:ext>
+            </a:extLst>
+          </p:cNvPr>
+          <p:cNvSpPr/>
+          <p:nvPr/>
+        </p:nvSpPr>
+        <p:spPr>
+          <a:xfrm>
+            <a:off x="7110390" y="3925438"/>
+            <a:ext cx="620889" cy="622866"/>
+          </a:xfrm>
+          <a:prstGeom prst="rect">
+            <a:avLst/>
+          </a:prstGeom>
+          <a:noFill/>
+          <a:ln w="3175">
+            <a:solidFill>
+              <a:schemeClr val="accent1"/>
+            </a:solidFill>
+          </a:ln>
+        </p:spPr>
+        <p:style>
+          <a:lnRef idx="2">
+            <a:schemeClr val="accent1">
+              <a:shade val="50000"/>
+            </a:schemeClr>
+          </a:lnRef>
+          <a:fillRef idx="1">
+            <a:schemeClr val="accent1"/>
+          </a:fillRef>
+          <a:effectRef idx="0">
+            <a:schemeClr val="accent1"/>
+          </a:effectRef>
+          <a:fontRef idx="minor">
+            <a:schemeClr val="lt1"/>
+          </a:fontRef>
+        </p:style>
+        <p:txBody>
+          <a:bodyPr rtlCol="0" anchor="ctr"/>
+          <a:lstStyle/>
+          <a:p>
+            <a:pPr algn="ctr"/>
+            <a:endParaRPr lang="en-US"/>
+          </a:p>
+        </p:txBody>
+      </p:sp>
+      <p:sp>
+        <p:nvSpPr>
+          <p:cNvPr id="64" name="Oval 63">
+            <a:extLst>
+              <a:ext uri="{FF2B5EF4-FFF2-40B4-BE49-F238E27FC236}">
+                <a16:creationId xmlns:a16="http://schemas.microsoft.com/office/drawing/2014/main" id="{8E0C95EB-3D0A-C44A-A7B3-FC2063229746}"/>
+              </a:ext>
+            </a:extLst>
+          </p:cNvPr>
+          <p:cNvSpPr/>
+          <p:nvPr/>
+        </p:nvSpPr>
+        <p:spPr>
+          <a:xfrm>
+            <a:off x="7397609" y="4207220"/>
+            <a:ext cx="111873" cy="101703"/>
+          </a:xfrm>
+          <a:prstGeom prst="ellipse">
+            <a:avLst/>
+          </a:prstGeom>
+          <a:ln w="3175">
+            <a:solidFill>
+              <a:schemeClr val="accent1"/>
+            </a:solidFill>
+          </a:ln>
+        </p:spPr>
+        <p:style>
+          <a:lnRef idx="2">
+            <a:schemeClr val="accent1">
+              <a:shade val="50000"/>
+            </a:schemeClr>
+          </a:lnRef>
+          <a:fillRef idx="1">
+            <a:schemeClr val="accent1"/>
+          </a:fillRef>
+          <a:effectRef idx="0">
+            <a:schemeClr val="accent1"/>
+          </a:effectRef>
+          <a:fontRef idx="minor">
+            <a:schemeClr val="lt1"/>
+          </a:fontRef>
+        </p:style>
+        <p:txBody>
+          <a:bodyPr rtlCol="0" anchor="ctr"/>
+          <a:lstStyle/>
+          <a:p>
+            <a:pPr algn="ctr"/>
+            <a:endParaRPr lang="de-DE"/>
+          </a:p>
+        </p:txBody>
+      </p:sp>
+      <p:sp>
+        <p:nvSpPr>
+          <p:cNvPr id="67" name="Rectangle 66">
+            <a:extLst>
+              <a:ext uri="{FF2B5EF4-FFF2-40B4-BE49-F238E27FC236}">
+                <a16:creationId xmlns:a16="http://schemas.microsoft.com/office/drawing/2014/main" id="{EA38448F-0BB0-2B44-81BF-205887D988D5}"/>
+              </a:ext>
+            </a:extLst>
+          </p:cNvPr>
+          <p:cNvSpPr/>
+          <p:nvPr/>
+        </p:nvSpPr>
+        <p:spPr>
+          <a:xfrm>
+            <a:off x="5865466" y="4564728"/>
+            <a:ext cx="620889" cy="620889"/>
+          </a:xfrm>
+          <a:prstGeom prst="rect">
+            <a:avLst/>
+          </a:prstGeom>
+          <a:noFill/>
+          <a:ln w="3175">
+            <a:solidFill>
+              <a:schemeClr val="accent1"/>
+            </a:solidFill>
+          </a:ln>
+        </p:spPr>
+        <p:style>
+          <a:lnRef idx="2">
+            <a:schemeClr val="accent1">
+              <a:shade val="50000"/>
+            </a:schemeClr>
+          </a:lnRef>
+          <a:fillRef idx="1">
+            <a:schemeClr val="accent1"/>
+          </a:fillRef>
+          <a:effectRef idx="0">
+            <a:schemeClr val="accent1"/>
+          </a:effectRef>
+          <a:fontRef idx="minor">
+            <a:schemeClr val="lt1"/>
+          </a:fontRef>
+        </p:style>
+        <p:txBody>
+          <a:bodyPr rtlCol="0" anchor="ctr"/>
+          <a:lstStyle/>
+          <a:p>
+            <a:pPr algn="ctr"/>
+            <a:endParaRPr lang="en-US"/>
+          </a:p>
+        </p:txBody>
+      </p:sp>
+      <p:sp>
+        <p:nvSpPr>
+          <p:cNvPr id="68" name="Rectangle 67">
+            <a:extLst>
+              <a:ext uri="{FF2B5EF4-FFF2-40B4-BE49-F238E27FC236}">
+                <a16:creationId xmlns:a16="http://schemas.microsoft.com/office/drawing/2014/main" id="{1954E40F-5F0E-A641-A378-925AAB1C9E51}"/>
+              </a:ext>
+            </a:extLst>
+          </p:cNvPr>
+          <p:cNvSpPr/>
+          <p:nvPr/>
+        </p:nvSpPr>
+        <p:spPr>
+          <a:xfrm>
+            <a:off x="6486941" y="4564728"/>
+            <a:ext cx="620889" cy="622866"/>
+          </a:xfrm>
+          <a:prstGeom prst="rect">
+            <a:avLst/>
+          </a:prstGeom>
+          <a:noFill/>
+          <a:ln w="3175">
+            <a:solidFill>
+              <a:schemeClr val="accent1"/>
+            </a:solidFill>
+          </a:ln>
+        </p:spPr>
+        <p:style>
+          <a:lnRef idx="2">
+            <a:schemeClr val="accent1">
+              <a:shade val="50000"/>
+            </a:schemeClr>
+          </a:lnRef>
+          <a:fillRef idx="1">
+            <a:schemeClr val="accent1"/>
+          </a:fillRef>
+          <a:effectRef idx="0">
+            <a:schemeClr val="accent1"/>
+          </a:effectRef>
+          <a:fontRef idx="minor">
+            <a:schemeClr val="lt1"/>
+          </a:fontRef>
+        </p:style>
+        <p:txBody>
+          <a:bodyPr rtlCol="0" anchor="ctr"/>
+          <a:lstStyle/>
+          <a:p>
+            <a:pPr algn="ctr"/>
+            <a:endParaRPr lang="en-US"/>
+          </a:p>
+        </p:txBody>
+      </p:sp>
+      <p:sp>
+        <p:nvSpPr>
+          <p:cNvPr id="69" name="Oval 68">
+            <a:extLst>
+              <a:ext uri="{FF2B5EF4-FFF2-40B4-BE49-F238E27FC236}">
+                <a16:creationId xmlns:a16="http://schemas.microsoft.com/office/drawing/2014/main" id="{244255EB-2C4B-1542-B222-2DFF04D842CE}"/>
+              </a:ext>
+            </a:extLst>
+          </p:cNvPr>
+          <p:cNvSpPr/>
+          <p:nvPr/>
+        </p:nvSpPr>
+        <p:spPr>
+          <a:xfrm>
+            <a:off x="6756344" y="4848487"/>
+            <a:ext cx="111873" cy="101703"/>
+          </a:xfrm>
+          <a:prstGeom prst="ellipse">
+            <a:avLst/>
+          </a:prstGeom>
+          <a:ln w="3175">
+            <a:solidFill>
+              <a:schemeClr val="accent1"/>
+            </a:solidFill>
+          </a:ln>
+        </p:spPr>
+        <p:style>
+          <a:lnRef idx="2">
+            <a:schemeClr val="accent1">
+              <a:shade val="50000"/>
+            </a:schemeClr>
+          </a:lnRef>
+          <a:fillRef idx="1">
+            <a:schemeClr val="accent1"/>
+          </a:fillRef>
+          <a:effectRef idx="0">
+            <a:schemeClr val="accent1"/>
+          </a:effectRef>
+          <a:fontRef idx="minor">
+            <a:schemeClr val="lt1"/>
+          </a:fontRef>
+        </p:style>
+        <p:txBody>
+          <a:bodyPr rtlCol="0" anchor="ctr"/>
+          <a:lstStyle/>
+          <a:p>
+            <a:pPr algn="ctr"/>
+            <a:endParaRPr lang="de-DE"/>
+          </a:p>
+        </p:txBody>
+      </p:sp>
+      <p:sp>
+        <p:nvSpPr>
+          <p:cNvPr id="70" name="Oval 69">
+            <a:extLst>
+              <a:ext uri="{FF2B5EF4-FFF2-40B4-BE49-F238E27FC236}">
+                <a16:creationId xmlns:a16="http://schemas.microsoft.com/office/drawing/2014/main" id="{AB561325-B46C-8E47-A8C9-668BFE6A6976}"/>
+              </a:ext>
+            </a:extLst>
+          </p:cNvPr>
+          <p:cNvSpPr/>
+          <p:nvPr/>
+        </p:nvSpPr>
+        <p:spPr>
+          <a:xfrm>
+            <a:off x="6137387" y="4836601"/>
+            <a:ext cx="111873" cy="101703"/>
+          </a:xfrm>
+          <a:prstGeom prst="ellipse">
+            <a:avLst/>
+          </a:prstGeom>
+          <a:ln w="3175">
+            <a:solidFill>
+              <a:schemeClr val="accent1"/>
+            </a:solidFill>
+          </a:ln>
+        </p:spPr>
+        <p:style>
+          <a:lnRef idx="2">
+            <a:schemeClr val="accent1">
+              <a:shade val="50000"/>
+            </a:schemeClr>
+          </a:lnRef>
+          <a:fillRef idx="1">
+            <a:schemeClr val="accent1"/>
+          </a:fillRef>
+          <a:effectRef idx="0">
+            <a:schemeClr val="accent1"/>
+          </a:effectRef>
+          <a:fontRef idx="minor">
+            <a:schemeClr val="lt1"/>
+          </a:fontRef>
+        </p:style>
+        <p:txBody>
+          <a:bodyPr rtlCol="0" anchor="ctr"/>
+          <a:lstStyle/>
+          <a:p>
+            <a:pPr algn="ctr"/>
+            <a:endParaRPr lang="de-DE"/>
+          </a:p>
+        </p:txBody>
+      </p:sp>
+      <p:sp>
+        <p:nvSpPr>
+          <p:cNvPr id="71" name="Rectangle 70">
+            <a:extLst>
+              <a:ext uri="{FF2B5EF4-FFF2-40B4-BE49-F238E27FC236}">
+                <a16:creationId xmlns:a16="http://schemas.microsoft.com/office/drawing/2014/main" id="{29A5EAAB-8EE9-AE4B-AADF-6E3893BDBD00}"/>
+              </a:ext>
+            </a:extLst>
+          </p:cNvPr>
+          <p:cNvSpPr/>
+          <p:nvPr/>
+        </p:nvSpPr>
+        <p:spPr>
+          <a:xfrm>
+            <a:off x="7108415" y="4564728"/>
+            <a:ext cx="620889" cy="622866"/>
+          </a:xfrm>
+          <a:prstGeom prst="rect">
+            <a:avLst/>
+          </a:prstGeom>
+          <a:noFill/>
+          <a:ln w="3175">
+            <a:solidFill>
+              <a:schemeClr val="accent1"/>
+            </a:solidFill>
+          </a:ln>
+        </p:spPr>
+        <p:style>
+          <a:lnRef idx="2">
+            <a:schemeClr val="accent1">
+              <a:shade val="50000"/>
+            </a:schemeClr>
+          </a:lnRef>
+          <a:fillRef idx="1">
+            <a:schemeClr val="accent1"/>
+          </a:fillRef>
+          <a:effectRef idx="0">
+            <a:schemeClr val="accent1"/>
+          </a:effectRef>
+          <a:fontRef idx="minor">
+            <a:schemeClr val="lt1"/>
+          </a:fontRef>
+        </p:style>
+        <p:txBody>
+          <a:bodyPr rtlCol="0" anchor="ctr"/>
+          <a:lstStyle/>
+          <a:p>
+            <a:pPr algn="ctr"/>
+            <a:endParaRPr lang="en-US"/>
+          </a:p>
+        </p:txBody>
+      </p:sp>
+      <p:sp>
+        <p:nvSpPr>
+          <p:cNvPr id="72" name="Oval 71">
+            <a:extLst>
+              <a:ext uri="{FF2B5EF4-FFF2-40B4-BE49-F238E27FC236}">
+                <a16:creationId xmlns:a16="http://schemas.microsoft.com/office/drawing/2014/main" id="{E30368C8-6B5A-6C49-99E4-80CA4C716B2D}"/>
+              </a:ext>
+            </a:extLst>
+          </p:cNvPr>
+          <p:cNvSpPr/>
+          <p:nvPr/>
+        </p:nvSpPr>
+        <p:spPr>
+          <a:xfrm>
+            <a:off x="7395634" y="4846510"/>
+            <a:ext cx="111873" cy="101703"/>
+          </a:xfrm>
+          <a:prstGeom prst="ellipse">
+            <a:avLst/>
+          </a:prstGeom>
+          <a:ln w="3175">
+            <a:solidFill>
+              <a:schemeClr val="accent1"/>
+            </a:solidFill>
+          </a:ln>
+        </p:spPr>
+        <p:style>
+          <a:lnRef idx="2">
+            <a:schemeClr val="accent1">
+              <a:shade val="50000"/>
+            </a:schemeClr>
+          </a:lnRef>
+          <a:fillRef idx="1">
+            <a:schemeClr val="accent1"/>
+          </a:fillRef>
+          <a:effectRef idx="0">
+            <a:schemeClr val="accent1"/>
+          </a:effectRef>
+          <a:fontRef idx="minor">
+            <a:schemeClr val="lt1"/>
+          </a:fontRef>
+        </p:style>
+        <p:txBody>
+          <a:bodyPr rtlCol="0" anchor="ctr"/>
+          <a:lstStyle/>
+          <a:p>
+            <a:pPr algn="ctr"/>
+            <a:endParaRPr lang="de-DE"/>
+          </a:p>
+        </p:txBody>
+      </p:sp>
+      <p:sp>
+        <p:nvSpPr>
+          <p:cNvPr id="4" name="Rectangle 3">
+            <a:extLst>
+              <a:ext uri="{FF2B5EF4-FFF2-40B4-BE49-F238E27FC236}">
+                <a16:creationId xmlns:a16="http://schemas.microsoft.com/office/drawing/2014/main" id="{BC891B27-A604-284A-B6C8-ABBE46C05EA8}"/>
+              </a:ext>
+            </a:extLst>
+          </p:cNvPr>
+          <p:cNvSpPr/>
+          <p:nvPr/>
+        </p:nvSpPr>
+        <p:spPr>
+          <a:xfrm>
+            <a:off x="5865465" y="3935565"/>
+            <a:ext cx="1871519" cy="1250269"/>
+          </a:xfrm>
+          <a:prstGeom prst="rect">
+            <a:avLst/>
+          </a:prstGeom>
+          <a:solidFill>
+            <a:schemeClr val="accent1">
+              <a:alpha val="46000"/>
+            </a:schemeClr>
+          </a:solidFill>
+        </p:spPr>
+        <p:style>
+          <a:lnRef idx="2">
+            <a:schemeClr val="accent1">
+              <a:shade val="50000"/>
+            </a:schemeClr>
+          </a:lnRef>
+          <a:fillRef idx="1">
+            <a:schemeClr val="accent1"/>
+          </a:fillRef>
+          <a:effectRef idx="0">
+            <a:schemeClr val="accent1"/>
+          </a:effectRef>
+          <a:fontRef idx="minor">
+            <a:schemeClr val="lt1"/>
+          </a:fontRef>
+        </p:style>
+        <p:txBody>
+          <a:bodyPr rtlCol="0" anchor="ctr"/>
+          <a:lstStyle/>
+          <a:p>
+            <a:pPr algn="ctr"/>
+            <a:endParaRPr lang="de-DE" dirty="0"/>
+          </a:p>
+        </p:txBody>
+      </p:sp>
+      <p:sp>
+        <p:nvSpPr>
+          <p:cNvPr id="14" name="Oval 13">
+            <a:extLst>
+              <a:ext uri="{FF2B5EF4-FFF2-40B4-BE49-F238E27FC236}">
+                <a16:creationId xmlns:a16="http://schemas.microsoft.com/office/drawing/2014/main" id="{1EFBBFBF-1AB9-90C2-ADA6-827A74E37748}"/>
+              </a:ext>
+            </a:extLst>
+          </p:cNvPr>
+          <p:cNvSpPr/>
+          <p:nvPr/>
+        </p:nvSpPr>
+        <p:spPr>
+          <a:xfrm>
+            <a:off x="3137555" y="3674974"/>
+            <a:ext cx="111873" cy="101703"/>
+          </a:xfrm>
+          <a:prstGeom prst="ellipse">
+            <a:avLst/>
+          </a:prstGeom>
+          <a:solidFill>
+            <a:srgbClr val="FFFF00"/>
+          </a:solidFill>
+        </p:spPr>
+        <p:style>
+          <a:lnRef idx="2">
+            <a:schemeClr val="accent1">
+              <a:shade val="50000"/>
+            </a:schemeClr>
+          </a:lnRef>
+          <a:fillRef idx="1">
+            <a:schemeClr val="accent1"/>
+          </a:fillRef>
+          <a:effectRef idx="0">
+            <a:schemeClr val="accent1"/>
+          </a:effectRef>
+          <a:fontRef idx="minor">
+            <a:schemeClr val="lt1"/>
+          </a:fontRef>
+        </p:style>
+        <p:txBody>
+          <a:bodyPr rtlCol="0" anchor="ctr"/>
+          <a:lstStyle/>
+          <a:p>
+            <a:pPr algn="ctr"/>
+            <a:endParaRPr lang="de-DE"/>
+          </a:p>
+        </p:txBody>
+      </p:sp>
+    </p:spTree>
+    <p:extLst>
+      <p:ext uri="{BB962C8B-B14F-4D97-AF65-F5344CB8AC3E}">
+        <p14:creationId xmlns:p14="http://schemas.microsoft.com/office/powerpoint/2010/main" val="3647780881"/>
+      </p:ext>
+    </p:extLst>
+  </p:cSld>
+  <p:clrMapOvr>
+    <a:masterClrMapping/>
+  </p:clrMapOvr>
+</p:sld>
+</file>
+
+<file path=ppt/slides/slide2.xml><?xml version="1.0" encoding="utf-8"?>
+<p:sld xmlns:a="http://schemas.openxmlformats.org/drawingml/2006/main" xmlns:r="http://schemas.openxmlformats.org/officeDocument/2006/relationships" xmlns:p="http://schemas.openxmlformats.org/presentationml/2006/main">
+  <p:cSld>
+    <p:spTree>
+      <p:nvGrpSpPr>
+        <p:cNvPr id="1" name=""/>
+        <p:cNvGrpSpPr/>
+        <p:nvPr/>
+      </p:nvGrpSpPr>
+      <p:grpSpPr>
+        <a:xfrm>
+          <a:off x="0" y="0"/>
+          <a:ext cx="0" cy="0"/>
+          <a:chOff x="0" y="0"/>
+          <a:chExt cx="0" cy="0"/>
+        </a:xfrm>
+      </p:grpSpPr>
       <p:sp>
         <p:nvSpPr>
           <p:cNvPr id="8" name="Rectangle 7"/>
@@ -4111,2096 +6181,6 @@
         </p:blipFill>
         <p:spPr>
           <a:xfrm>
-            <a:off x="3162603" y="2805885"/>
-            <a:ext cx="1505044" cy="1403230"/>
-          </a:xfrm>
-          <a:prstGeom prst="rect">
-            <a:avLst/>
-          </a:prstGeom>
-        </p:spPr>
-      </p:pic>
-      <p:cxnSp>
-        <p:nvCxnSpPr>
-          <p:cNvPr id="17" name="Straight Arrow Connector 16">
-            <a:extLst>
-              <a:ext uri="{FF2B5EF4-FFF2-40B4-BE49-F238E27FC236}">
-                <a16:creationId xmlns:a16="http://schemas.microsoft.com/office/drawing/2014/main" id="{41669CEC-161B-CC4F-BF1C-7A07D489D1E7}"/>
-              </a:ext>
-            </a:extLst>
-          </p:cNvPr>
-          <p:cNvCxnSpPr>
-            <a:cxnSpLocks/>
-            <a:stCxn id="34" idx="2"/>
-          </p:cNvCxnSpPr>
-          <p:nvPr/>
-        </p:nvCxnSpPr>
-        <p:spPr>
-          <a:xfrm>
-            <a:off x="3086356" y="2457944"/>
-            <a:ext cx="704913" cy="981381"/>
-          </a:xfrm>
-          <a:prstGeom prst="straightConnector1">
-            <a:avLst/>
-          </a:prstGeom>
-          <a:ln w="25400">
-            <a:solidFill>
-              <a:schemeClr val="accent1"/>
-            </a:solidFill>
-            <a:tailEnd type="triangle"/>
-          </a:ln>
-        </p:spPr>
-        <p:style>
-          <a:lnRef idx="1">
-            <a:schemeClr val="accent1"/>
-          </a:lnRef>
-          <a:fillRef idx="0">
-            <a:schemeClr val="accent1"/>
-          </a:fillRef>
-          <a:effectRef idx="0">
-            <a:schemeClr val="accent1"/>
-          </a:effectRef>
-          <a:fontRef idx="minor">
-            <a:schemeClr val="tx1"/>
-          </a:fontRef>
-        </p:style>
-      </p:cxnSp>
-      <mc:AlternateContent xmlns:mc="http://schemas.openxmlformats.org/markup-compatibility/2006">
-        <mc:Choice xmlns:a14="http://schemas.microsoft.com/office/drawing/2010/main" Requires="a14">
-          <p:sp>
-            <p:nvSpPr>
-              <p:cNvPr id="34" name="TextBox 33">
-                <a:extLst>
-                  <a:ext uri="{FF2B5EF4-FFF2-40B4-BE49-F238E27FC236}">
-                    <a16:creationId xmlns:a16="http://schemas.microsoft.com/office/drawing/2014/main" id="{88460B12-1FCE-8843-9F16-F58CFB2F4128}"/>
-                  </a:ext>
-                </a:extLst>
-              </p:cNvPr>
-              <p:cNvSpPr txBox="1"/>
-              <p:nvPr/>
-            </p:nvSpPr>
-            <p:spPr>
-              <a:xfrm>
-                <a:off x="1351490" y="1811613"/>
-                <a:ext cx="3469731" cy="646331"/>
-              </a:xfrm>
-              <a:prstGeom prst="rect">
-                <a:avLst/>
-              </a:prstGeom>
-              <a:noFill/>
-            </p:spPr>
-            <p:txBody>
-              <a:bodyPr wrap="none" rtlCol="0">
-                <a:spAutoFit/>
-              </a:bodyPr>
-              <a:lstStyle/>
-              <a:p>
-                <a:pPr/>
-                <a14:m>
-                  <m:oMathPara xmlns:m="http://schemas.openxmlformats.org/officeDocument/2006/math">
-                    <m:oMathParaPr>
-                      <m:jc m:val="centerGroup"/>
-                    </m:oMathParaPr>
-                    <m:oMath xmlns:m="http://schemas.openxmlformats.org/officeDocument/2006/math">
-                      <m:r>
-                        <a:rPr lang="en-US" b="0" i="1" smtClean="0">
-                          <a:latin typeface="Cambria Math" panose="02040503050406030204" pitchFamily="18" charset="0"/>
-                        </a:rPr>
-                        <m:t>𝑥</m:t>
-                      </m:r>
-                      <m:r>
-                        <a:rPr lang="en-US" i="1" smtClean="0">
-                          <a:latin typeface="Cambria Math" panose="02040503050406030204" pitchFamily="18" charset="0"/>
-                        </a:rPr>
-                        <m:t>=</m:t>
-                      </m:r>
-                      <m:r>
-                        <a:rPr lang="en-US" b="0" i="1" smtClean="0">
-                          <a:solidFill>
-                            <a:schemeClr val="accent1"/>
-                          </a:solidFill>
-                          <a:latin typeface="Cambria Math" panose="02040503050406030204" pitchFamily="18" charset="0"/>
-                        </a:rPr>
-                        <m:t>139</m:t>
-                      </m:r>
-                      <m:r>
-                        <a:rPr lang="en-US" b="0" i="1" smtClean="0">
-                          <a:latin typeface="Cambria Math" panose="02040503050406030204" pitchFamily="18" charset="0"/>
-                        </a:rPr>
-                        <m:t> ∗ </m:t>
-                      </m:r>
-                      <m:r>
-                        <a:rPr lang="en-US" b="0" i="1" smtClean="0">
-                          <a:solidFill>
-                            <a:schemeClr val="accent6"/>
-                          </a:solidFill>
-                          <a:latin typeface="Cambria Math" panose="02040503050406030204" pitchFamily="18" charset="0"/>
-                        </a:rPr>
-                        <m:t>0.13 µ</m:t>
-                      </m:r>
-                      <m:r>
-                        <a:rPr lang="en-US" b="0" i="1" smtClean="0">
-                          <a:solidFill>
-                            <a:schemeClr val="accent6"/>
-                          </a:solidFill>
-                          <a:latin typeface="Cambria Math" panose="02040503050406030204" pitchFamily="18" charset="0"/>
-                        </a:rPr>
-                        <m:t>𝑚</m:t>
-                      </m:r>
-                      <m:r>
-                        <a:rPr lang="en-US" b="0" i="1" smtClean="0">
-                          <a:latin typeface="Cambria Math" panose="02040503050406030204" pitchFamily="18" charset="0"/>
-                        </a:rPr>
-                        <m:t>=18.07 µ</m:t>
-                      </m:r>
-                      <m:r>
-                        <a:rPr lang="en-US" b="0" i="1" smtClean="0">
-                          <a:latin typeface="Cambria Math" panose="02040503050406030204" pitchFamily="18" charset="0"/>
-                        </a:rPr>
-                        <m:t>𝑚</m:t>
-                      </m:r>
-                      <m:r>
-                        <a:rPr lang="en-US" b="0" i="1" smtClean="0">
-                          <a:latin typeface="Cambria Math" panose="02040503050406030204" pitchFamily="18" charset="0"/>
-                        </a:rPr>
-                        <m:t> </m:t>
-                      </m:r>
-                    </m:oMath>
-                  </m:oMathPara>
-                </a14:m>
-                <a:endParaRPr lang="en-US" b="0" dirty="0"/>
-              </a:p>
-              <a:p>
-                <a:pPr/>
-                <a14:m>
-                  <m:oMathPara xmlns:m="http://schemas.openxmlformats.org/officeDocument/2006/math">
-                    <m:oMathParaPr>
-                      <m:jc m:val="centerGroup"/>
-                    </m:oMathParaPr>
-                    <m:oMath xmlns:m="http://schemas.openxmlformats.org/officeDocument/2006/math">
-                      <m:r>
-                        <a:rPr lang="en-US" b="0" i="1" smtClean="0">
-                          <a:latin typeface="Cambria Math" panose="02040503050406030204" pitchFamily="18" charset="0"/>
-                        </a:rPr>
-                        <m:t>𝑦</m:t>
-                      </m:r>
-                      <m:r>
-                        <a:rPr lang="en-US" i="1">
-                          <a:latin typeface="Cambria Math" panose="02040503050406030204" pitchFamily="18" charset="0"/>
-                        </a:rPr>
-                        <m:t>=</m:t>
-                      </m:r>
-                      <m:r>
-                        <a:rPr lang="en-US" b="0" i="1" smtClean="0">
-                          <a:solidFill>
-                            <a:schemeClr val="accent1"/>
-                          </a:solidFill>
-                          <a:latin typeface="Cambria Math" panose="02040503050406030204" pitchFamily="18" charset="0"/>
-                        </a:rPr>
-                        <m:t>50</m:t>
-                      </m:r>
-                      <m:r>
-                        <a:rPr lang="en-US" i="1">
-                          <a:latin typeface="Cambria Math" panose="02040503050406030204" pitchFamily="18" charset="0"/>
-                        </a:rPr>
-                        <m:t> ∗ </m:t>
-                      </m:r>
-                      <m:r>
-                        <a:rPr lang="en-US" i="1" smtClean="0">
-                          <a:solidFill>
-                            <a:schemeClr val="accent6"/>
-                          </a:solidFill>
-                          <a:latin typeface="Cambria Math" panose="02040503050406030204" pitchFamily="18" charset="0"/>
-                        </a:rPr>
-                        <m:t>0.13 µ</m:t>
-                      </m:r>
-                      <m:r>
-                        <a:rPr lang="en-US" i="1" smtClean="0">
-                          <a:solidFill>
-                            <a:schemeClr val="accent6"/>
-                          </a:solidFill>
-                          <a:latin typeface="Cambria Math" panose="02040503050406030204" pitchFamily="18" charset="0"/>
-                        </a:rPr>
-                        <m:t>𝑚</m:t>
-                      </m:r>
-                      <m:r>
-                        <a:rPr lang="en-US" i="1">
-                          <a:latin typeface="Cambria Math" panose="02040503050406030204" pitchFamily="18" charset="0"/>
-                        </a:rPr>
-                        <m:t>=6.5 µ</m:t>
-                      </m:r>
-                      <m:r>
-                        <a:rPr lang="en-US" i="1">
-                          <a:latin typeface="Cambria Math" panose="02040503050406030204" pitchFamily="18" charset="0"/>
-                        </a:rPr>
-                        <m:t>𝑚</m:t>
-                      </m:r>
-                      <m:r>
-                        <a:rPr lang="en-US" i="1">
-                          <a:latin typeface="Cambria Math" panose="02040503050406030204" pitchFamily="18" charset="0"/>
-                        </a:rPr>
-                        <m:t> </m:t>
-                      </m:r>
-                    </m:oMath>
-                  </m:oMathPara>
-                </a14:m>
-                <a:endParaRPr lang="en-US" dirty="0"/>
-              </a:p>
-            </p:txBody>
-          </p:sp>
-        </mc:Choice>
-        <mc:Fallback>
-          <p:sp>
-            <p:nvSpPr>
-              <p:cNvPr id="34" name="TextBox 33">
-                <a:extLst>
-                  <a:ext uri="{FF2B5EF4-FFF2-40B4-BE49-F238E27FC236}">
-                    <a16:creationId xmlns:a16="http://schemas.microsoft.com/office/drawing/2014/main" id="{88460B12-1FCE-8843-9F16-F58CFB2F4128}"/>
-                  </a:ext>
-                </a:extLst>
-              </p:cNvPr>
-              <p:cNvSpPr txBox="1">
-                <a:spLocks noRot="1" noChangeAspect="1" noMove="1" noResize="1" noEditPoints="1" noAdjustHandles="1" noChangeArrowheads="1" noChangeShapeType="1" noTextEdit="1"/>
-              </p:cNvSpPr>
-              <p:nvPr/>
-            </p:nvSpPr>
-            <p:spPr>
-              <a:xfrm>
-                <a:off x="1351490" y="1811613"/>
-                <a:ext cx="3469731" cy="646331"/>
-              </a:xfrm>
-              <a:prstGeom prst="rect">
-                <a:avLst/>
-              </a:prstGeom>
-              <a:blipFill>
-                <a:blip r:embed="rId6"/>
-                <a:stretch>
-                  <a:fillRect b="-9615"/>
-                </a:stretch>
-              </a:blipFill>
-            </p:spPr>
-            <p:txBody>
-              <a:bodyPr/>
-              <a:lstStyle/>
-              <a:p>
-                <a:r>
-                  <a:rPr lang="en-DE">
-                    <a:noFill/>
-                  </a:rPr>
-                  <a:t> </a:t>
-                </a:r>
-              </a:p>
-            </p:txBody>
-          </p:sp>
-        </mc:Fallback>
-      </mc:AlternateContent>
-      <p:sp>
-        <p:nvSpPr>
-          <p:cNvPr id="21" name="Rectangle 20">
-            <a:extLst>
-              <a:ext uri="{FF2B5EF4-FFF2-40B4-BE49-F238E27FC236}">
-                <a16:creationId xmlns:a16="http://schemas.microsoft.com/office/drawing/2014/main" id="{AFDC82EB-CA73-C543-82FD-EED622F9E2F9}"/>
-              </a:ext>
-            </a:extLst>
-          </p:cNvPr>
-          <p:cNvSpPr/>
-          <p:nvPr/>
-        </p:nvSpPr>
-        <p:spPr>
-          <a:xfrm>
-            <a:off x="2663923" y="3364375"/>
-            <a:ext cx="290955" cy="290330"/>
-          </a:xfrm>
-          <a:prstGeom prst="rect">
-            <a:avLst/>
-          </a:prstGeom>
-          <a:noFill/>
-          <a:ln w="25400">
-            <a:solidFill>
-              <a:schemeClr val="accent1"/>
-            </a:solidFill>
-            <a:prstDash val="sysDash"/>
-          </a:ln>
-        </p:spPr>
-        <p:style>
-          <a:lnRef idx="2">
-            <a:schemeClr val="accent1">
-              <a:shade val="50000"/>
-            </a:schemeClr>
-          </a:lnRef>
-          <a:fillRef idx="1">
-            <a:schemeClr val="accent1"/>
-          </a:fillRef>
-          <a:effectRef idx="0">
-            <a:schemeClr val="accent1"/>
-          </a:effectRef>
-          <a:fontRef idx="minor">
-            <a:schemeClr val="lt1"/>
-          </a:fontRef>
-        </p:style>
-        <p:txBody>
-          <a:bodyPr rtlCol="0" anchor="ctr"/>
-          <a:lstStyle/>
-          <a:p>
-            <a:pPr algn="ctr"/>
-            <a:endParaRPr lang="de-DE" dirty="0"/>
-          </a:p>
-        </p:txBody>
-      </p:sp>
-      <p:sp>
-        <p:nvSpPr>
-          <p:cNvPr id="37" name="TextBox 36">
-            <a:extLst>
-              <a:ext uri="{FF2B5EF4-FFF2-40B4-BE49-F238E27FC236}">
-                <a16:creationId xmlns:a16="http://schemas.microsoft.com/office/drawing/2014/main" id="{57BC08D2-26A8-3E40-BB59-5C2B6734CB97}"/>
-              </a:ext>
-            </a:extLst>
-          </p:cNvPr>
-          <p:cNvSpPr txBox="1"/>
-          <p:nvPr/>
-        </p:nvSpPr>
-        <p:spPr>
-          <a:xfrm>
-            <a:off x="858339" y="1404350"/>
-            <a:ext cx="3881127" cy="369332"/>
-          </a:xfrm>
-          <a:prstGeom prst="rect">
-            <a:avLst/>
-          </a:prstGeom>
-          <a:noFill/>
-        </p:spPr>
-        <p:txBody>
-          <a:bodyPr wrap="none" rtlCol="0">
-            <a:spAutoFit/>
-          </a:bodyPr>
-          <a:lstStyle/>
-          <a:p>
-            <a:r>
-              <a:rPr lang="en-US" dirty="0">
-                <a:solidFill>
-                  <a:schemeClr val="accent1"/>
-                </a:solidFill>
-              </a:rPr>
-              <a:t>Index</a:t>
-            </a:r>
-            <a:r>
-              <a:rPr lang="en-US" dirty="0"/>
-              <a:t> * </a:t>
-            </a:r>
-            <a:r>
-              <a:rPr lang="en-US" dirty="0">
-                <a:solidFill>
-                  <a:schemeClr val="accent6"/>
-                </a:solidFill>
-              </a:rPr>
-              <a:t>Spacing</a:t>
-            </a:r>
-            <a:r>
-              <a:rPr lang="en-US" dirty="0"/>
-              <a:t> = Calibrated coordinate</a:t>
-            </a:r>
-          </a:p>
-        </p:txBody>
-      </p:sp>
-      <p:sp>
-        <p:nvSpPr>
-          <p:cNvPr id="31" name="Oval 30">
-            <a:extLst>
-              <a:ext uri="{FF2B5EF4-FFF2-40B4-BE49-F238E27FC236}">
-                <a16:creationId xmlns:a16="http://schemas.microsoft.com/office/drawing/2014/main" id="{E3A2E411-C08A-4640-A448-A379E17AFA64}"/>
-              </a:ext>
-            </a:extLst>
-          </p:cNvPr>
-          <p:cNvSpPr/>
-          <p:nvPr/>
-        </p:nvSpPr>
-        <p:spPr>
-          <a:xfrm>
-            <a:off x="-2517887" y="2638463"/>
-            <a:ext cx="111873" cy="101703"/>
-          </a:xfrm>
-          <a:prstGeom prst="ellipse">
-            <a:avLst/>
-          </a:prstGeom>
-        </p:spPr>
-        <p:style>
-          <a:lnRef idx="2">
-            <a:schemeClr val="accent1">
-              <a:shade val="50000"/>
-            </a:schemeClr>
-          </a:lnRef>
-          <a:fillRef idx="1">
-            <a:schemeClr val="accent1"/>
-          </a:fillRef>
-          <a:effectRef idx="0">
-            <a:schemeClr val="accent1"/>
-          </a:effectRef>
-          <a:fontRef idx="minor">
-            <a:schemeClr val="lt1"/>
-          </a:fontRef>
-        </p:style>
-        <p:txBody>
-          <a:bodyPr rtlCol="0" anchor="ctr"/>
-          <a:lstStyle/>
-          <a:p>
-            <a:pPr algn="ctr"/>
-            <a:endParaRPr lang="de-DE"/>
-          </a:p>
-        </p:txBody>
-      </p:sp>
-      <p:sp>
-        <p:nvSpPr>
-          <p:cNvPr id="39" name="TextBox 38">
-            <a:extLst>
-              <a:ext uri="{FF2B5EF4-FFF2-40B4-BE49-F238E27FC236}">
-                <a16:creationId xmlns:a16="http://schemas.microsoft.com/office/drawing/2014/main" id="{D9D7C7E3-9AFF-044D-943D-8BBF70434797}"/>
-              </a:ext>
-            </a:extLst>
-          </p:cNvPr>
-          <p:cNvSpPr txBox="1"/>
-          <p:nvPr/>
-        </p:nvSpPr>
-        <p:spPr>
-          <a:xfrm>
-            <a:off x="-2949467" y="2280114"/>
-            <a:ext cx="1239442" cy="369332"/>
-          </a:xfrm>
-          <a:prstGeom prst="rect">
-            <a:avLst/>
-          </a:prstGeom>
-          <a:noFill/>
-        </p:spPr>
-        <p:txBody>
-          <a:bodyPr wrap="none" rtlCol="0">
-            <a:spAutoFit/>
-          </a:bodyPr>
-          <a:lstStyle/>
-          <a:p>
-            <a:r>
-              <a:rPr lang="en-US" dirty="0"/>
-              <a:t>Origin (0,0)</a:t>
-            </a:r>
-          </a:p>
-        </p:txBody>
-      </p:sp>
-      <p:sp>
-        <p:nvSpPr>
-          <p:cNvPr id="42" name="Rectangle 41">
-            <a:extLst>
-              <a:ext uri="{FF2B5EF4-FFF2-40B4-BE49-F238E27FC236}">
-                <a16:creationId xmlns:a16="http://schemas.microsoft.com/office/drawing/2014/main" id="{48CAE13C-FD22-8641-BB7E-A6BF7D608096}"/>
-              </a:ext>
-            </a:extLst>
-          </p:cNvPr>
-          <p:cNvSpPr/>
-          <p:nvPr/>
-        </p:nvSpPr>
-        <p:spPr>
-          <a:xfrm>
-            <a:off x="6826589" y="1960909"/>
-            <a:ext cx="620889" cy="622866"/>
-          </a:xfrm>
-          <a:prstGeom prst="rect">
-            <a:avLst/>
-          </a:prstGeom>
-          <a:noFill/>
-          <a:ln w="3175">
-            <a:solidFill>
-              <a:schemeClr val="accent1"/>
-            </a:solidFill>
-          </a:ln>
-        </p:spPr>
-        <p:style>
-          <a:lnRef idx="2">
-            <a:schemeClr val="accent1">
-              <a:shade val="50000"/>
-            </a:schemeClr>
-          </a:lnRef>
-          <a:fillRef idx="1">
-            <a:schemeClr val="accent1"/>
-          </a:fillRef>
-          <a:effectRef idx="0">
-            <a:schemeClr val="accent1"/>
-          </a:effectRef>
-          <a:fontRef idx="minor">
-            <a:schemeClr val="lt1"/>
-          </a:fontRef>
-        </p:style>
-        <p:txBody>
-          <a:bodyPr rtlCol="0" anchor="ctr"/>
-          <a:lstStyle/>
-          <a:p>
-            <a:pPr algn="ctr"/>
-            <a:endParaRPr lang="en-US"/>
-          </a:p>
-        </p:txBody>
-      </p:sp>
-      <p:sp>
-        <p:nvSpPr>
-          <p:cNvPr id="43" name="Oval 42">
-            <a:extLst>
-              <a:ext uri="{FF2B5EF4-FFF2-40B4-BE49-F238E27FC236}">
-                <a16:creationId xmlns:a16="http://schemas.microsoft.com/office/drawing/2014/main" id="{763DAF5C-7ECF-B34A-97E7-9E836119DF9B}"/>
-              </a:ext>
-            </a:extLst>
-          </p:cNvPr>
-          <p:cNvSpPr/>
-          <p:nvPr/>
-        </p:nvSpPr>
-        <p:spPr>
-          <a:xfrm>
-            <a:off x="7101933" y="2234770"/>
-            <a:ext cx="111873" cy="101703"/>
-          </a:xfrm>
-          <a:prstGeom prst="ellipse">
-            <a:avLst/>
-          </a:prstGeom>
-          <a:ln w="3175">
-            <a:solidFill>
-              <a:schemeClr val="accent1"/>
-            </a:solidFill>
-          </a:ln>
-        </p:spPr>
-        <p:style>
-          <a:lnRef idx="2">
-            <a:schemeClr val="accent1">
-              <a:shade val="50000"/>
-            </a:schemeClr>
-          </a:lnRef>
-          <a:fillRef idx="1">
-            <a:schemeClr val="accent1"/>
-          </a:fillRef>
-          <a:effectRef idx="0">
-            <a:schemeClr val="accent1"/>
-          </a:effectRef>
-          <a:fontRef idx="minor">
-            <a:schemeClr val="lt1"/>
-          </a:fontRef>
-        </p:style>
-        <p:txBody>
-          <a:bodyPr rtlCol="0" anchor="ctr"/>
-          <a:lstStyle/>
-          <a:p>
-            <a:pPr algn="ctr"/>
-            <a:endParaRPr lang="de-DE"/>
-          </a:p>
-        </p:txBody>
-      </p:sp>
-      <p:sp>
-        <p:nvSpPr>
-          <p:cNvPr id="45" name="Oval 44">
-            <a:extLst>
-              <a:ext uri="{FF2B5EF4-FFF2-40B4-BE49-F238E27FC236}">
-                <a16:creationId xmlns:a16="http://schemas.microsoft.com/office/drawing/2014/main" id="{DB55D443-BA25-3B41-8ECF-9D3D2191A651}"/>
-              </a:ext>
-            </a:extLst>
-          </p:cNvPr>
-          <p:cNvSpPr/>
-          <p:nvPr/>
-        </p:nvSpPr>
-        <p:spPr>
-          <a:xfrm>
-            <a:off x="6482976" y="2234759"/>
-            <a:ext cx="111873" cy="101703"/>
-          </a:xfrm>
-          <a:prstGeom prst="ellipse">
-            <a:avLst/>
-          </a:prstGeom>
-          <a:ln w="3175">
-            <a:solidFill>
-              <a:schemeClr val="accent1"/>
-            </a:solidFill>
-          </a:ln>
-        </p:spPr>
-        <p:style>
-          <a:lnRef idx="2">
-            <a:schemeClr val="accent1">
-              <a:shade val="50000"/>
-            </a:schemeClr>
-          </a:lnRef>
-          <a:fillRef idx="1">
-            <a:schemeClr val="accent1"/>
-          </a:fillRef>
-          <a:effectRef idx="0">
-            <a:schemeClr val="accent1"/>
-          </a:effectRef>
-          <a:fontRef idx="minor">
-            <a:schemeClr val="lt1"/>
-          </a:fontRef>
-        </p:style>
-        <p:txBody>
-          <a:bodyPr rtlCol="0" anchor="ctr"/>
-          <a:lstStyle/>
-          <a:p>
-            <a:pPr algn="ctr"/>
-            <a:endParaRPr lang="de-DE"/>
-          </a:p>
-        </p:txBody>
-      </p:sp>
-      <p:sp>
-        <p:nvSpPr>
-          <p:cNvPr id="46" name="Rectangle 45">
-            <a:extLst>
-              <a:ext uri="{FF2B5EF4-FFF2-40B4-BE49-F238E27FC236}">
-                <a16:creationId xmlns:a16="http://schemas.microsoft.com/office/drawing/2014/main" id="{09A6809A-D551-5345-9BBC-119DE5EAD72E}"/>
-              </a:ext>
-            </a:extLst>
-          </p:cNvPr>
-          <p:cNvSpPr/>
-          <p:nvPr/>
-        </p:nvSpPr>
-        <p:spPr>
-          <a:xfrm>
-            <a:off x="6208378" y="2588470"/>
-            <a:ext cx="620889" cy="620889"/>
-          </a:xfrm>
-          <a:prstGeom prst="rect">
-            <a:avLst/>
-          </a:prstGeom>
-          <a:noFill/>
-          <a:ln w="3175">
-            <a:solidFill>
-              <a:schemeClr val="accent1"/>
-            </a:solidFill>
-          </a:ln>
-        </p:spPr>
-        <p:style>
-          <a:lnRef idx="2">
-            <a:schemeClr val="accent1">
-              <a:shade val="50000"/>
-            </a:schemeClr>
-          </a:lnRef>
-          <a:fillRef idx="1">
-            <a:schemeClr val="accent1"/>
-          </a:fillRef>
-          <a:effectRef idx="0">
-            <a:schemeClr val="accent1"/>
-          </a:effectRef>
-          <a:fontRef idx="minor">
-            <a:schemeClr val="lt1"/>
-          </a:fontRef>
-        </p:style>
-        <p:txBody>
-          <a:bodyPr rtlCol="0" anchor="ctr"/>
-          <a:lstStyle/>
-          <a:p>
-            <a:pPr algn="ctr"/>
-            <a:endParaRPr lang="en-US"/>
-          </a:p>
-        </p:txBody>
-      </p:sp>
-      <p:sp>
-        <p:nvSpPr>
-          <p:cNvPr id="47" name="Rectangle 46">
-            <a:extLst>
-              <a:ext uri="{FF2B5EF4-FFF2-40B4-BE49-F238E27FC236}">
-                <a16:creationId xmlns:a16="http://schemas.microsoft.com/office/drawing/2014/main" id="{8251601A-B4CA-6042-9B18-2DFAF6CAC19C}"/>
-              </a:ext>
-            </a:extLst>
-          </p:cNvPr>
-          <p:cNvSpPr/>
-          <p:nvPr/>
-        </p:nvSpPr>
-        <p:spPr>
-          <a:xfrm>
-            <a:off x="6823181" y="2585752"/>
-            <a:ext cx="620889" cy="620889"/>
-          </a:xfrm>
-          <a:prstGeom prst="rect">
-            <a:avLst/>
-          </a:prstGeom>
-          <a:noFill/>
-          <a:ln w="3175">
-            <a:solidFill>
-              <a:schemeClr val="accent1"/>
-            </a:solidFill>
-          </a:ln>
-        </p:spPr>
-        <p:style>
-          <a:lnRef idx="2">
-            <a:schemeClr val="accent1">
-              <a:shade val="50000"/>
-            </a:schemeClr>
-          </a:lnRef>
-          <a:fillRef idx="1">
-            <a:schemeClr val="accent1"/>
-          </a:fillRef>
-          <a:effectRef idx="0">
-            <a:schemeClr val="accent1"/>
-          </a:effectRef>
-          <a:fontRef idx="minor">
-            <a:schemeClr val="lt1"/>
-          </a:fontRef>
-        </p:style>
-        <p:txBody>
-          <a:bodyPr rtlCol="0" anchor="ctr"/>
-          <a:lstStyle/>
-          <a:p>
-            <a:pPr algn="ctr"/>
-            <a:endParaRPr lang="en-US"/>
-          </a:p>
-        </p:txBody>
-      </p:sp>
-      <p:sp>
-        <p:nvSpPr>
-          <p:cNvPr id="50" name="Oval 49">
-            <a:extLst>
-              <a:ext uri="{FF2B5EF4-FFF2-40B4-BE49-F238E27FC236}">
-                <a16:creationId xmlns:a16="http://schemas.microsoft.com/office/drawing/2014/main" id="{9D45AA71-7147-1B43-B41A-C848DA37A75F}"/>
-              </a:ext>
-            </a:extLst>
-          </p:cNvPr>
-          <p:cNvSpPr/>
-          <p:nvPr/>
-        </p:nvSpPr>
-        <p:spPr>
-          <a:xfrm>
-            <a:off x="7100849" y="2839199"/>
-            <a:ext cx="111873" cy="101703"/>
-          </a:xfrm>
-          <a:prstGeom prst="ellipse">
-            <a:avLst/>
-          </a:prstGeom>
-          <a:ln w="3175">
-            <a:solidFill>
-              <a:schemeClr val="accent1"/>
-            </a:solidFill>
-          </a:ln>
-        </p:spPr>
-        <p:style>
-          <a:lnRef idx="2">
-            <a:schemeClr val="accent1">
-              <a:shade val="50000"/>
-            </a:schemeClr>
-          </a:lnRef>
-          <a:fillRef idx="1">
-            <a:schemeClr val="accent1"/>
-          </a:fillRef>
-          <a:effectRef idx="0">
-            <a:schemeClr val="accent1"/>
-          </a:effectRef>
-          <a:fontRef idx="minor">
-            <a:schemeClr val="lt1"/>
-          </a:fontRef>
-        </p:style>
-        <p:txBody>
-          <a:bodyPr rtlCol="0" anchor="ctr"/>
-          <a:lstStyle/>
-          <a:p>
-            <a:pPr algn="ctr"/>
-            <a:endParaRPr lang="de-DE"/>
-          </a:p>
-        </p:txBody>
-      </p:sp>
-      <p:sp>
-        <p:nvSpPr>
-          <p:cNvPr id="51" name="Oval 50">
-            <a:extLst>
-              <a:ext uri="{FF2B5EF4-FFF2-40B4-BE49-F238E27FC236}">
-                <a16:creationId xmlns:a16="http://schemas.microsoft.com/office/drawing/2014/main" id="{4A519C81-4020-E544-9591-F0E7C7387DE0}"/>
-              </a:ext>
-            </a:extLst>
-          </p:cNvPr>
-          <p:cNvSpPr/>
-          <p:nvPr/>
-        </p:nvSpPr>
-        <p:spPr>
-          <a:xfrm>
-            <a:off x="6482975" y="2851729"/>
-            <a:ext cx="111873" cy="101703"/>
-          </a:xfrm>
-          <a:prstGeom prst="ellipse">
-            <a:avLst/>
-          </a:prstGeom>
-          <a:ln w="3175">
-            <a:solidFill>
-              <a:schemeClr val="accent1"/>
-            </a:solidFill>
-          </a:ln>
-        </p:spPr>
-        <p:style>
-          <a:lnRef idx="2">
-            <a:schemeClr val="accent1">
-              <a:shade val="50000"/>
-            </a:schemeClr>
-          </a:lnRef>
-          <a:fillRef idx="1">
-            <a:schemeClr val="accent1"/>
-          </a:fillRef>
-          <a:effectRef idx="0">
-            <a:schemeClr val="accent1"/>
-          </a:effectRef>
-          <a:fontRef idx="minor">
-            <a:schemeClr val="lt1"/>
-          </a:fontRef>
-        </p:style>
-        <p:txBody>
-          <a:bodyPr rtlCol="0" anchor="ctr"/>
-          <a:lstStyle/>
-          <a:p>
-            <a:pPr algn="ctr"/>
-            <a:endParaRPr lang="de-DE"/>
-          </a:p>
-        </p:txBody>
-      </p:sp>
-      <p:sp>
-        <p:nvSpPr>
-          <p:cNvPr id="53" name="Oval 52">
-            <a:extLst>
-              <a:ext uri="{FF2B5EF4-FFF2-40B4-BE49-F238E27FC236}">
-                <a16:creationId xmlns:a16="http://schemas.microsoft.com/office/drawing/2014/main" id="{5751660E-140E-0145-851A-CAF8945C4609}"/>
-              </a:ext>
-            </a:extLst>
-          </p:cNvPr>
-          <p:cNvSpPr/>
-          <p:nvPr/>
-        </p:nvSpPr>
-        <p:spPr>
-          <a:xfrm>
-            <a:off x="1206053" y="2886469"/>
-            <a:ext cx="111873" cy="101703"/>
-          </a:xfrm>
-          <a:prstGeom prst="ellipse">
-            <a:avLst/>
-          </a:prstGeom>
-        </p:spPr>
-        <p:style>
-          <a:lnRef idx="2">
-            <a:schemeClr val="accent1">
-              <a:shade val="50000"/>
-            </a:schemeClr>
-          </a:lnRef>
-          <a:fillRef idx="1">
-            <a:schemeClr val="accent1"/>
-          </a:fillRef>
-          <a:effectRef idx="0">
-            <a:schemeClr val="accent1"/>
-          </a:effectRef>
-          <a:fontRef idx="minor">
-            <a:schemeClr val="lt1"/>
-          </a:fontRef>
-        </p:style>
-        <p:txBody>
-          <a:bodyPr rtlCol="0" anchor="ctr"/>
-          <a:lstStyle/>
-          <a:p>
-            <a:pPr algn="ctr"/>
-            <a:endParaRPr lang="de-DE"/>
-          </a:p>
-        </p:txBody>
-      </p:sp>
-      <p:sp>
-        <p:nvSpPr>
-          <p:cNvPr id="54" name="TextBox 53">
-            <a:extLst>
-              <a:ext uri="{FF2B5EF4-FFF2-40B4-BE49-F238E27FC236}">
-                <a16:creationId xmlns:a16="http://schemas.microsoft.com/office/drawing/2014/main" id="{FD20AB59-7596-1E4D-84E1-770249E3B1CE}"/>
-              </a:ext>
-            </a:extLst>
-          </p:cNvPr>
-          <p:cNvSpPr txBox="1"/>
-          <p:nvPr/>
-        </p:nvSpPr>
-        <p:spPr>
-          <a:xfrm>
-            <a:off x="830232" y="2550825"/>
-            <a:ext cx="617477" cy="369332"/>
-          </a:xfrm>
-          <a:prstGeom prst="rect">
-            <a:avLst/>
-          </a:prstGeom>
-          <a:noFill/>
-        </p:spPr>
-        <p:txBody>
-          <a:bodyPr wrap="none" rtlCol="0">
-            <a:spAutoFit/>
-          </a:bodyPr>
-          <a:lstStyle/>
-          <a:p>
-            <a:r>
-              <a:rPr lang="en-US" dirty="0"/>
-              <a:t>(0,0)</a:t>
-            </a:r>
-          </a:p>
-        </p:txBody>
-      </p:sp>
-      <p:sp>
-        <p:nvSpPr>
-          <p:cNvPr id="55" name="Rectangle 54">
-            <a:extLst>
-              <a:ext uri="{FF2B5EF4-FFF2-40B4-BE49-F238E27FC236}">
-                <a16:creationId xmlns:a16="http://schemas.microsoft.com/office/drawing/2014/main" id="{3ECDB614-08E4-B84B-B059-A3A25D9BABF9}"/>
-              </a:ext>
-            </a:extLst>
-          </p:cNvPr>
-          <p:cNvSpPr/>
-          <p:nvPr/>
-        </p:nvSpPr>
-        <p:spPr>
-          <a:xfrm>
-            <a:off x="5867441" y="3925438"/>
-            <a:ext cx="620889" cy="620889"/>
-          </a:xfrm>
-          <a:prstGeom prst="rect">
-            <a:avLst/>
-          </a:prstGeom>
-          <a:noFill/>
-          <a:ln w="3175">
-            <a:solidFill>
-              <a:schemeClr val="accent1"/>
-            </a:solidFill>
-          </a:ln>
-        </p:spPr>
-        <p:style>
-          <a:lnRef idx="2">
-            <a:schemeClr val="accent1">
-              <a:shade val="50000"/>
-            </a:schemeClr>
-          </a:lnRef>
-          <a:fillRef idx="1">
-            <a:schemeClr val="accent1"/>
-          </a:fillRef>
-          <a:effectRef idx="0">
-            <a:schemeClr val="accent1"/>
-          </a:effectRef>
-          <a:fontRef idx="minor">
-            <a:schemeClr val="lt1"/>
-          </a:fontRef>
-        </p:style>
-        <p:txBody>
-          <a:bodyPr rtlCol="0" anchor="ctr"/>
-          <a:lstStyle/>
-          <a:p>
-            <a:pPr algn="ctr"/>
-            <a:endParaRPr lang="en-US"/>
-          </a:p>
-        </p:txBody>
-      </p:sp>
-      <p:sp>
-        <p:nvSpPr>
-          <p:cNvPr id="56" name="Rectangle 55">
-            <a:extLst>
-              <a:ext uri="{FF2B5EF4-FFF2-40B4-BE49-F238E27FC236}">
-                <a16:creationId xmlns:a16="http://schemas.microsoft.com/office/drawing/2014/main" id="{4D25AA18-E956-3249-A1EB-255C7A94047E}"/>
-              </a:ext>
-            </a:extLst>
-          </p:cNvPr>
-          <p:cNvSpPr/>
-          <p:nvPr/>
-        </p:nvSpPr>
-        <p:spPr>
-          <a:xfrm>
-            <a:off x="6488916" y="3925438"/>
-            <a:ext cx="620889" cy="622866"/>
-          </a:xfrm>
-          <a:prstGeom prst="rect">
-            <a:avLst/>
-          </a:prstGeom>
-          <a:noFill/>
-          <a:ln w="3175">
-            <a:solidFill>
-              <a:schemeClr val="accent1"/>
-            </a:solidFill>
-          </a:ln>
-        </p:spPr>
-        <p:style>
-          <a:lnRef idx="2">
-            <a:schemeClr val="accent1">
-              <a:shade val="50000"/>
-            </a:schemeClr>
-          </a:lnRef>
-          <a:fillRef idx="1">
-            <a:schemeClr val="accent1"/>
-          </a:fillRef>
-          <a:effectRef idx="0">
-            <a:schemeClr val="accent1"/>
-          </a:effectRef>
-          <a:fontRef idx="minor">
-            <a:schemeClr val="lt1"/>
-          </a:fontRef>
-        </p:style>
-        <p:txBody>
-          <a:bodyPr rtlCol="0" anchor="ctr"/>
-          <a:lstStyle/>
-          <a:p>
-            <a:pPr algn="ctr"/>
-            <a:endParaRPr lang="en-US"/>
-          </a:p>
-        </p:txBody>
-      </p:sp>
-      <p:sp>
-        <p:nvSpPr>
-          <p:cNvPr id="57" name="Oval 56">
-            <a:extLst>
-              <a:ext uri="{FF2B5EF4-FFF2-40B4-BE49-F238E27FC236}">
-                <a16:creationId xmlns:a16="http://schemas.microsoft.com/office/drawing/2014/main" id="{344849D5-8831-8A42-B522-DBC05A1B7719}"/>
-              </a:ext>
-            </a:extLst>
-          </p:cNvPr>
-          <p:cNvSpPr/>
-          <p:nvPr/>
-        </p:nvSpPr>
-        <p:spPr>
-          <a:xfrm>
-            <a:off x="6758319" y="4209197"/>
-            <a:ext cx="111873" cy="101703"/>
-          </a:xfrm>
-          <a:prstGeom prst="ellipse">
-            <a:avLst/>
-          </a:prstGeom>
-          <a:ln w="3175">
-            <a:solidFill>
-              <a:schemeClr val="accent1"/>
-            </a:solidFill>
-          </a:ln>
-        </p:spPr>
-        <p:style>
-          <a:lnRef idx="2">
-            <a:schemeClr val="accent1">
-              <a:shade val="50000"/>
-            </a:schemeClr>
-          </a:lnRef>
-          <a:fillRef idx="1">
-            <a:schemeClr val="accent1"/>
-          </a:fillRef>
-          <a:effectRef idx="0">
-            <a:schemeClr val="accent1"/>
-          </a:effectRef>
-          <a:fontRef idx="minor">
-            <a:schemeClr val="lt1"/>
-          </a:fontRef>
-        </p:style>
-        <p:txBody>
-          <a:bodyPr rtlCol="0" anchor="ctr"/>
-          <a:lstStyle/>
-          <a:p>
-            <a:pPr algn="ctr"/>
-            <a:endParaRPr lang="de-DE"/>
-          </a:p>
-        </p:txBody>
-      </p:sp>
-      <p:sp>
-        <p:nvSpPr>
-          <p:cNvPr id="58" name="Oval 57">
-            <a:extLst>
-              <a:ext uri="{FF2B5EF4-FFF2-40B4-BE49-F238E27FC236}">
-                <a16:creationId xmlns:a16="http://schemas.microsoft.com/office/drawing/2014/main" id="{129ADD01-0F5D-BC47-80E5-90FC9622DCE1}"/>
-              </a:ext>
-            </a:extLst>
-          </p:cNvPr>
-          <p:cNvSpPr/>
-          <p:nvPr/>
-        </p:nvSpPr>
-        <p:spPr>
-          <a:xfrm>
-            <a:off x="6139362" y="4197311"/>
-            <a:ext cx="111873" cy="101703"/>
-          </a:xfrm>
-          <a:prstGeom prst="ellipse">
-            <a:avLst/>
-          </a:prstGeom>
-          <a:ln w="3175">
-            <a:solidFill>
-              <a:schemeClr val="accent1"/>
-            </a:solidFill>
-          </a:ln>
-        </p:spPr>
-        <p:style>
-          <a:lnRef idx="2">
-            <a:schemeClr val="accent1">
-              <a:shade val="50000"/>
-            </a:schemeClr>
-          </a:lnRef>
-          <a:fillRef idx="1">
-            <a:schemeClr val="accent1"/>
-          </a:fillRef>
-          <a:effectRef idx="0">
-            <a:schemeClr val="accent1"/>
-          </a:effectRef>
-          <a:fontRef idx="minor">
-            <a:schemeClr val="lt1"/>
-          </a:fontRef>
-        </p:style>
-        <p:txBody>
-          <a:bodyPr rtlCol="0" anchor="ctr"/>
-          <a:lstStyle/>
-          <a:p>
-            <a:pPr algn="ctr"/>
-            <a:endParaRPr lang="de-DE"/>
-          </a:p>
-        </p:txBody>
-      </p:sp>
-      <p:sp>
-        <p:nvSpPr>
-          <p:cNvPr id="63" name="Rectangle 62">
-            <a:extLst>
-              <a:ext uri="{FF2B5EF4-FFF2-40B4-BE49-F238E27FC236}">
-                <a16:creationId xmlns:a16="http://schemas.microsoft.com/office/drawing/2014/main" id="{0606488C-8987-DA49-8D5F-008726E7F71D}"/>
-              </a:ext>
-            </a:extLst>
-          </p:cNvPr>
-          <p:cNvSpPr/>
-          <p:nvPr/>
-        </p:nvSpPr>
-        <p:spPr>
-          <a:xfrm>
-            <a:off x="7110390" y="3925438"/>
-            <a:ext cx="620889" cy="622866"/>
-          </a:xfrm>
-          <a:prstGeom prst="rect">
-            <a:avLst/>
-          </a:prstGeom>
-          <a:noFill/>
-          <a:ln w="3175">
-            <a:solidFill>
-              <a:schemeClr val="accent1"/>
-            </a:solidFill>
-          </a:ln>
-        </p:spPr>
-        <p:style>
-          <a:lnRef idx="2">
-            <a:schemeClr val="accent1">
-              <a:shade val="50000"/>
-            </a:schemeClr>
-          </a:lnRef>
-          <a:fillRef idx="1">
-            <a:schemeClr val="accent1"/>
-          </a:fillRef>
-          <a:effectRef idx="0">
-            <a:schemeClr val="accent1"/>
-          </a:effectRef>
-          <a:fontRef idx="minor">
-            <a:schemeClr val="lt1"/>
-          </a:fontRef>
-        </p:style>
-        <p:txBody>
-          <a:bodyPr rtlCol="0" anchor="ctr"/>
-          <a:lstStyle/>
-          <a:p>
-            <a:pPr algn="ctr"/>
-            <a:endParaRPr lang="en-US"/>
-          </a:p>
-        </p:txBody>
-      </p:sp>
-      <p:sp>
-        <p:nvSpPr>
-          <p:cNvPr id="64" name="Oval 63">
-            <a:extLst>
-              <a:ext uri="{FF2B5EF4-FFF2-40B4-BE49-F238E27FC236}">
-                <a16:creationId xmlns:a16="http://schemas.microsoft.com/office/drawing/2014/main" id="{8E0C95EB-3D0A-C44A-A7B3-FC2063229746}"/>
-              </a:ext>
-            </a:extLst>
-          </p:cNvPr>
-          <p:cNvSpPr/>
-          <p:nvPr/>
-        </p:nvSpPr>
-        <p:spPr>
-          <a:xfrm>
-            <a:off x="7397609" y="4207220"/>
-            <a:ext cx="111873" cy="101703"/>
-          </a:xfrm>
-          <a:prstGeom prst="ellipse">
-            <a:avLst/>
-          </a:prstGeom>
-          <a:ln w="3175">
-            <a:solidFill>
-              <a:schemeClr val="accent1"/>
-            </a:solidFill>
-          </a:ln>
-        </p:spPr>
-        <p:style>
-          <a:lnRef idx="2">
-            <a:schemeClr val="accent1">
-              <a:shade val="50000"/>
-            </a:schemeClr>
-          </a:lnRef>
-          <a:fillRef idx="1">
-            <a:schemeClr val="accent1"/>
-          </a:fillRef>
-          <a:effectRef idx="0">
-            <a:schemeClr val="accent1"/>
-          </a:effectRef>
-          <a:fontRef idx="minor">
-            <a:schemeClr val="lt1"/>
-          </a:fontRef>
-        </p:style>
-        <p:txBody>
-          <a:bodyPr rtlCol="0" anchor="ctr"/>
-          <a:lstStyle/>
-          <a:p>
-            <a:pPr algn="ctr"/>
-            <a:endParaRPr lang="de-DE"/>
-          </a:p>
-        </p:txBody>
-      </p:sp>
-      <p:sp>
-        <p:nvSpPr>
-          <p:cNvPr id="67" name="Rectangle 66">
-            <a:extLst>
-              <a:ext uri="{FF2B5EF4-FFF2-40B4-BE49-F238E27FC236}">
-                <a16:creationId xmlns:a16="http://schemas.microsoft.com/office/drawing/2014/main" id="{EA38448F-0BB0-2B44-81BF-205887D988D5}"/>
-              </a:ext>
-            </a:extLst>
-          </p:cNvPr>
-          <p:cNvSpPr/>
-          <p:nvPr/>
-        </p:nvSpPr>
-        <p:spPr>
-          <a:xfrm>
-            <a:off x="5865466" y="4564728"/>
-            <a:ext cx="620889" cy="620889"/>
-          </a:xfrm>
-          <a:prstGeom prst="rect">
-            <a:avLst/>
-          </a:prstGeom>
-          <a:noFill/>
-          <a:ln w="3175">
-            <a:solidFill>
-              <a:schemeClr val="accent1"/>
-            </a:solidFill>
-          </a:ln>
-        </p:spPr>
-        <p:style>
-          <a:lnRef idx="2">
-            <a:schemeClr val="accent1">
-              <a:shade val="50000"/>
-            </a:schemeClr>
-          </a:lnRef>
-          <a:fillRef idx="1">
-            <a:schemeClr val="accent1"/>
-          </a:fillRef>
-          <a:effectRef idx="0">
-            <a:schemeClr val="accent1"/>
-          </a:effectRef>
-          <a:fontRef idx="minor">
-            <a:schemeClr val="lt1"/>
-          </a:fontRef>
-        </p:style>
-        <p:txBody>
-          <a:bodyPr rtlCol="0" anchor="ctr"/>
-          <a:lstStyle/>
-          <a:p>
-            <a:pPr algn="ctr"/>
-            <a:endParaRPr lang="en-US"/>
-          </a:p>
-        </p:txBody>
-      </p:sp>
-      <p:sp>
-        <p:nvSpPr>
-          <p:cNvPr id="68" name="Rectangle 67">
-            <a:extLst>
-              <a:ext uri="{FF2B5EF4-FFF2-40B4-BE49-F238E27FC236}">
-                <a16:creationId xmlns:a16="http://schemas.microsoft.com/office/drawing/2014/main" id="{1954E40F-5F0E-A641-A378-925AAB1C9E51}"/>
-              </a:ext>
-            </a:extLst>
-          </p:cNvPr>
-          <p:cNvSpPr/>
-          <p:nvPr/>
-        </p:nvSpPr>
-        <p:spPr>
-          <a:xfrm>
-            <a:off x="6486941" y="4564728"/>
-            <a:ext cx="620889" cy="622866"/>
-          </a:xfrm>
-          <a:prstGeom prst="rect">
-            <a:avLst/>
-          </a:prstGeom>
-          <a:noFill/>
-          <a:ln w="3175">
-            <a:solidFill>
-              <a:schemeClr val="accent1"/>
-            </a:solidFill>
-          </a:ln>
-        </p:spPr>
-        <p:style>
-          <a:lnRef idx="2">
-            <a:schemeClr val="accent1">
-              <a:shade val="50000"/>
-            </a:schemeClr>
-          </a:lnRef>
-          <a:fillRef idx="1">
-            <a:schemeClr val="accent1"/>
-          </a:fillRef>
-          <a:effectRef idx="0">
-            <a:schemeClr val="accent1"/>
-          </a:effectRef>
-          <a:fontRef idx="minor">
-            <a:schemeClr val="lt1"/>
-          </a:fontRef>
-        </p:style>
-        <p:txBody>
-          <a:bodyPr rtlCol="0" anchor="ctr"/>
-          <a:lstStyle/>
-          <a:p>
-            <a:pPr algn="ctr"/>
-            <a:endParaRPr lang="en-US"/>
-          </a:p>
-        </p:txBody>
-      </p:sp>
-      <p:sp>
-        <p:nvSpPr>
-          <p:cNvPr id="69" name="Oval 68">
-            <a:extLst>
-              <a:ext uri="{FF2B5EF4-FFF2-40B4-BE49-F238E27FC236}">
-                <a16:creationId xmlns:a16="http://schemas.microsoft.com/office/drawing/2014/main" id="{244255EB-2C4B-1542-B222-2DFF04D842CE}"/>
-              </a:ext>
-            </a:extLst>
-          </p:cNvPr>
-          <p:cNvSpPr/>
-          <p:nvPr/>
-        </p:nvSpPr>
-        <p:spPr>
-          <a:xfrm>
-            <a:off x="6756344" y="4848487"/>
-            <a:ext cx="111873" cy="101703"/>
-          </a:xfrm>
-          <a:prstGeom prst="ellipse">
-            <a:avLst/>
-          </a:prstGeom>
-          <a:ln w="3175">
-            <a:solidFill>
-              <a:schemeClr val="accent1"/>
-            </a:solidFill>
-          </a:ln>
-        </p:spPr>
-        <p:style>
-          <a:lnRef idx="2">
-            <a:schemeClr val="accent1">
-              <a:shade val="50000"/>
-            </a:schemeClr>
-          </a:lnRef>
-          <a:fillRef idx="1">
-            <a:schemeClr val="accent1"/>
-          </a:fillRef>
-          <a:effectRef idx="0">
-            <a:schemeClr val="accent1"/>
-          </a:effectRef>
-          <a:fontRef idx="minor">
-            <a:schemeClr val="lt1"/>
-          </a:fontRef>
-        </p:style>
-        <p:txBody>
-          <a:bodyPr rtlCol="0" anchor="ctr"/>
-          <a:lstStyle/>
-          <a:p>
-            <a:pPr algn="ctr"/>
-            <a:endParaRPr lang="de-DE"/>
-          </a:p>
-        </p:txBody>
-      </p:sp>
-      <p:sp>
-        <p:nvSpPr>
-          <p:cNvPr id="70" name="Oval 69">
-            <a:extLst>
-              <a:ext uri="{FF2B5EF4-FFF2-40B4-BE49-F238E27FC236}">
-                <a16:creationId xmlns:a16="http://schemas.microsoft.com/office/drawing/2014/main" id="{AB561325-B46C-8E47-A8C9-668BFE6A6976}"/>
-              </a:ext>
-            </a:extLst>
-          </p:cNvPr>
-          <p:cNvSpPr/>
-          <p:nvPr/>
-        </p:nvSpPr>
-        <p:spPr>
-          <a:xfrm>
-            <a:off x="6137387" y="4836601"/>
-            <a:ext cx="111873" cy="101703"/>
-          </a:xfrm>
-          <a:prstGeom prst="ellipse">
-            <a:avLst/>
-          </a:prstGeom>
-          <a:ln w="3175">
-            <a:solidFill>
-              <a:schemeClr val="accent1"/>
-            </a:solidFill>
-          </a:ln>
-        </p:spPr>
-        <p:style>
-          <a:lnRef idx="2">
-            <a:schemeClr val="accent1">
-              <a:shade val="50000"/>
-            </a:schemeClr>
-          </a:lnRef>
-          <a:fillRef idx="1">
-            <a:schemeClr val="accent1"/>
-          </a:fillRef>
-          <a:effectRef idx="0">
-            <a:schemeClr val="accent1"/>
-          </a:effectRef>
-          <a:fontRef idx="minor">
-            <a:schemeClr val="lt1"/>
-          </a:fontRef>
-        </p:style>
-        <p:txBody>
-          <a:bodyPr rtlCol="0" anchor="ctr"/>
-          <a:lstStyle/>
-          <a:p>
-            <a:pPr algn="ctr"/>
-            <a:endParaRPr lang="de-DE"/>
-          </a:p>
-        </p:txBody>
-      </p:sp>
-      <p:sp>
-        <p:nvSpPr>
-          <p:cNvPr id="71" name="Rectangle 70">
-            <a:extLst>
-              <a:ext uri="{FF2B5EF4-FFF2-40B4-BE49-F238E27FC236}">
-                <a16:creationId xmlns:a16="http://schemas.microsoft.com/office/drawing/2014/main" id="{29A5EAAB-8EE9-AE4B-AADF-6E3893BDBD00}"/>
-              </a:ext>
-            </a:extLst>
-          </p:cNvPr>
-          <p:cNvSpPr/>
-          <p:nvPr/>
-        </p:nvSpPr>
-        <p:spPr>
-          <a:xfrm>
-            <a:off x="7108415" y="4564728"/>
-            <a:ext cx="620889" cy="622866"/>
-          </a:xfrm>
-          <a:prstGeom prst="rect">
-            <a:avLst/>
-          </a:prstGeom>
-          <a:noFill/>
-          <a:ln w="3175">
-            <a:solidFill>
-              <a:schemeClr val="accent1"/>
-            </a:solidFill>
-          </a:ln>
-        </p:spPr>
-        <p:style>
-          <a:lnRef idx="2">
-            <a:schemeClr val="accent1">
-              <a:shade val="50000"/>
-            </a:schemeClr>
-          </a:lnRef>
-          <a:fillRef idx="1">
-            <a:schemeClr val="accent1"/>
-          </a:fillRef>
-          <a:effectRef idx="0">
-            <a:schemeClr val="accent1"/>
-          </a:effectRef>
-          <a:fontRef idx="minor">
-            <a:schemeClr val="lt1"/>
-          </a:fontRef>
-        </p:style>
-        <p:txBody>
-          <a:bodyPr rtlCol="0" anchor="ctr"/>
-          <a:lstStyle/>
-          <a:p>
-            <a:pPr algn="ctr"/>
-            <a:endParaRPr lang="en-US"/>
-          </a:p>
-        </p:txBody>
-      </p:sp>
-      <p:sp>
-        <p:nvSpPr>
-          <p:cNvPr id="72" name="Oval 71">
-            <a:extLst>
-              <a:ext uri="{FF2B5EF4-FFF2-40B4-BE49-F238E27FC236}">
-                <a16:creationId xmlns:a16="http://schemas.microsoft.com/office/drawing/2014/main" id="{E30368C8-6B5A-6C49-99E4-80CA4C716B2D}"/>
-              </a:ext>
-            </a:extLst>
-          </p:cNvPr>
-          <p:cNvSpPr/>
-          <p:nvPr/>
-        </p:nvSpPr>
-        <p:spPr>
-          <a:xfrm>
-            <a:off x="7395634" y="4846510"/>
-            <a:ext cx="111873" cy="101703"/>
-          </a:xfrm>
-          <a:prstGeom prst="ellipse">
-            <a:avLst/>
-          </a:prstGeom>
-          <a:ln w="3175">
-            <a:solidFill>
-              <a:schemeClr val="accent1"/>
-            </a:solidFill>
-          </a:ln>
-        </p:spPr>
-        <p:style>
-          <a:lnRef idx="2">
-            <a:schemeClr val="accent1">
-              <a:shade val="50000"/>
-            </a:schemeClr>
-          </a:lnRef>
-          <a:fillRef idx="1">
-            <a:schemeClr val="accent1"/>
-          </a:fillRef>
-          <a:effectRef idx="0">
-            <a:schemeClr val="accent1"/>
-          </a:effectRef>
-          <a:fontRef idx="minor">
-            <a:schemeClr val="lt1"/>
-          </a:fontRef>
-        </p:style>
-        <p:txBody>
-          <a:bodyPr rtlCol="0" anchor="ctr"/>
-          <a:lstStyle/>
-          <a:p>
-            <a:pPr algn="ctr"/>
-            <a:endParaRPr lang="de-DE"/>
-          </a:p>
-        </p:txBody>
-      </p:sp>
-      <p:sp>
-        <p:nvSpPr>
-          <p:cNvPr id="4" name="Rectangle 3">
-            <a:extLst>
-              <a:ext uri="{FF2B5EF4-FFF2-40B4-BE49-F238E27FC236}">
-                <a16:creationId xmlns:a16="http://schemas.microsoft.com/office/drawing/2014/main" id="{BC891B27-A604-284A-B6C8-ABBE46C05EA8}"/>
-              </a:ext>
-            </a:extLst>
-          </p:cNvPr>
-          <p:cNvSpPr/>
-          <p:nvPr/>
-        </p:nvSpPr>
-        <p:spPr>
-          <a:xfrm>
-            <a:off x="5865465" y="3935565"/>
-            <a:ext cx="1871519" cy="1250269"/>
-          </a:xfrm>
-          <a:prstGeom prst="rect">
-            <a:avLst/>
-          </a:prstGeom>
-          <a:solidFill>
-            <a:schemeClr val="accent1">
-              <a:alpha val="46000"/>
-            </a:schemeClr>
-          </a:solidFill>
-        </p:spPr>
-        <p:style>
-          <a:lnRef idx="2">
-            <a:schemeClr val="accent1">
-              <a:shade val="50000"/>
-            </a:schemeClr>
-          </a:lnRef>
-          <a:fillRef idx="1">
-            <a:schemeClr val="accent1"/>
-          </a:fillRef>
-          <a:effectRef idx="0">
-            <a:schemeClr val="accent1"/>
-          </a:effectRef>
-          <a:fontRef idx="minor">
-            <a:schemeClr val="lt1"/>
-          </a:fontRef>
-        </p:style>
-        <p:txBody>
-          <a:bodyPr rtlCol="0" anchor="ctr"/>
-          <a:lstStyle/>
-          <a:p>
-            <a:pPr algn="ctr"/>
-            <a:endParaRPr lang="de-DE" dirty="0"/>
-          </a:p>
-        </p:txBody>
-      </p:sp>
-    </p:spTree>
-    <p:extLst>
-      <p:ext uri="{BB962C8B-B14F-4D97-AF65-F5344CB8AC3E}">
-        <p14:creationId xmlns:p14="http://schemas.microsoft.com/office/powerpoint/2010/main" val="3647780881"/>
-      </p:ext>
-    </p:extLst>
-  </p:cSld>
-  <p:clrMapOvr>
-    <a:masterClrMapping/>
-  </p:clrMapOvr>
-</p:sld>
-</file>
-
-<file path=ppt/slides/slide2.xml><?xml version="1.0" encoding="utf-8"?>
-<p:sld xmlns:a="http://schemas.openxmlformats.org/drawingml/2006/main" xmlns:r="http://schemas.openxmlformats.org/officeDocument/2006/relationships" xmlns:p="http://schemas.openxmlformats.org/presentationml/2006/main">
-  <p:cSld>
-    <p:spTree>
-      <p:nvGrpSpPr>
-        <p:cNvPr id="1" name=""/>
-        <p:cNvGrpSpPr/>
-        <p:nvPr/>
-      </p:nvGrpSpPr>
-      <p:grpSpPr>
-        <a:xfrm>
-          <a:off x="0" y="0"/>
-          <a:ext cx="0" cy="0"/>
-          <a:chOff x="0" y="0"/>
-          <a:chExt cx="0" cy="0"/>
-        </a:xfrm>
-      </p:grpSpPr>
-      <p:sp>
-        <p:nvSpPr>
-          <p:cNvPr id="8" name="Rectangle 7"/>
-          <p:cNvSpPr/>
-          <p:nvPr/>
-        </p:nvSpPr>
-        <p:spPr>
-          <a:xfrm>
-            <a:off x="6211055" y="1962886"/>
-            <a:ext cx="620889" cy="620889"/>
-          </a:xfrm>
-          <a:prstGeom prst="rect">
-            <a:avLst/>
-          </a:prstGeom>
-          <a:noFill/>
-          <a:ln w="3175">
-            <a:solidFill>
-              <a:schemeClr val="accent1"/>
-            </a:solidFill>
-          </a:ln>
-        </p:spPr>
-        <p:style>
-          <a:lnRef idx="2">
-            <a:schemeClr val="accent1">
-              <a:shade val="50000"/>
-            </a:schemeClr>
-          </a:lnRef>
-          <a:fillRef idx="1">
-            <a:schemeClr val="accent1"/>
-          </a:fillRef>
-          <a:effectRef idx="0">
-            <a:schemeClr val="accent1"/>
-          </a:effectRef>
-          <a:fontRef idx="minor">
-            <a:schemeClr val="lt1"/>
-          </a:fontRef>
-        </p:style>
-        <p:txBody>
-          <a:bodyPr rtlCol="0" anchor="ctr"/>
-          <a:lstStyle/>
-          <a:p>
-            <a:pPr algn="ctr"/>
-            <a:endParaRPr lang="en-US"/>
-          </a:p>
-        </p:txBody>
-      </p:sp>
-      <p:cxnSp>
-        <p:nvCxnSpPr>
-          <p:cNvPr id="10" name="Straight Connector 9"/>
-          <p:cNvCxnSpPr/>
-          <p:nvPr/>
-        </p:nvCxnSpPr>
-        <p:spPr>
-          <a:xfrm flipH="1" flipV="1">
-            <a:off x="6070907" y="2243054"/>
-            <a:ext cx="11289" cy="694267"/>
-          </a:xfrm>
-          <a:prstGeom prst="line">
-            <a:avLst/>
-          </a:prstGeom>
-          <a:ln w="28575">
-            <a:headEnd type="arrow" w="med" len="med"/>
-            <a:tailEnd type="arrow" w="med" len="med"/>
-          </a:ln>
-        </p:spPr>
-        <p:style>
-          <a:lnRef idx="1">
-            <a:schemeClr val="accent1"/>
-          </a:lnRef>
-          <a:fillRef idx="0">
-            <a:schemeClr val="accent1"/>
-          </a:fillRef>
-          <a:effectRef idx="0">
-            <a:schemeClr val="accent1"/>
-          </a:effectRef>
-          <a:fontRef idx="minor">
-            <a:schemeClr val="tx1"/>
-          </a:fontRef>
-        </p:style>
-      </p:cxnSp>
-      <p:sp>
-        <p:nvSpPr>
-          <p:cNvPr id="12" name="TextBox 11"/>
-          <p:cNvSpPr txBox="1"/>
-          <p:nvPr/>
-        </p:nvSpPr>
-        <p:spPr>
-          <a:xfrm rot="16200000">
-            <a:off x="5158612" y="2384378"/>
-            <a:ext cx="1183337" cy="369332"/>
-          </a:xfrm>
-          <a:prstGeom prst="rect">
-            <a:avLst/>
-          </a:prstGeom>
-          <a:noFill/>
-        </p:spPr>
-        <p:txBody>
-          <a:bodyPr wrap="none" rtlCol="0">
-            <a:spAutoFit/>
-          </a:bodyPr>
-          <a:lstStyle/>
-          <a:p>
-            <a:r>
-              <a:rPr lang="en-US" dirty="0"/>
-              <a:t>Spacing </a:t>
-            </a:r>
-            <a:r>
-              <a:rPr lang="en-US" dirty="0" err="1"/>
-              <a:t>dy</a:t>
-            </a:r>
-            <a:endParaRPr lang="en-US" dirty="0"/>
-          </a:p>
-        </p:txBody>
-      </p:sp>
-      <p:sp>
-        <p:nvSpPr>
-          <p:cNvPr id="13" name="TextBox 12"/>
-          <p:cNvSpPr txBox="1"/>
-          <p:nvPr/>
-        </p:nvSpPr>
-        <p:spPr>
-          <a:xfrm>
-            <a:off x="6290693" y="1317648"/>
-            <a:ext cx="1178528" cy="369332"/>
-          </a:xfrm>
-          <a:prstGeom prst="rect">
-            <a:avLst/>
-          </a:prstGeom>
-          <a:noFill/>
-        </p:spPr>
-        <p:txBody>
-          <a:bodyPr wrap="none" rtlCol="0">
-            <a:spAutoFit/>
-          </a:bodyPr>
-          <a:lstStyle/>
-          <a:p>
-            <a:r>
-              <a:rPr lang="en-US" dirty="0"/>
-              <a:t>Spacing dx</a:t>
-            </a:r>
-          </a:p>
-        </p:txBody>
-      </p:sp>
-      <p:cxnSp>
-        <p:nvCxnSpPr>
-          <p:cNvPr id="18" name="Straight Connector 17"/>
-          <p:cNvCxnSpPr/>
-          <p:nvPr/>
-        </p:nvCxnSpPr>
-        <p:spPr>
-          <a:xfrm>
-            <a:off x="5851794" y="3757435"/>
-            <a:ext cx="1885191" cy="0"/>
-          </a:xfrm>
-          <a:prstGeom prst="line">
-            <a:avLst/>
-          </a:prstGeom>
-          <a:ln w="28575">
-            <a:headEnd type="arrow" w="med" len="med"/>
-            <a:tailEnd type="arrow" w="med" len="med"/>
-          </a:ln>
-        </p:spPr>
-        <p:style>
-          <a:lnRef idx="1">
-            <a:schemeClr val="accent1"/>
-          </a:lnRef>
-          <a:fillRef idx="0">
-            <a:schemeClr val="accent1"/>
-          </a:fillRef>
-          <a:effectRef idx="0">
-            <a:schemeClr val="accent1"/>
-          </a:effectRef>
-          <a:fontRef idx="minor">
-            <a:schemeClr val="tx1"/>
-          </a:fontRef>
-        </p:style>
-      </p:cxnSp>
-      <p:sp>
-        <p:nvSpPr>
-          <p:cNvPr id="19" name="TextBox 18"/>
-          <p:cNvSpPr txBox="1"/>
-          <p:nvPr/>
-        </p:nvSpPr>
-        <p:spPr>
-          <a:xfrm>
-            <a:off x="6446463" y="3412258"/>
-            <a:ext cx="575799" cy="369332"/>
-          </a:xfrm>
-          <a:prstGeom prst="rect">
-            <a:avLst/>
-          </a:prstGeom>
-          <a:noFill/>
-        </p:spPr>
-        <p:txBody>
-          <a:bodyPr wrap="none" rtlCol="0">
-            <a:spAutoFit/>
-          </a:bodyPr>
-          <a:lstStyle/>
-          <a:p>
-            <a:r>
-              <a:rPr lang="en-US" dirty="0"/>
-              <a:t>3 dx</a:t>
-            </a:r>
-          </a:p>
-        </p:txBody>
-      </p:sp>
-      <p:cxnSp>
-        <p:nvCxnSpPr>
-          <p:cNvPr id="15" name="Straight Connector 14"/>
-          <p:cNvCxnSpPr/>
-          <p:nvPr/>
-        </p:nvCxnSpPr>
-        <p:spPr>
-          <a:xfrm flipV="1">
-            <a:off x="6521499" y="1776435"/>
-            <a:ext cx="632177" cy="7924"/>
-          </a:xfrm>
-          <a:prstGeom prst="line">
-            <a:avLst/>
-          </a:prstGeom>
-          <a:ln w="28575">
-            <a:headEnd type="arrow" w="med" len="med"/>
-            <a:tailEnd type="arrow" w="med" len="med"/>
-          </a:ln>
-        </p:spPr>
-        <p:style>
-          <a:lnRef idx="1">
-            <a:schemeClr val="accent1"/>
-          </a:lnRef>
-          <a:fillRef idx="0">
-            <a:schemeClr val="accent1"/>
-          </a:fillRef>
-          <a:effectRef idx="0">
-            <a:schemeClr val="accent1"/>
-          </a:effectRef>
-          <a:fontRef idx="minor">
-            <a:schemeClr val="tx1"/>
-          </a:fontRef>
-        </p:style>
-      </p:cxnSp>
-      <mc:AlternateContent xmlns:mc="http://schemas.openxmlformats.org/markup-compatibility/2006" xmlns:a14="http://schemas.microsoft.com/office/drawing/2010/main">
-        <mc:Choice Requires="a14">
-          <p:sp>
-            <p:nvSpPr>
-              <p:cNvPr id="32" name="TextBox 31"/>
-              <p:cNvSpPr txBox="1"/>
-              <p:nvPr/>
-            </p:nvSpPr>
-            <p:spPr>
-              <a:xfrm>
-                <a:off x="5647731" y="5397351"/>
-                <a:ext cx="2350900" cy="369332"/>
-              </a:xfrm>
-              <a:prstGeom prst="rect">
-                <a:avLst/>
-              </a:prstGeom>
-              <a:noFill/>
-            </p:spPr>
-            <p:txBody>
-              <a:bodyPr wrap="none" rtlCol="0">
-                <a:spAutoFit/>
-              </a:bodyPr>
-              <a:lstStyle/>
-              <a:p>
-                <a:pPr/>
-                <a14:m>
-                  <m:oMathPara xmlns:m="http://schemas.openxmlformats.org/officeDocument/2006/math">
-                    <m:oMathParaPr>
-                      <m:jc m:val="centerGroup"/>
-                    </m:oMathParaPr>
-                    <m:oMath xmlns:m="http://schemas.openxmlformats.org/officeDocument/2006/math">
-                      <m:r>
-                        <a:rPr lang="en-US" i="1" dirty="0" smtClean="0">
-                          <a:latin typeface="Cambria Math" panose="02040503050406030204" pitchFamily="18" charset="0"/>
-                        </a:rPr>
-                        <m:t>𝐴</m:t>
-                      </m:r>
-                      <m:r>
-                        <a:rPr lang="en-US" b="0" i="1" dirty="0" smtClean="0">
-                          <a:latin typeface="Cambria Math" panose="02040503050406030204" pitchFamily="18" charset="0"/>
-                        </a:rPr>
-                        <m:t>𝑟𝑒𝑎</m:t>
-                      </m:r>
-                      <m:r>
-                        <a:rPr lang="en-US" i="1" dirty="0" smtClean="0">
-                          <a:latin typeface="Cambria Math" panose="02040503050406030204" pitchFamily="18" charset="0"/>
-                        </a:rPr>
-                        <m:t> = 3 </m:t>
-                      </m:r>
-                      <m:r>
-                        <a:rPr lang="en-US" i="1" dirty="0" smtClean="0">
-                          <a:latin typeface="Cambria Math" panose="02040503050406030204" pitchFamily="18" charset="0"/>
-                        </a:rPr>
-                        <m:t>𝑑𝑥</m:t>
-                      </m:r>
-                      <m:r>
-                        <a:rPr lang="en-US" i="1" dirty="0">
-                          <a:latin typeface="Cambria Math" panose="02040503050406030204" pitchFamily="18" charset="0"/>
-                        </a:rPr>
-                        <m:t> </m:t>
-                      </m:r>
-                      <m:r>
-                        <a:rPr lang="en-US" i="1" dirty="0" smtClean="0">
-                          <a:latin typeface="Cambria Math" panose="02040503050406030204" pitchFamily="18" charset="0"/>
-                        </a:rPr>
-                        <m:t>∗ 2 </m:t>
-                      </m:r>
-                      <m:r>
-                        <a:rPr lang="en-US" i="1" dirty="0" err="1" smtClean="0">
-                          <a:latin typeface="Cambria Math" panose="02040503050406030204" pitchFamily="18" charset="0"/>
-                        </a:rPr>
-                        <m:t>𝑑𝑦</m:t>
-                      </m:r>
-                    </m:oMath>
-                  </m:oMathPara>
-                </a14:m>
-                <a:endParaRPr lang="en-US" dirty="0"/>
-              </a:p>
-            </p:txBody>
-          </p:sp>
-        </mc:Choice>
-        <mc:Fallback xmlns="">
-          <p:sp>
-            <p:nvSpPr>
-              <p:cNvPr id="32" name="TextBox 31"/>
-              <p:cNvSpPr txBox="1">
-                <a:spLocks noRot="1" noChangeAspect="1" noMove="1" noResize="1" noEditPoints="1" noAdjustHandles="1" noChangeArrowheads="1" noChangeShapeType="1" noTextEdit="1"/>
-              </p:cNvSpPr>
-              <p:nvPr/>
-            </p:nvSpPr>
-            <p:spPr>
-              <a:xfrm>
-                <a:off x="5647731" y="5397351"/>
-                <a:ext cx="2350900" cy="369332"/>
-              </a:xfrm>
-              <a:prstGeom prst="rect">
-                <a:avLst/>
-              </a:prstGeom>
-              <a:blipFill>
-                <a:blip r:embed="rId3"/>
-                <a:stretch>
-                  <a:fillRect b="-13333"/>
-                </a:stretch>
-              </a:blipFill>
-            </p:spPr>
-            <p:txBody>
-              <a:bodyPr/>
-              <a:lstStyle/>
-              <a:p>
-                <a:r>
-                  <a:rPr lang="de-DE">
-                    <a:noFill/>
-                  </a:rPr>
-                  <a:t> </a:t>
-                </a:r>
-              </a:p>
-            </p:txBody>
-          </p:sp>
-        </mc:Fallback>
-      </mc:AlternateContent>
-      <p:cxnSp>
-        <p:nvCxnSpPr>
-          <p:cNvPr id="33" name="Straight Connector 32"/>
-          <p:cNvCxnSpPr/>
-          <p:nvPr/>
-        </p:nvCxnSpPr>
-        <p:spPr>
-          <a:xfrm flipH="1">
-            <a:off x="5685051" y="3909835"/>
-            <a:ext cx="3532" cy="1319514"/>
-          </a:xfrm>
-          <a:prstGeom prst="line">
-            <a:avLst/>
-          </a:prstGeom>
-          <a:ln w="28575">
-            <a:headEnd type="arrow" w="med" len="med"/>
-            <a:tailEnd type="arrow" w="med" len="med"/>
-          </a:ln>
-        </p:spPr>
-        <p:style>
-          <a:lnRef idx="1">
-            <a:schemeClr val="accent1"/>
-          </a:lnRef>
-          <a:fillRef idx="0">
-            <a:schemeClr val="accent1"/>
-          </a:fillRef>
-          <a:effectRef idx="0">
-            <a:schemeClr val="accent1"/>
-          </a:effectRef>
-          <a:fontRef idx="minor">
-            <a:schemeClr val="tx1"/>
-          </a:fontRef>
-        </p:style>
-      </p:cxnSp>
-      <p:sp>
-        <p:nvSpPr>
-          <p:cNvPr id="35" name="TextBox 34"/>
-          <p:cNvSpPr txBox="1"/>
-          <p:nvPr/>
-        </p:nvSpPr>
-        <p:spPr>
-          <a:xfrm>
-            <a:off x="4988364" y="4288454"/>
-            <a:ext cx="580608" cy="369332"/>
-          </a:xfrm>
-          <a:prstGeom prst="rect">
-            <a:avLst/>
-          </a:prstGeom>
-          <a:noFill/>
-        </p:spPr>
-        <p:txBody>
-          <a:bodyPr wrap="none" rtlCol="0">
-            <a:spAutoFit/>
-          </a:bodyPr>
-          <a:lstStyle/>
-          <a:p>
-            <a:r>
-              <a:rPr lang="en-US" dirty="0"/>
-              <a:t>2 </a:t>
-            </a:r>
-            <a:r>
-              <a:rPr lang="en-US" dirty="0" err="1"/>
-              <a:t>dy</a:t>
-            </a:r>
-            <a:endParaRPr lang="en-US" dirty="0"/>
-          </a:p>
-        </p:txBody>
-      </p:sp>
-      <p:pic>
-        <p:nvPicPr>
-          <p:cNvPr id="2" name="Picture 1">
-            <a:extLst>
-              <a:ext uri="{FF2B5EF4-FFF2-40B4-BE49-F238E27FC236}">
-                <a16:creationId xmlns:a16="http://schemas.microsoft.com/office/drawing/2014/main" id="{735AA54B-4CF3-3245-83F5-0A757CB942B4}"/>
-              </a:ext>
-            </a:extLst>
-          </p:cNvPr>
-          <p:cNvPicPr>
-            <a:picLocks noChangeAspect="1"/>
-          </p:cNvPicPr>
-          <p:nvPr/>
-        </p:nvPicPr>
-        <p:blipFill>
-          <a:blip r:embed="rId4"/>
-          <a:stretch>
-            <a:fillRect/>
-          </a:stretch>
-        </p:blipFill>
-        <p:spPr>
-          <a:xfrm>
-            <a:off x="1271769" y="2941748"/>
-            <a:ext cx="2466807" cy="2466807"/>
-          </a:xfrm>
-          <a:prstGeom prst="rect">
-            <a:avLst/>
-          </a:prstGeom>
-        </p:spPr>
-      </p:pic>
-      <p:pic>
-        <p:nvPicPr>
-          <p:cNvPr id="9" name="Picture 8">
-            <a:extLst>
-              <a:ext uri="{FF2B5EF4-FFF2-40B4-BE49-F238E27FC236}">
-                <a16:creationId xmlns:a16="http://schemas.microsoft.com/office/drawing/2014/main" id="{0FA03725-3C6B-E547-96B5-219B4EF4940E}"/>
-              </a:ext>
-            </a:extLst>
-          </p:cNvPr>
-          <p:cNvPicPr>
-            <a:picLocks noChangeAspect="1"/>
-          </p:cNvPicPr>
-          <p:nvPr/>
-        </p:nvPicPr>
-        <p:blipFill rotWithShape="1">
-          <a:blip r:embed="rId5"/>
-          <a:srcRect l="8811" t="11586" r="11204" b="12787"/>
-          <a:stretch/>
-        </p:blipFill>
-        <p:spPr>
-          <a:xfrm>
             <a:off x="-1655082" y="4363453"/>
             <a:ext cx="1505044" cy="1403230"/>
           </a:xfrm>
@@ -6253,8 +6233,8 @@
           </a:fontRef>
         </p:style>
       </p:cxnSp>
-      <mc:AlternateContent xmlns:mc="http://schemas.openxmlformats.org/markup-compatibility/2006">
-        <mc:Choice xmlns:a14="http://schemas.microsoft.com/office/drawing/2010/main" Requires="a14">
+      <mc:AlternateContent xmlns:mc="http://schemas.openxmlformats.org/markup-compatibility/2006" xmlns:a14="http://schemas.microsoft.com/office/drawing/2010/main">
+        <mc:Choice Requires="a14">
           <p:sp>
             <p:nvSpPr>
               <p:cNvPr id="34" name="TextBox 33">
@@ -6283,7 +6263,6 @@
               </a:bodyPr>
               <a:lstStyle/>
               <a:p>
-                <a:pPr/>
                 <a:r>
                   <a:rPr lang="en-US" dirty="0">
                     <a:solidFill>
@@ -6330,22 +6309,7 @@
                         <a:rPr lang="en-US" b="0" i="1" smtClean="0">
                           <a:latin typeface="Cambria Math" panose="02040503050406030204" pitchFamily="18" charset="0"/>
                         </a:rPr>
-                        <m:t>: 139 </m:t>
-                      </m:r>
-                      <m:r>
-                        <a:rPr lang="en-US" b="0" i="1" smtClean="0">
-                          <a:latin typeface="Cambria Math" panose="02040503050406030204" pitchFamily="18" charset="0"/>
-                        </a:rPr>
-                        <m:t>∗ 0.</m:t>
-                      </m:r>
-                      <m:r>
-                        <a:rPr lang="en-US" b="0" i="1" smtClean="0">
-                          <a:solidFill>
-                            <a:schemeClr val="accent6"/>
-                          </a:solidFill>
-                          <a:latin typeface="Cambria Math" panose="02040503050406030204" pitchFamily="18" charset="0"/>
-                        </a:rPr>
-                        <m:t>13 µ</m:t>
+                        <m:t>: 139 ∗ 0.13 µ</m:t>
                       </m:r>
                       <m:r>
                         <a:rPr lang="en-US" b="0" i="1" smtClean="0">
@@ -6399,22 +6363,13 @@
                         <a:rPr lang="en-US" b="0" i="1" smtClean="0">
                           <a:latin typeface="Cambria Math" panose="02040503050406030204" pitchFamily="18" charset="0"/>
                         </a:rPr>
-                        <m:t>: 50 ∗</m:t>
+                        <m:t>: 50 ∗ 0.1</m:t>
                       </m:r>
                       <m:r>
                         <a:rPr lang="en-US" i="1">
                           <a:latin typeface="Cambria Math" panose="02040503050406030204" pitchFamily="18" charset="0"/>
                         </a:rPr>
-                        <m:t> 0.13</m:t>
-                      </m:r>
-                      <m:r>
-                        <a:rPr lang="en-US" i="1" smtClean="0">
-                          <a:solidFill>
-                            <a:schemeClr val="accent6"/>
-                          </a:solidFill>
-                          <a:latin typeface="Cambria Math" panose="02040503050406030204" pitchFamily="18" charset="0"/>
-                        </a:rPr>
-                        <m:t> µ</m:t>
+                        <m:t>3 µ</m:t>
                       </m:r>
                       <m:r>
                         <a:rPr lang="en-US" i="1" smtClean="0">
@@ -6451,7 +6406,7 @@
             </p:txBody>
           </p:sp>
         </mc:Choice>
-        <mc:Fallback>
+        <mc:Fallback xmlns="">
           <p:sp>
             <p:nvSpPr>
               <p:cNvPr id="34" name="TextBox 33">

</xml_diff>